<commit_message>
Corrections in the presentation
</commit_message>
<xml_diff>
--- a/DesCards.pptx
+++ b/DesCards.pptx
@@ -129,7 +129,7 @@
         </p:spPr>
         <p:txBody>
           <a:bodyPr lIns="0" rIns="0" tIns="0" bIns="0">
-            <a:normAutofit/>
+            <a:normAutofit fontScale="7000"/>
           </a:bodyPr>
           <a:p>
             <a:endParaRPr b="0" lang="en-GB" sz="3200" spc="-1" strike="noStrike">
@@ -159,7 +159,7 @@
         </p:spPr>
         <p:txBody>
           <a:bodyPr lIns="0" rIns="0" tIns="0" bIns="0">
-            <a:normAutofit/>
+            <a:normAutofit fontScale="7000"/>
           </a:bodyPr>
           <a:p>
             <a:endParaRPr b="0" lang="en-GB" sz="3200" spc="-1" strike="noStrike">
@@ -242,7 +242,7 @@
         </p:spPr>
         <p:txBody>
           <a:bodyPr lIns="0" rIns="0" tIns="0" bIns="0">
-            <a:normAutofit/>
+            <a:normAutofit fontScale="7000"/>
           </a:bodyPr>
           <a:p>
             <a:endParaRPr b="0" lang="en-GB" sz="3200" spc="-1" strike="noStrike">
@@ -272,7 +272,7 @@
         </p:spPr>
         <p:txBody>
           <a:bodyPr lIns="0" rIns="0" tIns="0" bIns="0">
-            <a:normAutofit/>
+            <a:normAutofit fontScale="7000"/>
           </a:bodyPr>
           <a:p>
             <a:endParaRPr b="0" lang="en-GB" sz="3200" spc="-1" strike="noStrike">
@@ -302,7 +302,7 @@
         </p:spPr>
         <p:txBody>
           <a:bodyPr lIns="0" rIns="0" tIns="0" bIns="0">
-            <a:normAutofit/>
+            <a:normAutofit fontScale="7000"/>
           </a:bodyPr>
           <a:p>
             <a:endParaRPr b="0" lang="en-GB" sz="3200" spc="-1" strike="noStrike">
@@ -332,7 +332,7 @@
         </p:spPr>
         <p:txBody>
           <a:bodyPr lIns="0" rIns="0" tIns="0" bIns="0">
-            <a:normAutofit/>
+            <a:normAutofit fontScale="7000"/>
           </a:bodyPr>
           <a:p>
             <a:endParaRPr b="0" lang="en-GB" sz="3200" spc="-1" strike="noStrike">
@@ -415,7 +415,7 @@
         </p:spPr>
         <p:txBody>
           <a:bodyPr lIns="0" rIns="0" tIns="0" bIns="0">
-            <a:normAutofit/>
+            <a:normAutofit fontScale="7000"/>
           </a:bodyPr>
           <a:p>
             <a:endParaRPr b="0" lang="en-GB" sz="3200" spc="-1" strike="noStrike">
@@ -445,7 +445,7 @@
         </p:spPr>
         <p:txBody>
           <a:bodyPr lIns="0" rIns="0" tIns="0" bIns="0">
-            <a:normAutofit/>
+            <a:normAutofit fontScale="7000"/>
           </a:bodyPr>
           <a:p>
             <a:endParaRPr b="0" lang="en-GB" sz="3200" spc="-1" strike="noStrike">
@@ -475,7 +475,7 @@
         </p:spPr>
         <p:txBody>
           <a:bodyPr lIns="0" rIns="0" tIns="0" bIns="0">
-            <a:normAutofit/>
+            <a:normAutofit fontScale="7000"/>
           </a:bodyPr>
           <a:p>
             <a:endParaRPr b="0" lang="en-GB" sz="3200" spc="-1" strike="noStrike">
@@ -505,7 +505,7 @@
         </p:spPr>
         <p:txBody>
           <a:bodyPr lIns="0" rIns="0" tIns="0" bIns="0">
-            <a:normAutofit/>
+            <a:normAutofit fontScale="7000"/>
           </a:bodyPr>
           <a:p>
             <a:endParaRPr b="0" lang="en-GB" sz="3200" spc="-1" strike="noStrike">
@@ -535,7 +535,7 @@
         </p:spPr>
         <p:txBody>
           <a:bodyPr lIns="0" rIns="0" tIns="0" bIns="0">
-            <a:normAutofit/>
+            <a:normAutofit fontScale="7000"/>
           </a:bodyPr>
           <a:p>
             <a:endParaRPr b="0" lang="en-GB" sz="3200" spc="-1" strike="noStrike">
@@ -565,7 +565,7 @@
         </p:spPr>
         <p:txBody>
           <a:bodyPr lIns="0" rIns="0" tIns="0" bIns="0">
-            <a:normAutofit/>
+            <a:normAutofit fontScale="7000"/>
           </a:bodyPr>
           <a:p>
             <a:endParaRPr b="0" lang="en-GB" sz="3200" spc="-1" strike="noStrike">
@@ -754,7 +754,7 @@
         </p:spPr>
         <p:txBody>
           <a:bodyPr lIns="0" rIns="0" tIns="0" bIns="0">
-            <a:normAutofit/>
+            <a:normAutofit fontScale="23000"/>
           </a:bodyPr>
           <a:p>
             <a:endParaRPr b="0" lang="en-GB" sz="3200" spc="-1" strike="noStrike">
@@ -837,7 +837,7 @@
         </p:spPr>
         <p:txBody>
           <a:bodyPr lIns="0" rIns="0" tIns="0" bIns="0">
-            <a:normAutofit/>
+            <a:normAutofit fontScale="23000"/>
           </a:bodyPr>
           <a:p>
             <a:endParaRPr b="0" lang="en-GB" sz="3200" spc="-1" strike="noStrike">
@@ -867,7 +867,7 @@
         </p:spPr>
         <p:txBody>
           <a:bodyPr lIns="0" rIns="0" tIns="0" bIns="0">
-            <a:normAutofit/>
+            <a:normAutofit fontScale="23000"/>
           </a:bodyPr>
           <a:p>
             <a:endParaRPr b="0" lang="en-GB" sz="3200" spc="-1" strike="noStrike">
@@ -1056,7 +1056,7 @@
         </p:spPr>
         <p:txBody>
           <a:bodyPr lIns="0" rIns="0" tIns="0" bIns="0">
-            <a:normAutofit/>
+            <a:normAutofit fontScale="7000"/>
           </a:bodyPr>
           <a:p>
             <a:endParaRPr b="0" lang="en-GB" sz="3200" spc="-1" strike="noStrike">
@@ -1086,7 +1086,7 @@
         </p:spPr>
         <p:txBody>
           <a:bodyPr lIns="0" rIns="0" tIns="0" bIns="0">
-            <a:normAutofit/>
+            <a:normAutofit fontScale="23000"/>
           </a:bodyPr>
           <a:p>
             <a:endParaRPr b="0" lang="en-GB" sz="3200" spc="-1" strike="noStrike">
@@ -1116,7 +1116,7 @@
         </p:spPr>
         <p:txBody>
           <a:bodyPr lIns="0" rIns="0" tIns="0" bIns="0">
-            <a:normAutofit/>
+            <a:normAutofit fontScale="7000"/>
           </a:bodyPr>
           <a:p>
             <a:endParaRPr b="0" lang="en-GB" sz="3200" spc="-1" strike="noStrike">
@@ -1283,7 +1283,7 @@
         </p:spPr>
         <p:txBody>
           <a:bodyPr lIns="0" rIns="0" tIns="0" bIns="0">
-            <a:normAutofit/>
+            <a:normAutofit fontScale="23000"/>
           </a:bodyPr>
           <a:p>
             <a:endParaRPr b="0" lang="en-GB" sz="3200" spc="-1" strike="noStrike">
@@ -1313,7 +1313,7 @@
         </p:spPr>
         <p:txBody>
           <a:bodyPr lIns="0" rIns="0" tIns="0" bIns="0">
-            <a:normAutofit/>
+            <a:normAutofit fontScale="7000"/>
           </a:bodyPr>
           <a:p>
             <a:endParaRPr b="0" lang="en-GB" sz="3200" spc="-1" strike="noStrike">
@@ -1343,7 +1343,7 @@
         </p:spPr>
         <p:txBody>
           <a:bodyPr lIns="0" rIns="0" tIns="0" bIns="0">
-            <a:normAutofit/>
+            <a:normAutofit fontScale="7000"/>
           </a:bodyPr>
           <a:p>
             <a:endParaRPr b="0" lang="en-GB" sz="3200" spc="-1" strike="noStrike">
@@ -1426,7 +1426,7 @@
         </p:spPr>
         <p:txBody>
           <a:bodyPr lIns="0" rIns="0" tIns="0" bIns="0">
-            <a:normAutofit/>
+            <a:normAutofit fontScale="7000"/>
           </a:bodyPr>
           <a:p>
             <a:endParaRPr b="0" lang="en-GB" sz="3200" spc="-1" strike="noStrike">
@@ -1456,7 +1456,7 @@
         </p:spPr>
         <p:txBody>
           <a:bodyPr lIns="0" rIns="0" tIns="0" bIns="0">
-            <a:normAutofit/>
+            <a:normAutofit fontScale="7000"/>
           </a:bodyPr>
           <a:p>
             <a:endParaRPr b="0" lang="en-GB" sz="3200" spc="-1" strike="noStrike">
@@ -1486,7 +1486,7 @@
         </p:spPr>
         <p:txBody>
           <a:bodyPr lIns="0" rIns="0" tIns="0" bIns="0">
-            <a:normAutofit/>
+            <a:normAutofit fontScale="7000"/>
           </a:bodyPr>
           <a:p>
             <a:endParaRPr b="0" lang="en-GB" sz="3200" spc="-1" strike="noStrike">
@@ -1569,7 +1569,7 @@
         </p:spPr>
         <p:txBody>
           <a:bodyPr lIns="0" rIns="0" tIns="0" bIns="0">
-            <a:normAutofit/>
+            <a:normAutofit fontScale="7000"/>
           </a:bodyPr>
           <a:p>
             <a:endParaRPr b="0" lang="en-GB" sz="3200" spc="-1" strike="noStrike">
@@ -1599,7 +1599,7 @@
         </p:spPr>
         <p:txBody>
           <a:bodyPr lIns="0" rIns="0" tIns="0" bIns="0">
-            <a:normAutofit/>
+            <a:normAutofit fontScale="7000"/>
           </a:bodyPr>
           <a:p>
             <a:endParaRPr b="0" lang="en-GB" sz="3200" spc="-1" strike="noStrike">
@@ -1682,7 +1682,7 @@
         </p:spPr>
         <p:txBody>
           <a:bodyPr lIns="0" rIns="0" tIns="0" bIns="0">
-            <a:normAutofit/>
+            <a:normAutofit fontScale="7000"/>
           </a:bodyPr>
           <a:p>
             <a:endParaRPr b="0" lang="en-GB" sz="3200" spc="-1" strike="noStrike">
@@ -1712,7 +1712,7 @@
         </p:spPr>
         <p:txBody>
           <a:bodyPr lIns="0" rIns="0" tIns="0" bIns="0">
-            <a:normAutofit/>
+            <a:normAutofit fontScale="7000"/>
           </a:bodyPr>
           <a:p>
             <a:endParaRPr b="0" lang="en-GB" sz="3200" spc="-1" strike="noStrike">
@@ -1742,7 +1742,7 @@
         </p:spPr>
         <p:txBody>
           <a:bodyPr lIns="0" rIns="0" tIns="0" bIns="0">
-            <a:normAutofit/>
+            <a:normAutofit fontScale="7000"/>
           </a:bodyPr>
           <a:p>
             <a:endParaRPr b="0" lang="en-GB" sz="3200" spc="-1" strike="noStrike">
@@ -1772,7 +1772,7 @@
         </p:spPr>
         <p:txBody>
           <a:bodyPr lIns="0" rIns="0" tIns="0" bIns="0">
-            <a:normAutofit/>
+            <a:normAutofit fontScale="7000"/>
           </a:bodyPr>
           <a:p>
             <a:endParaRPr b="0" lang="en-GB" sz="3200" spc="-1" strike="noStrike">
@@ -1855,7 +1855,7 @@
         </p:spPr>
         <p:txBody>
           <a:bodyPr lIns="0" rIns="0" tIns="0" bIns="0">
-            <a:normAutofit/>
+            <a:normAutofit fontScale="7000"/>
           </a:bodyPr>
           <a:p>
             <a:endParaRPr b="0" lang="en-GB" sz="3200" spc="-1" strike="noStrike">
@@ -1885,7 +1885,7 @@
         </p:spPr>
         <p:txBody>
           <a:bodyPr lIns="0" rIns="0" tIns="0" bIns="0">
-            <a:normAutofit/>
+            <a:normAutofit fontScale="7000"/>
           </a:bodyPr>
           <a:p>
             <a:endParaRPr b="0" lang="en-GB" sz="3200" spc="-1" strike="noStrike">
@@ -1915,7 +1915,7 @@
         </p:spPr>
         <p:txBody>
           <a:bodyPr lIns="0" rIns="0" tIns="0" bIns="0">
-            <a:normAutofit/>
+            <a:normAutofit fontScale="7000"/>
           </a:bodyPr>
           <a:p>
             <a:endParaRPr b="0" lang="en-GB" sz="3200" spc="-1" strike="noStrike">
@@ -1945,7 +1945,7 @@
         </p:spPr>
         <p:txBody>
           <a:bodyPr lIns="0" rIns="0" tIns="0" bIns="0">
-            <a:normAutofit/>
+            <a:normAutofit fontScale="7000"/>
           </a:bodyPr>
           <a:p>
             <a:endParaRPr b="0" lang="en-GB" sz="3200" spc="-1" strike="noStrike">
@@ -1975,7 +1975,7 @@
         </p:spPr>
         <p:txBody>
           <a:bodyPr lIns="0" rIns="0" tIns="0" bIns="0">
-            <a:normAutofit/>
+            <a:normAutofit fontScale="7000"/>
           </a:bodyPr>
           <a:p>
             <a:endParaRPr b="0" lang="en-GB" sz="3200" spc="-1" strike="noStrike">
@@ -2005,7 +2005,7 @@
         </p:spPr>
         <p:txBody>
           <a:bodyPr lIns="0" rIns="0" tIns="0" bIns="0">
-            <a:normAutofit/>
+            <a:normAutofit fontScale="7000"/>
           </a:bodyPr>
           <a:p>
             <a:endParaRPr b="0" lang="en-GB" sz="3200" spc="-1" strike="noStrike">
@@ -2194,7 +2194,7 @@
         </p:spPr>
         <p:txBody>
           <a:bodyPr lIns="0" rIns="0" tIns="0" bIns="0">
-            <a:normAutofit/>
+            <a:normAutofit fontScale="23000"/>
           </a:bodyPr>
           <a:p>
             <a:endParaRPr b="0" lang="en-GB" sz="3200" spc="-1" strike="noStrike">
@@ -2277,7 +2277,7 @@
         </p:spPr>
         <p:txBody>
           <a:bodyPr lIns="0" rIns="0" tIns="0" bIns="0">
-            <a:normAutofit/>
+            <a:normAutofit fontScale="23000"/>
           </a:bodyPr>
           <a:p>
             <a:endParaRPr b="0" lang="en-GB" sz="3200" spc="-1" strike="noStrike">
@@ -2307,7 +2307,7 @@
         </p:spPr>
         <p:txBody>
           <a:bodyPr lIns="0" rIns="0" tIns="0" bIns="0">
-            <a:normAutofit/>
+            <a:normAutofit fontScale="23000"/>
           </a:bodyPr>
           <a:p>
             <a:endParaRPr b="0" lang="en-GB" sz="3200" spc="-1" strike="noStrike">
@@ -2443,7 +2443,7 @@
         </p:spPr>
         <p:txBody>
           <a:bodyPr lIns="0" rIns="0" tIns="0" bIns="0">
-            <a:normAutofit/>
+            <a:normAutofit fontScale="23000"/>
           </a:bodyPr>
           <a:p>
             <a:endParaRPr b="0" lang="en-GB" sz="3200" spc="-1" strike="noStrike">
@@ -2579,7 +2579,7 @@
         </p:spPr>
         <p:txBody>
           <a:bodyPr lIns="0" rIns="0" tIns="0" bIns="0">
-            <a:normAutofit/>
+            <a:normAutofit fontScale="7000"/>
           </a:bodyPr>
           <a:p>
             <a:endParaRPr b="0" lang="en-GB" sz="3200" spc="-1" strike="noStrike">
@@ -2609,7 +2609,7 @@
         </p:spPr>
         <p:txBody>
           <a:bodyPr lIns="0" rIns="0" tIns="0" bIns="0">
-            <a:normAutofit/>
+            <a:normAutofit fontScale="23000"/>
           </a:bodyPr>
           <a:p>
             <a:endParaRPr b="0" lang="en-GB" sz="3200" spc="-1" strike="noStrike">
@@ -2639,7 +2639,7 @@
         </p:spPr>
         <p:txBody>
           <a:bodyPr lIns="0" rIns="0" tIns="0" bIns="0">
-            <a:normAutofit/>
+            <a:normAutofit fontScale="7000"/>
           </a:bodyPr>
           <a:p>
             <a:endParaRPr b="0" lang="en-GB" sz="3200" spc="-1" strike="noStrike">
@@ -2722,7 +2722,7 @@
         </p:spPr>
         <p:txBody>
           <a:bodyPr lIns="0" rIns="0" tIns="0" bIns="0">
-            <a:normAutofit/>
+            <a:normAutofit fontScale="23000"/>
           </a:bodyPr>
           <a:p>
             <a:endParaRPr b="0" lang="en-GB" sz="3200" spc="-1" strike="noStrike">
@@ -2752,7 +2752,7 @@
         </p:spPr>
         <p:txBody>
           <a:bodyPr lIns="0" rIns="0" tIns="0" bIns="0">
-            <a:normAutofit/>
+            <a:normAutofit fontScale="7000"/>
           </a:bodyPr>
           <a:p>
             <a:endParaRPr b="0" lang="en-GB" sz="3200" spc="-1" strike="noStrike">
@@ -2782,7 +2782,7 @@
         </p:spPr>
         <p:txBody>
           <a:bodyPr lIns="0" rIns="0" tIns="0" bIns="0">
-            <a:normAutofit/>
+            <a:normAutofit fontScale="7000"/>
           </a:bodyPr>
           <a:p>
             <a:endParaRPr b="0" lang="en-GB" sz="3200" spc="-1" strike="noStrike">
@@ -2865,7 +2865,7 @@
         </p:spPr>
         <p:txBody>
           <a:bodyPr lIns="0" rIns="0" tIns="0" bIns="0">
-            <a:normAutofit/>
+            <a:normAutofit fontScale="7000"/>
           </a:bodyPr>
           <a:p>
             <a:endParaRPr b="0" lang="en-GB" sz="3200" spc="-1" strike="noStrike">
@@ -2895,7 +2895,7 @@
         </p:spPr>
         <p:txBody>
           <a:bodyPr lIns="0" rIns="0" tIns="0" bIns="0">
-            <a:normAutofit/>
+            <a:normAutofit fontScale="7000"/>
           </a:bodyPr>
           <a:p>
             <a:endParaRPr b="0" lang="en-GB" sz="3200" spc="-1" strike="noStrike">
@@ -2925,7 +2925,7 @@
         </p:spPr>
         <p:txBody>
           <a:bodyPr lIns="0" rIns="0" tIns="0" bIns="0">
-            <a:normAutofit/>
+            <a:normAutofit fontScale="7000"/>
           </a:bodyPr>
           <a:p>
             <a:endParaRPr b="0" lang="en-GB" sz="3200" spc="-1" strike="noStrike">
@@ -3008,7 +3008,7 @@
         </p:spPr>
         <p:txBody>
           <a:bodyPr lIns="0" rIns="0" tIns="0" bIns="0">
-            <a:normAutofit/>
+            <a:normAutofit fontScale="7000"/>
           </a:bodyPr>
           <a:p>
             <a:endParaRPr b="0" lang="en-GB" sz="3200" spc="-1" strike="noStrike">
@@ -3038,7 +3038,7 @@
         </p:spPr>
         <p:txBody>
           <a:bodyPr lIns="0" rIns="0" tIns="0" bIns="0">
-            <a:normAutofit/>
+            <a:normAutofit fontScale="7000"/>
           </a:bodyPr>
           <a:p>
             <a:endParaRPr b="0" lang="en-GB" sz="3200" spc="-1" strike="noStrike">
@@ -3121,7 +3121,7 @@
         </p:spPr>
         <p:txBody>
           <a:bodyPr lIns="0" rIns="0" tIns="0" bIns="0">
-            <a:normAutofit/>
+            <a:normAutofit fontScale="7000"/>
           </a:bodyPr>
           <a:p>
             <a:endParaRPr b="0" lang="en-GB" sz="3200" spc="-1" strike="noStrike">
@@ -3151,7 +3151,7 @@
         </p:spPr>
         <p:txBody>
           <a:bodyPr lIns="0" rIns="0" tIns="0" bIns="0">
-            <a:normAutofit/>
+            <a:normAutofit fontScale="7000"/>
           </a:bodyPr>
           <a:p>
             <a:endParaRPr b="0" lang="en-GB" sz="3200" spc="-1" strike="noStrike">
@@ -3181,7 +3181,7 @@
         </p:spPr>
         <p:txBody>
           <a:bodyPr lIns="0" rIns="0" tIns="0" bIns="0">
-            <a:normAutofit/>
+            <a:normAutofit fontScale="7000"/>
           </a:bodyPr>
           <a:p>
             <a:endParaRPr b="0" lang="en-GB" sz="3200" spc="-1" strike="noStrike">
@@ -3211,7 +3211,7 @@
         </p:spPr>
         <p:txBody>
           <a:bodyPr lIns="0" rIns="0" tIns="0" bIns="0">
-            <a:normAutofit/>
+            <a:normAutofit fontScale="7000"/>
           </a:bodyPr>
           <a:p>
             <a:endParaRPr b="0" lang="en-GB" sz="3200" spc="-1" strike="noStrike">
@@ -3294,7 +3294,7 @@
         </p:spPr>
         <p:txBody>
           <a:bodyPr lIns="0" rIns="0" tIns="0" bIns="0">
-            <a:normAutofit/>
+            <a:normAutofit fontScale="7000"/>
           </a:bodyPr>
           <a:p>
             <a:endParaRPr b="0" lang="en-GB" sz="3200" spc="-1" strike="noStrike">
@@ -3324,7 +3324,7 @@
         </p:spPr>
         <p:txBody>
           <a:bodyPr lIns="0" rIns="0" tIns="0" bIns="0">
-            <a:normAutofit/>
+            <a:normAutofit fontScale="7000"/>
           </a:bodyPr>
           <a:p>
             <a:endParaRPr b="0" lang="en-GB" sz="3200" spc="-1" strike="noStrike">
@@ -3354,7 +3354,7 @@
         </p:spPr>
         <p:txBody>
           <a:bodyPr lIns="0" rIns="0" tIns="0" bIns="0">
-            <a:normAutofit/>
+            <a:normAutofit fontScale="7000"/>
           </a:bodyPr>
           <a:p>
             <a:endParaRPr b="0" lang="en-GB" sz="3200" spc="-1" strike="noStrike">
@@ -3384,7 +3384,7 @@
         </p:spPr>
         <p:txBody>
           <a:bodyPr lIns="0" rIns="0" tIns="0" bIns="0">
-            <a:normAutofit/>
+            <a:normAutofit fontScale="7000"/>
           </a:bodyPr>
           <a:p>
             <a:endParaRPr b="0" lang="en-GB" sz="3200" spc="-1" strike="noStrike">
@@ -3414,7 +3414,7 @@
         </p:spPr>
         <p:txBody>
           <a:bodyPr lIns="0" rIns="0" tIns="0" bIns="0">
-            <a:normAutofit/>
+            <a:normAutofit fontScale="7000"/>
           </a:bodyPr>
           <a:p>
             <a:endParaRPr b="0" lang="en-GB" sz="3200" spc="-1" strike="noStrike">
@@ -3444,7 +3444,7 @@
         </p:spPr>
         <p:txBody>
           <a:bodyPr lIns="0" rIns="0" tIns="0" bIns="0">
-            <a:normAutofit/>
+            <a:normAutofit fontScale="7000"/>
           </a:bodyPr>
           <a:p>
             <a:endParaRPr b="0" lang="en-GB" sz="3200" spc="-1" strike="noStrike">
@@ -3633,7 +3633,7 @@
         </p:spPr>
         <p:txBody>
           <a:bodyPr lIns="0" rIns="0" tIns="0" bIns="0">
-            <a:normAutofit/>
+            <a:normAutofit fontScale="23000"/>
           </a:bodyPr>
           <a:p>
             <a:endParaRPr b="0" lang="en-GB" sz="3200" spc="-1" strike="noStrike">
@@ -3716,7 +3716,7 @@
         </p:spPr>
         <p:txBody>
           <a:bodyPr lIns="0" rIns="0" tIns="0" bIns="0">
-            <a:normAutofit/>
+            <a:normAutofit fontScale="23000"/>
           </a:bodyPr>
           <a:p>
             <a:endParaRPr b="0" lang="en-GB" sz="3200" spc="-1" strike="noStrike">
@@ -3746,7 +3746,7 @@
         </p:spPr>
         <p:txBody>
           <a:bodyPr lIns="0" rIns="0" tIns="0" bIns="0">
-            <a:normAutofit/>
+            <a:normAutofit fontScale="23000"/>
           </a:bodyPr>
           <a:p>
             <a:endParaRPr b="0" lang="en-GB" sz="3200" spc="-1" strike="noStrike">
@@ -3829,7 +3829,7 @@
         </p:spPr>
         <p:txBody>
           <a:bodyPr lIns="0" rIns="0" tIns="0" bIns="0">
-            <a:normAutofit/>
+            <a:normAutofit fontScale="23000"/>
           </a:bodyPr>
           <a:p>
             <a:endParaRPr b="0" lang="en-GB" sz="3200" spc="-1" strike="noStrike">
@@ -3859,7 +3859,7 @@
         </p:spPr>
         <p:txBody>
           <a:bodyPr lIns="0" rIns="0" tIns="0" bIns="0">
-            <a:normAutofit/>
+            <a:normAutofit fontScale="23000"/>
           </a:bodyPr>
           <a:p>
             <a:endParaRPr b="0" lang="en-GB" sz="3200" spc="-1" strike="noStrike">
@@ -4048,7 +4048,7 @@
         </p:spPr>
         <p:txBody>
           <a:bodyPr lIns="0" rIns="0" tIns="0" bIns="0">
-            <a:normAutofit/>
+            <a:normAutofit fontScale="7000"/>
           </a:bodyPr>
           <a:p>
             <a:endParaRPr b="0" lang="en-GB" sz="3200" spc="-1" strike="noStrike">
@@ -4078,7 +4078,7 @@
         </p:spPr>
         <p:txBody>
           <a:bodyPr lIns="0" rIns="0" tIns="0" bIns="0">
-            <a:normAutofit/>
+            <a:normAutofit fontScale="23000"/>
           </a:bodyPr>
           <a:p>
             <a:endParaRPr b="0" lang="en-GB" sz="3200" spc="-1" strike="noStrike">
@@ -4108,7 +4108,7 @@
         </p:spPr>
         <p:txBody>
           <a:bodyPr lIns="0" rIns="0" tIns="0" bIns="0">
-            <a:normAutofit/>
+            <a:normAutofit fontScale="7000"/>
           </a:bodyPr>
           <a:p>
             <a:endParaRPr b="0" lang="en-GB" sz="3200" spc="-1" strike="noStrike">
@@ -4191,7 +4191,7 @@
         </p:spPr>
         <p:txBody>
           <a:bodyPr lIns="0" rIns="0" tIns="0" bIns="0">
-            <a:normAutofit/>
+            <a:normAutofit fontScale="23000"/>
           </a:bodyPr>
           <a:p>
             <a:endParaRPr b="0" lang="en-GB" sz="3200" spc="-1" strike="noStrike">
@@ -4221,7 +4221,7 @@
         </p:spPr>
         <p:txBody>
           <a:bodyPr lIns="0" rIns="0" tIns="0" bIns="0">
-            <a:normAutofit/>
+            <a:normAutofit fontScale="7000"/>
           </a:bodyPr>
           <a:p>
             <a:endParaRPr b="0" lang="en-GB" sz="3200" spc="-1" strike="noStrike">
@@ -4251,7 +4251,7 @@
         </p:spPr>
         <p:txBody>
           <a:bodyPr lIns="0" rIns="0" tIns="0" bIns="0">
-            <a:normAutofit/>
+            <a:normAutofit fontScale="7000"/>
           </a:bodyPr>
           <a:p>
             <a:endParaRPr b="0" lang="en-GB" sz="3200" spc="-1" strike="noStrike">
@@ -4334,7 +4334,7 @@
         </p:spPr>
         <p:txBody>
           <a:bodyPr lIns="0" rIns="0" tIns="0" bIns="0">
-            <a:normAutofit/>
+            <a:normAutofit fontScale="7000"/>
           </a:bodyPr>
           <a:p>
             <a:endParaRPr b="0" lang="en-GB" sz="3200" spc="-1" strike="noStrike">
@@ -4364,7 +4364,7 @@
         </p:spPr>
         <p:txBody>
           <a:bodyPr lIns="0" rIns="0" tIns="0" bIns="0">
-            <a:normAutofit/>
+            <a:normAutofit fontScale="7000"/>
           </a:bodyPr>
           <a:p>
             <a:endParaRPr b="0" lang="en-GB" sz="3200" spc="-1" strike="noStrike">
@@ -4394,7 +4394,7 @@
         </p:spPr>
         <p:txBody>
           <a:bodyPr lIns="0" rIns="0" tIns="0" bIns="0">
-            <a:normAutofit/>
+            <a:normAutofit fontScale="7000"/>
           </a:bodyPr>
           <a:p>
             <a:endParaRPr b="0" lang="en-GB" sz="3200" spc="-1" strike="noStrike">
@@ -4477,7 +4477,7 @@
         </p:spPr>
         <p:txBody>
           <a:bodyPr lIns="0" rIns="0" tIns="0" bIns="0">
-            <a:normAutofit/>
+            <a:normAutofit fontScale="7000"/>
           </a:bodyPr>
           <a:p>
             <a:endParaRPr b="0" lang="en-GB" sz="3200" spc="-1" strike="noStrike">
@@ -4507,7 +4507,7 @@
         </p:spPr>
         <p:txBody>
           <a:bodyPr lIns="0" rIns="0" tIns="0" bIns="0">
-            <a:normAutofit/>
+            <a:normAutofit fontScale="7000"/>
           </a:bodyPr>
           <a:p>
             <a:endParaRPr b="0" lang="en-GB" sz="3200" spc="-1" strike="noStrike">
@@ -4590,7 +4590,7 @@
         </p:spPr>
         <p:txBody>
           <a:bodyPr lIns="0" rIns="0" tIns="0" bIns="0">
-            <a:normAutofit/>
+            <a:normAutofit fontScale="7000"/>
           </a:bodyPr>
           <a:p>
             <a:endParaRPr b="0" lang="en-GB" sz="3200" spc="-1" strike="noStrike">
@@ -4620,7 +4620,7 @@
         </p:spPr>
         <p:txBody>
           <a:bodyPr lIns="0" rIns="0" tIns="0" bIns="0">
-            <a:normAutofit/>
+            <a:normAutofit fontScale="7000"/>
           </a:bodyPr>
           <a:p>
             <a:endParaRPr b="0" lang="en-GB" sz="3200" spc="-1" strike="noStrike">
@@ -4650,7 +4650,7 @@
         </p:spPr>
         <p:txBody>
           <a:bodyPr lIns="0" rIns="0" tIns="0" bIns="0">
-            <a:normAutofit/>
+            <a:normAutofit fontScale="7000"/>
           </a:bodyPr>
           <a:p>
             <a:endParaRPr b="0" lang="en-GB" sz="3200" spc="-1" strike="noStrike">
@@ -4680,7 +4680,7 @@
         </p:spPr>
         <p:txBody>
           <a:bodyPr lIns="0" rIns="0" tIns="0" bIns="0">
-            <a:normAutofit/>
+            <a:normAutofit fontScale="7000"/>
           </a:bodyPr>
           <a:p>
             <a:endParaRPr b="0" lang="en-GB" sz="3200" spc="-1" strike="noStrike">
@@ -4763,7 +4763,7 @@
         </p:spPr>
         <p:txBody>
           <a:bodyPr lIns="0" rIns="0" tIns="0" bIns="0">
-            <a:normAutofit/>
+            <a:normAutofit fontScale="7000"/>
           </a:bodyPr>
           <a:p>
             <a:endParaRPr b="0" lang="en-GB" sz="3200" spc="-1" strike="noStrike">
@@ -4793,7 +4793,7 @@
         </p:spPr>
         <p:txBody>
           <a:bodyPr lIns="0" rIns="0" tIns="0" bIns="0">
-            <a:normAutofit/>
+            <a:normAutofit fontScale="7000"/>
           </a:bodyPr>
           <a:p>
             <a:endParaRPr b="0" lang="en-GB" sz="3200" spc="-1" strike="noStrike">
@@ -4823,7 +4823,7 @@
         </p:spPr>
         <p:txBody>
           <a:bodyPr lIns="0" rIns="0" tIns="0" bIns="0">
-            <a:normAutofit/>
+            <a:normAutofit fontScale="7000"/>
           </a:bodyPr>
           <a:p>
             <a:endParaRPr b="0" lang="en-GB" sz="3200" spc="-1" strike="noStrike">
@@ -4853,7 +4853,7 @@
         </p:spPr>
         <p:txBody>
           <a:bodyPr lIns="0" rIns="0" tIns="0" bIns="0">
-            <a:normAutofit/>
+            <a:normAutofit fontScale="7000"/>
           </a:bodyPr>
           <a:p>
             <a:endParaRPr b="0" lang="en-GB" sz="3200" spc="-1" strike="noStrike">
@@ -4883,7 +4883,7 @@
         </p:spPr>
         <p:txBody>
           <a:bodyPr lIns="0" rIns="0" tIns="0" bIns="0">
-            <a:normAutofit/>
+            <a:normAutofit fontScale="7000"/>
           </a:bodyPr>
           <a:p>
             <a:endParaRPr b="0" lang="en-GB" sz="3200" spc="-1" strike="noStrike">
@@ -4913,7 +4913,7 @@
         </p:spPr>
         <p:txBody>
           <a:bodyPr lIns="0" rIns="0" tIns="0" bIns="0">
-            <a:normAutofit/>
+            <a:normAutofit fontScale="7000"/>
           </a:bodyPr>
           <a:p>
             <a:endParaRPr b="0" lang="en-GB" sz="3200" spc="-1" strike="noStrike">
@@ -5155,7 +5155,7 @@
         </p:spPr>
         <p:txBody>
           <a:bodyPr lIns="0" rIns="0" tIns="0" bIns="0">
-            <a:normAutofit/>
+            <a:normAutofit fontScale="23000"/>
           </a:bodyPr>
           <a:p>
             <a:endParaRPr b="0" lang="en-GB" sz="3200" spc="-1" strike="noStrike">
@@ -5238,7 +5238,7 @@
         </p:spPr>
         <p:txBody>
           <a:bodyPr lIns="0" rIns="0" tIns="0" bIns="0">
-            <a:normAutofit/>
+            <a:normAutofit fontScale="23000"/>
           </a:bodyPr>
           <a:p>
             <a:endParaRPr b="0" lang="en-GB" sz="3200" spc="-1" strike="noStrike">
@@ -5268,7 +5268,7 @@
         </p:spPr>
         <p:txBody>
           <a:bodyPr lIns="0" rIns="0" tIns="0" bIns="0">
-            <a:normAutofit/>
+            <a:normAutofit fontScale="23000"/>
           </a:bodyPr>
           <a:p>
             <a:endParaRPr b="0" lang="en-GB" sz="3200" spc="-1" strike="noStrike">
@@ -5457,7 +5457,7 @@
         </p:spPr>
         <p:txBody>
           <a:bodyPr lIns="0" rIns="0" tIns="0" bIns="0">
-            <a:normAutofit/>
+            <a:normAutofit fontScale="7000"/>
           </a:bodyPr>
           <a:p>
             <a:endParaRPr b="0" lang="en-GB" sz="3200" spc="-1" strike="noStrike">
@@ -5487,7 +5487,7 @@
         </p:spPr>
         <p:txBody>
           <a:bodyPr lIns="0" rIns="0" tIns="0" bIns="0">
-            <a:normAutofit/>
+            <a:normAutofit fontScale="23000"/>
           </a:bodyPr>
           <a:p>
             <a:endParaRPr b="0" lang="en-GB" sz="3200" spc="-1" strike="noStrike">
@@ -5517,7 +5517,7 @@
         </p:spPr>
         <p:txBody>
           <a:bodyPr lIns="0" rIns="0" tIns="0" bIns="0">
-            <a:normAutofit/>
+            <a:normAutofit fontScale="7000"/>
           </a:bodyPr>
           <a:p>
             <a:endParaRPr b="0" lang="en-GB" sz="3200" spc="-1" strike="noStrike">
@@ -5600,7 +5600,7 @@
         </p:spPr>
         <p:txBody>
           <a:bodyPr lIns="0" rIns="0" tIns="0" bIns="0">
-            <a:normAutofit/>
+            <a:normAutofit fontScale="23000"/>
           </a:bodyPr>
           <a:p>
             <a:endParaRPr b="0" lang="en-GB" sz="3200" spc="-1" strike="noStrike">
@@ -5630,7 +5630,7 @@
         </p:spPr>
         <p:txBody>
           <a:bodyPr lIns="0" rIns="0" tIns="0" bIns="0">
-            <a:normAutofit/>
+            <a:normAutofit fontScale="7000"/>
           </a:bodyPr>
           <a:p>
             <a:endParaRPr b="0" lang="en-GB" sz="3200" spc="-1" strike="noStrike">
@@ -5660,7 +5660,7 @@
         </p:spPr>
         <p:txBody>
           <a:bodyPr lIns="0" rIns="0" tIns="0" bIns="0">
-            <a:normAutofit/>
+            <a:normAutofit fontScale="7000"/>
           </a:bodyPr>
           <a:p>
             <a:endParaRPr b="0" lang="en-GB" sz="3200" spc="-1" strike="noStrike">
@@ -5743,7 +5743,7 @@
         </p:spPr>
         <p:txBody>
           <a:bodyPr lIns="0" rIns="0" tIns="0" bIns="0">
-            <a:normAutofit/>
+            <a:normAutofit fontScale="7000"/>
           </a:bodyPr>
           <a:p>
             <a:endParaRPr b="0" lang="en-GB" sz="3200" spc="-1" strike="noStrike">
@@ -5773,7 +5773,7 @@
         </p:spPr>
         <p:txBody>
           <a:bodyPr lIns="0" rIns="0" tIns="0" bIns="0">
-            <a:normAutofit/>
+            <a:normAutofit fontScale="7000"/>
           </a:bodyPr>
           <a:p>
             <a:endParaRPr b="0" lang="en-GB" sz="3200" spc="-1" strike="noStrike">
@@ -5803,7 +5803,7 @@
         </p:spPr>
         <p:txBody>
           <a:bodyPr lIns="0" rIns="0" tIns="0" bIns="0">
-            <a:normAutofit/>
+            <a:normAutofit fontScale="7000"/>
           </a:bodyPr>
           <a:p>
             <a:endParaRPr b="0" lang="en-GB" sz="3200" spc="-1" strike="noStrike">
@@ -5886,7 +5886,7 @@
         </p:spPr>
         <p:txBody>
           <a:bodyPr lIns="0" rIns="0" tIns="0" bIns="0">
-            <a:normAutofit/>
+            <a:normAutofit fontScale="7000"/>
           </a:bodyPr>
           <a:p>
             <a:endParaRPr b="0" lang="en-GB" sz="3200" spc="-1" strike="noStrike">
@@ -5916,7 +5916,7 @@
         </p:spPr>
         <p:txBody>
           <a:bodyPr lIns="0" rIns="0" tIns="0" bIns="0">
-            <a:normAutofit/>
+            <a:normAutofit fontScale="7000"/>
           </a:bodyPr>
           <a:p>
             <a:endParaRPr b="0" lang="en-GB" sz="3200" spc="-1" strike="noStrike">
@@ -5999,7 +5999,7 @@
         </p:spPr>
         <p:txBody>
           <a:bodyPr lIns="0" rIns="0" tIns="0" bIns="0">
-            <a:normAutofit/>
+            <a:normAutofit fontScale="7000"/>
           </a:bodyPr>
           <a:p>
             <a:endParaRPr b="0" lang="en-GB" sz="3200" spc="-1" strike="noStrike">
@@ -6029,7 +6029,7 @@
         </p:spPr>
         <p:txBody>
           <a:bodyPr lIns="0" rIns="0" tIns="0" bIns="0">
-            <a:normAutofit/>
+            <a:normAutofit fontScale="7000"/>
           </a:bodyPr>
           <a:p>
             <a:endParaRPr b="0" lang="en-GB" sz="3200" spc="-1" strike="noStrike">
@@ -6059,7 +6059,7 @@
         </p:spPr>
         <p:txBody>
           <a:bodyPr lIns="0" rIns="0" tIns="0" bIns="0">
-            <a:normAutofit/>
+            <a:normAutofit fontScale="7000"/>
           </a:bodyPr>
           <a:p>
             <a:endParaRPr b="0" lang="en-GB" sz="3200" spc="-1" strike="noStrike">
@@ -6089,7 +6089,7 @@
         </p:spPr>
         <p:txBody>
           <a:bodyPr lIns="0" rIns="0" tIns="0" bIns="0">
-            <a:normAutofit/>
+            <a:normAutofit fontScale="7000"/>
           </a:bodyPr>
           <a:p>
             <a:endParaRPr b="0" lang="en-GB" sz="3200" spc="-1" strike="noStrike">
@@ -6225,7 +6225,7 @@
         </p:spPr>
         <p:txBody>
           <a:bodyPr lIns="0" rIns="0" tIns="0" bIns="0">
-            <a:normAutofit/>
+            <a:normAutofit fontScale="7000"/>
           </a:bodyPr>
           <a:p>
             <a:endParaRPr b="0" lang="en-GB" sz="3200" spc="-1" strike="noStrike">
@@ -6255,7 +6255,7 @@
         </p:spPr>
         <p:txBody>
           <a:bodyPr lIns="0" rIns="0" tIns="0" bIns="0">
-            <a:normAutofit/>
+            <a:normAutofit fontScale="7000"/>
           </a:bodyPr>
           <a:p>
             <a:endParaRPr b="0" lang="en-GB" sz="3200" spc="-1" strike="noStrike">
@@ -6285,7 +6285,7 @@
         </p:spPr>
         <p:txBody>
           <a:bodyPr lIns="0" rIns="0" tIns="0" bIns="0">
-            <a:normAutofit/>
+            <a:normAutofit fontScale="7000"/>
           </a:bodyPr>
           <a:p>
             <a:endParaRPr b="0" lang="en-GB" sz="3200" spc="-1" strike="noStrike">
@@ -6315,7 +6315,7 @@
         </p:spPr>
         <p:txBody>
           <a:bodyPr lIns="0" rIns="0" tIns="0" bIns="0">
-            <a:normAutofit/>
+            <a:normAutofit fontScale="7000"/>
           </a:bodyPr>
           <a:p>
             <a:endParaRPr b="0" lang="en-GB" sz="3200" spc="-1" strike="noStrike">
@@ -6345,7 +6345,7 @@
         </p:spPr>
         <p:txBody>
           <a:bodyPr lIns="0" rIns="0" tIns="0" bIns="0">
-            <a:normAutofit/>
+            <a:normAutofit fontScale="7000"/>
           </a:bodyPr>
           <a:p>
             <a:endParaRPr b="0" lang="en-GB" sz="3200" spc="-1" strike="noStrike">
@@ -6375,7 +6375,7 @@
         </p:spPr>
         <p:txBody>
           <a:bodyPr lIns="0" rIns="0" tIns="0" bIns="0">
-            <a:normAutofit/>
+            <a:normAutofit fontScale="7000"/>
           </a:bodyPr>
           <a:p>
             <a:endParaRPr b="0" lang="en-GB" sz="3200" spc="-1" strike="noStrike">
@@ -6564,7 +6564,7 @@
         </p:spPr>
         <p:txBody>
           <a:bodyPr lIns="0" rIns="0" tIns="0" bIns="0">
-            <a:normAutofit/>
+            <a:normAutofit fontScale="23000"/>
           </a:bodyPr>
           <a:p>
             <a:endParaRPr b="0" lang="en-GB" sz="3200" spc="-1" strike="noStrike">
@@ -6647,7 +6647,7 @@
         </p:spPr>
         <p:txBody>
           <a:bodyPr lIns="0" rIns="0" tIns="0" bIns="0">
-            <a:normAutofit/>
+            <a:normAutofit fontScale="23000"/>
           </a:bodyPr>
           <a:p>
             <a:endParaRPr b="0" lang="en-GB" sz="3200" spc="-1" strike="noStrike">
@@ -6677,7 +6677,7 @@
         </p:spPr>
         <p:txBody>
           <a:bodyPr lIns="0" rIns="0" tIns="0" bIns="0">
-            <a:normAutofit/>
+            <a:normAutofit fontScale="23000"/>
           </a:bodyPr>
           <a:p>
             <a:endParaRPr b="0" lang="en-GB" sz="3200" spc="-1" strike="noStrike">
@@ -6866,7 +6866,7 @@
         </p:spPr>
         <p:txBody>
           <a:bodyPr lIns="0" rIns="0" tIns="0" bIns="0">
-            <a:normAutofit/>
+            <a:normAutofit fontScale="7000"/>
           </a:bodyPr>
           <a:p>
             <a:endParaRPr b="0" lang="en-GB" sz="3200" spc="-1" strike="noStrike">
@@ -6896,7 +6896,7 @@
         </p:spPr>
         <p:txBody>
           <a:bodyPr lIns="0" rIns="0" tIns="0" bIns="0">
-            <a:normAutofit/>
+            <a:normAutofit fontScale="23000"/>
           </a:bodyPr>
           <a:p>
             <a:endParaRPr b="0" lang="en-GB" sz="3200" spc="-1" strike="noStrike">
@@ -6926,7 +6926,7 @@
         </p:spPr>
         <p:txBody>
           <a:bodyPr lIns="0" rIns="0" tIns="0" bIns="0">
-            <a:normAutofit/>
+            <a:normAutofit fontScale="7000"/>
           </a:bodyPr>
           <a:p>
             <a:endParaRPr b="0" lang="en-GB" sz="3200" spc="-1" strike="noStrike">
@@ -7009,7 +7009,7 @@
         </p:spPr>
         <p:txBody>
           <a:bodyPr lIns="0" rIns="0" tIns="0" bIns="0">
-            <a:normAutofit/>
+            <a:normAutofit fontScale="23000"/>
           </a:bodyPr>
           <a:p>
             <a:endParaRPr b="0" lang="en-GB" sz="3200" spc="-1" strike="noStrike">
@@ -7039,7 +7039,7 @@
         </p:spPr>
         <p:txBody>
           <a:bodyPr lIns="0" rIns="0" tIns="0" bIns="0">
-            <a:normAutofit/>
+            <a:normAutofit fontScale="7000"/>
           </a:bodyPr>
           <a:p>
             <a:endParaRPr b="0" lang="en-GB" sz="3200" spc="-1" strike="noStrike">
@@ -7069,7 +7069,7 @@
         </p:spPr>
         <p:txBody>
           <a:bodyPr lIns="0" rIns="0" tIns="0" bIns="0">
-            <a:normAutofit/>
+            <a:normAutofit fontScale="7000"/>
           </a:bodyPr>
           <a:p>
             <a:endParaRPr b="0" lang="en-GB" sz="3200" spc="-1" strike="noStrike">
@@ -7152,7 +7152,7 @@
         </p:spPr>
         <p:txBody>
           <a:bodyPr lIns="0" rIns="0" tIns="0" bIns="0">
-            <a:normAutofit/>
+            <a:normAutofit fontScale="7000"/>
           </a:bodyPr>
           <a:p>
             <a:endParaRPr b="0" lang="en-GB" sz="3200" spc="-1" strike="noStrike">
@@ -7182,7 +7182,7 @@
         </p:spPr>
         <p:txBody>
           <a:bodyPr lIns="0" rIns="0" tIns="0" bIns="0">
-            <a:normAutofit/>
+            <a:normAutofit fontScale="7000"/>
           </a:bodyPr>
           <a:p>
             <a:endParaRPr b="0" lang="en-GB" sz="3200" spc="-1" strike="noStrike">
@@ -7212,7 +7212,7 @@
         </p:spPr>
         <p:txBody>
           <a:bodyPr lIns="0" rIns="0" tIns="0" bIns="0">
-            <a:normAutofit/>
+            <a:normAutofit fontScale="7000"/>
           </a:bodyPr>
           <a:p>
             <a:endParaRPr b="0" lang="en-GB" sz="3200" spc="-1" strike="noStrike">
@@ -7295,7 +7295,7 @@
         </p:spPr>
         <p:txBody>
           <a:bodyPr lIns="0" rIns="0" tIns="0" bIns="0">
-            <a:normAutofit/>
+            <a:normAutofit fontScale="7000"/>
           </a:bodyPr>
           <a:p>
             <a:endParaRPr b="0" lang="en-GB" sz="3200" spc="-1" strike="noStrike">
@@ -7325,7 +7325,7 @@
         </p:spPr>
         <p:txBody>
           <a:bodyPr lIns="0" rIns="0" tIns="0" bIns="0">
-            <a:normAutofit/>
+            <a:normAutofit fontScale="23000"/>
           </a:bodyPr>
           <a:p>
             <a:endParaRPr b="0" lang="en-GB" sz="3200" spc="-1" strike="noStrike">
@@ -7355,7 +7355,7 @@
         </p:spPr>
         <p:txBody>
           <a:bodyPr lIns="0" rIns="0" tIns="0" bIns="0">
-            <a:normAutofit/>
+            <a:normAutofit fontScale="7000"/>
           </a:bodyPr>
           <a:p>
             <a:endParaRPr b="0" lang="en-GB" sz="3200" spc="-1" strike="noStrike">
@@ -7438,7 +7438,7 @@
         </p:spPr>
         <p:txBody>
           <a:bodyPr lIns="0" rIns="0" tIns="0" bIns="0">
-            <a:normAutofit/>
+            <a:normAutofit fontScale="7000"/>
           </a:bodyPr>
           <a:p>
             <a:endParaRPr b="0" lang="en-GB" sz="3200" spc="-1" strike="noStrike">
@@ -7468,7 +7468,7 @@
         </p:spPr>
         <p:txBody>
           <a:bodyPr lIns="0" rIns="0" tIns="0" bIns="0">
-            <a:normAutofit/>
+            <a:normAutofit fontScale="7000"/>
           </a:bodyPr>
           <a:p>
             <a:endParaRPr b="0" lang="en-GB" sz="3200" spc="-1" strike="noStrike">
@@ -7551,7 +7551,7 @@
         </p:spPr>
         <p:txBody>
           <a:bodyPr lIns="0" rIns="0" tIns="0" bIns="0">
-            <a:normAutofit/>
+            <a:normAutofit fontScale="7000"/>
           </a:bodyPr>
           <a:p>
             <a:endParaRPr b="0" lang="en-GB" sz="3200" spc="-1" strike="noStrike">
@@ -7581,7 +7581,7 @@
         </p:spPr>
         <p:txBody>
           <a:bodyPr lIns="0" rIns="0" tIns="0" bIns="0">
-            <a:normAutofit/>
+            <a:normAutofit fontScale="7000"/>
           </a:bodyPr>
           <a:p>
             <a:endParaRPr b="0" lang="en-GB" sz="3200" spc="-1" strike="noStrike">
@@ -7611,7 +7611,7 @@
         </p:spPr>
         <p:txBody>
           <a:bodyPr lIns="0" rIns="0" tIns="0" bIns="0">
-            <a:normAutofit/>
+            <a:normAutofit fontScale="7000"/>
           </a:bodyPr>
           <a:p>
             <a:endParaRPr b="0" lang="en-GB" sz="3200" spc="-1" strike="noStrike">
@@ -7641,7 +7641,7 @@
         </p:spPr>
         <p:txBody>
           <a:bodyPr lIns="0" rIns="0" tIns="0" bIns="0">
-            <a:normAutofit/>
+            <a:normAutofit fontScale="7000"/>
           </a:bodyPr>
           <a:p>
             <a:endParaRPr b="0" lang="en-GB" sz="3200" spc="-1" strike="noStrike">
@@ -7724,7 +7724,7 @@
         </p:spPr>
         <p:txBody>
           <a:bodyPr lIns="0" rIns="0" tIns="0" bIns="0">
-            <a:normAutofit/>
+            <a:normAutofit fontScale="7000"/>
           </a:bodyPr>
           <a:p>
             <a:endParaRPr b="0" lang="en-GB" sz="3200" spc="-1" strike="noStrike">
@@ -7754,7 +7754,7 @@
         </p:spPr>
         <p:txBody>
           <a:bodyPr lIns="0" rIns="0" tIns="0" bIns="0">
-            <a:normAutofit/>
+            <a:normAutofit fontScale="7000"/>
           </a:bodyPr>
           <a:p>
             <a:endParaRPr b="0" lang="en-GB" sz="3200" spc="-1" strike="noStrike">
@@ -7784,7 +7784,7 @@
         </p:spPr>
         <p:txBody>
           <a:bodyPr lIns="0" rIns="0" tIns="0" bIns="0">
-            <a:normAutofit/>
+            <a:normAutofit fontScale="7000"/>
           </a:bodyPr>
           <a:p>
             <a:endParaRPr b="0" lang="en-GB" sz="3200" spc="-1" strike="noStrike">
@@ -7814,7 +7814,7 @@
         </p:spPr>
         <p:txBody>
           <a:bodyPr lIns="0" rIns="0" tIns="0" bIns="0">
-            <a:normAutofit/>
+            <a:normAutofit fontScale="7000"/>
           </a:bodyPr>
           <a:p>
             <a:endParaRPr b="0" lang="en-GB" sz="3200" spc="-1" strike="noStrike">
@@ -7844,7 +7844,7 @@
         </p:spPr>
         <p:txBody>
           <a:bodyPr lIns="0" rIns="0" tIns="0" bIns="0">
-            <a:normAutofit/>
+            <a:normAutofit fontScale="7000"/>
           </a:bodyPr>
           <a:p>
             <a:endParaRPr b="0" lang="en-GB" sz="3200" spc="-1" strike="noStrike">
@@ -7874,7 +7874,7 @@
         </p:spPr>
         <p:txBody>
           <a:bodyPr lIns="0" rIns="0" tIns="0" bIns="0">
-            <a:normAutofit/>
+            <a:normAutofit fontScale="7000"/>
           </a:bodyPr>
           <a:p>
             <a:endParaRPr b="0" lang="en-GB" sz="3200" spc="-1" strike="noStrike">
@@ -8063,7 +8063,7 @@
         </p:spPr>
         <p:txBody>
           <a:bodyPr lIns="0" rIns="0" tIns="0" bIns="0">
-            <a:normAutofit/>
+            <a:normAutofit fontScale="23000"/>
           </a:bodyPr>
           <a:p>
             <a:endParaRPr b="0" lang="en-GB" sz="3200" spc="-1" strike="noStrike">
@@ -8146,7 +8146,7 @@
         </p:spPr>
         <p:txBody>
           <a:bodyPr lIns="0" rIns="0" tIns="0" bIns="0">
-            <a:normAutofit/>
+            <a:normAutofit fontScale="23000"/>
           </a:bodyPr>
           <a:p>
             <a:endParaRPr b="0" lang="en-GB" sz="3200" spc="-1" strike="noStrike">
@@ -8176,7 +8176,7 @@
         </p:spPr>
         <p:txBody>
           <a:bodyPr lIns="0" rIns="0" tIns="0" bIns="0">
-            <a:normAutofit/>
+            <a:normAutofit fontScale="23000"/>
           </a:bodyPr>
           <a:p>
             <a:endParaRPr b="0" lang="en-GB" sz="3200" spc="-1" strike="noStrike">
@@ -8365,7 +8365,7 @@
         </p:spPr>
         <p:txBody>
           <a:bodyPr lIns="0" rIns="0" tIns="0" bIns="0">
-            <a:normAutofit/>
+            <a:normAutofit fontScale="7000"/>
           </a:bodyPr>
           <a:p>
             <a:endParaRPr b="0" lang="en-GB" sz="3200" spc="-1" strike="noStrike">
@@ -8395,7 +8395,7 @@
         </p:spPr>
         <p:txBody>
           <a:bodyPr lIns="0" rIns="0" tIns="0" bIns="0">
-            <a:normAutofit/>
+            <a:normAutofit fontScale="23000"/>
           </a:bodyPr>
           <a:p>
             <a:endParaRPr b="0" lang="en-GB" sz="3200" spc="-1" strike="noStrike">
@@ -8425,7 +8425,7 @@
         </p:spPr>
         <p:txBody>
           <a:bodyPr lIns="0" rIns="0" tIns="0" bIns="0">
-            <a:normAutofit/>
+            <a:normAutofit fontScale="7000"/>
           </a:bodyPr>
           <a:p>
             <a:endParaRPr b="0" lang="en-GB" sz="3200" spc="-1" strike="noStrike">
@@ -8508,7 +8508,7 @@
         </p:spPr>
         <p:txBody>
           <a:bodyPr lIns="0" rIns="0" tIns="0" bIns="0">
-            <a:normAutofit/>
+            <a:normAutofit fontScale="23000"/>
           </a:bodyPr>
           <a:p>
             <a:endParaRPr b="0" lang="en-GB" sz="3200" spc="-1" strike="noStrike">
@@ -8538,7 +8538,7 @@
         </p:spPr>
         <p:txBody>
           <a:bodyPr lIns="0" rIns="0" tIns="0" bIns="0">
-            <a:normAutofit/>
+            <a:normAutofit fontScale="7000"/>
           </a:bodyPr>
           <a:p>
             <a:endParaRPr b="0" lang="en-GB" sz="3200" spc="-1" strike="noStrike">
@@ -8568,7 +8568,7 @@
         </p:spPr>
         <p:txBody>
           <a:bodyPr lIns="0" rIns="0" tIns="0" bIns="0">
-            <a:normAutofit/>
+            <a:normAutofit fontScale="7000"/>
           </a:bodyPr>
           <a:p>
             <a:endParaRPr b="0" lang="en-GB" sz="3200" spc="-1" strike="noStrike">
@@ -8651,7 +8651,7 @@
         </p:spPr>
         <p:txBody>
           <a:bodyPr lIns="0" rIns="0" tIns="0" bIns="0">
-            <a:normAutofit/>
+            <a:normAutofit fontScale="23000"/>
           </a:bodyPr>
           <a:p>
             <a:endParaRPr b="0" lang="en-GB" sz="3200" spc="-1" strike="noStrike">
@@ -8681,7 +8681,7 @@
         </p:spPr>
         <p:txBody>
           <a:bodyPr lIns="0" rIns="0" tIns="0" bIns="0">
-            <a:normAutofit/>
+            <a:normAutofit fontScale="7000"/>
           </a:bodyPr>
           <a:p>
             <a:endParaRPr b="0" lang="en-GB" sz="3200" spc="-1" strike="noStrike">
@@ -8711,7 +8711,7 @@
         </p:spPr>
         <p:txBody>
           <a:bodyPr lIns="0" rIns="0" tIns="0" bIns="0">
-            <a:normAutofit/>
+            <a:normAutofit fontScale="7000"/>
           </a:bodyPr>
           <a:p>
             <a:endParaRPr b="0" lang="en-GB" sz="3200" spc="-1" strike="noStrike">
@@ -8794,7 +8794,7 @@
         </p:spPr>
         <p:txBody>
           <a:bodyPr lIns="0" rIns="0" tIns="0" bIns="0">
-            <a:normAutofit/>
+            <a:normAutofit fontScale="7000"/>
           </a:bodyPr>
           <a:p>
             <a:endParaRPr b="0" lang="en-GB" sz="3200" spc="-1" strike="noStrike">
@@ -8824,7 +8824,7 @@
         </p:spPr>
         <p:txBody>
           <a:bodyPr lIns="0" rIns="0" tIns="0" bIns="0">
-            <a:normAutofit/>
+            <a:normAutofit fontScale="7000"/>
           </a:bodyPr>
           <a:p>
             <a:endParaRPr b="0" lang="en-GB" sz="3200" spc="-1" strike="noStrike">
@@ -8854,7 +8854,7 @@
         </p:spPr>
         <p:txBody>
           <a:bodyPr lIns="0" rIns="0" tIns="0" bIns="0">
-            <a:normAutofit/>
+            <a:normAutofit fontScale="7000"/>
           </a:bodyPr>
           <a:p>
             <a:endParaRPr b="0" lang="en-GB" sz="3200" spc="-1" strike="noStrike">
@@ -8937,7 +8937,7 @@
         </p:spPr>
         <p:txBody>
           <a:bodyPr lIns="0" rIns="0" tIns="0" bIns="0">
-            <a:normAutofit/>
+            <a:normAutofit fontScale="7000"/>
           </a:bodyPr>
           <a:p>
             <a:endParaRPr b="0" lang="en-GB" sz="3200" spc="-1" strike="noStrike">
@@ -8967,7 +8967,7 @@
         </p:spPr>
         <p:txBody>
           <a:bodyPr lIns="0" rIns="0" tIns="0" bIns="0">
-            <a:normAutofit/>
+            <a:normAutofit fontScale="7000"/>
           </a:bodyPr>
           <a:p>
             <a:endParaRPr b="0" lang="en-GB" sz="3200" spc="-1" strike="noStrike">
@@ -9050,7 +9050,7 @@
         </p:spPr>
         <p:txBody>
           <a:bodyPr lIns="0" rIns="0" tIns="0" bIns="0">
-            <a:normAutofit/>
+            <a:normAutofit fontScale="7000"/>
           </a:bodyPr>
           <a:p>
             <a:endParaRPr b="0" lang="en-GB" sz="3200" spc="-1" strike="noStrike">
@@ -9080,7 +9080,7 @@
         </p:spPr>
         <p:txBody>
           <a:bodyPr lIns="0" rIns="0" tIns="0" bIns="0">
-            <a:normAutofit/>
+            <a:normAutofit fontScale="7000"/>
           </a:bodyPr>
           <a:p>
             <a:endParaRPr b="0" lang="en-GB" sz="3200" spc="-1" strike="noStrike">
@@ -9110,7 +9110,7 @@
         </p:spPr>
         <p:txBody>
           <a:bodyPr lIns="0" rIns="0" tIns="0" bIns="0">
-            <a:normAutofit/>
+            <a:normAutofit fontScale="7000"/>
           </a:bodyPr>
           <a:p>
             <a:endParaRPr b="0" lang="en-GB" sz="3200" spc="-1" strike="noStrike">
@@ -9140,7 +9140,7 @@
         </p:spPr>
         <p:txBody>
           <a:bodyPr lIns="0" rIns="0" tIns="0" bIns="0">
-            <a:normAutofit/>
+            <a:normAutofit fontScale="7000"/>
           </a:bodyPr>
           <a:p>
             <a:endParaRPr b="0" lang="en-GB" sz="3200" spc="-1" strike="noStrike">
@@ -9223,7 +9223,7 @@
         </p:spPr>
         <p:txBody>
           <a:bodyPr lIns="0" rIns="0" tIns="0" bIns="0">
-            <a:normAutofit/>
+            <a:normAutofit fontScale="7000"/>
           </a:bodyPr>
           <a:p>
             <a:endParaRPr b="0" lang="en-GB" sz="3200" spc="-1" strike="noStrike">
@@ -9253,7 +9253,7 @@
         </p:spPr>
         <p:txBody>
           <a:bodyPr lIns="0" rIns="0" tIns="0" bIns="0">
-            <a:normAutofit/>
+            <a:normAutofit fontScale="7000"/>
           </a:bodyPr>
           <a:p>
             <a:endParaRPr b="0" lang="en-GB" sz="3200" spc="-1" strike="noStrike">
@@ -9283,7 +9283,7 @@
         </p:spPr>
         <p:txBody>
           <a:bodyPr lIns="0" rIns="0" tIns="0" bIns="0">
-            <a:normAutofit/>
+            <a:normAutofit fontScale="7000"/>
           </a:bodyPr>
           <a:p>
             <a:endParaRPr b="0" lang="en-GB" sz="3200" spc="-1" strike="noStrike">
@@ -9313,7 +9313,7 @@
         </p:spPr>
         <p:txBody>
           <a:bodyPr lIns="0" rIns="0" tIns="0" bIns="0">
-            <a:normAutofit/>
+            <a:normAutofit fontScale="7000"/>
           </a:bodyPr>
           <a:p>
             <a:endParaRPr b="0" lang="en-GB" sz="3200" spc="-1" strike="noStrike">
@@ -9343,7 +9343,7 @@
         </p:spPr>
         <p:txBody>
           <a:bodyPr lIns="0" rIns="0" tIns="0" bIns="0">
-            <a:normAutofit/>
+            <a:normAutofit fontScale="7000"/>
           </a:bodyPr>
           <a:p>
             <a:endParaRPr b="0" lang="en-GB" sz="3200" spc="-1" strike="noStrike">
@@ -9373,7 +9373,7 @@
         </p:spPr>
         <p:txBody>
           <a:bodyPr lIns="0" rIns="0" tIns="0" bIns="0">
-            <a:normAutofit/>
+            <a:normAutofit fontScale="7000"/>
           </a:bodyPr>
           <a:p>
             <a:endParaRPr b="0" lang="en-GB" sz="3200" spc="-1" strike="noStrike">
@@ -9562,7 +9562,7 @@
         </p:spPr>
         <p:txBody>
           <a:bodyPr lIns="0" rIns="0" tIns="0" bIns="0">
-            <a:normAutofit/>
+            <a:normAutofit fontScale="23000"/>
           </a:bodyPr>
           <a:p>
             <a:endParaRPr b="0" lang="en-GB" sz="3200" spc="-1" strike="noStrike">
@@ -9645,7 +9645,7 @@
         </p:spPr>
         <p:txBody>
           <a:bodyPr lIns="0" rIns="0" tIns="0" bIns="0">
-            <a:normAutofit/>
+            <a:normAutofit fontScale="23000"/>
           </a:bodyPr>
           <a:p>
             <a:endParaRPr b="0" lang="en-GB" sz="3200" spc="-1" strike="noStrike">
@@ -9675,7 +9675,7 @@
         </p:spPr>
         <p:txBody>
           <a:bodyPr lIns="0" rIns="0" tIns="0" bIns="0">
-            <a:normAutofit/>
+            <a:normAutofit fontScale="23000"/>
           </a:bodyPr>
           <a:p>
             <a:endParaRPr b="0" lang="en-GB" sz="3200" spc="-1" strike="noStrike">
@@ -9811,7 +9811,7 @@
         </p:spPr>
         <p:txBody>
           <a:bodyPr lIns="0" rIns="0" tIns="0" bIns="0">
-            <a:normAutofit/>
+            <a:normAutofit fontScale="7000"/>
           </a:bodyPr>
           <a:p>
             <a:endParaRPr b="0" lang="en-GB" sz="3200" spc="-1" strike="noStrike">
@@ -9841,7 +9841,7 @@
         </p:spPr>
         <p:txBody>
           <a:bodyPr lIns="0" rIns="0" tIns="0" bIns="0">
-            <a:normAutofit/>
+            <a:normAutofit fontScale="7000"/>
           </a:bodyPr>
           <a:p>
             <a:endParaRPr b="0" lang="en-GB" sz="3200" spc="-1" strike="noStrike">
@@ -9871,7 +9871,7 @@
         </p:spPr>
         <p:txBody>
           <a:bodyPr lIns="0" rIns="0" tIns="0" bIns="0">
-            <a:normAutofit/>
+            <a:normAutofit fontScale="7000"/>
           </a:bodyPr>
           <a:p>
             <a:endParaRPr b="0" lang="en-GB" sz="3200" spc="-1" strike="noStrike">
@@ -10007,7 +10007,7 @@
         </p:spPr>
         <p:txBody>
           <a:bodyPr lIns="0" rIns="0" tIns="0" bIns="0">
-            <a:normAutofit/>
+            <a:normAutofit fontScale="7000"/>
           </a:bodyPr>
           <a:p>
             <a:endParaRPr b="0" lang="en-GB" sz="3200" spc="-1" strike="noStrike">
@@ -10037,7 +10037,7 @@
         </p:spPr>
         <p:txBody>
           <a:bodyPr lIns="0" rIns="0" tIns="0" bIns="0">
-            <a:normAutofit/>
+            <a:normAutofit fontScale="23000"/>
           </a:bodyPr>
           <a:p>
             <a:endParaRPr b="0" lang="en-GB" sz="3200" spc="-1" strike="noStrike">
@@ -10067,7 +10067,7 @@
         </p:spPr>
         <p:txBody>
           <a:bodyPr lIns="0" rIns="0" tIns="0" bIns="0">
-            <a:normAutofit/>
+            <a:normAutofit fontScale="7000"/>
           </a:bodyPr>
           <a:p>
             <a:endParaRPr b="0" lang="en-GB" sz="3200" spc="-1" strike="noStrike">
@@ -10150,7 +10150,7 @@
         </p:spPr>
         <p:txBody>
           <a:bodyPr lIns="0" rIns="0" tIns="0" bIns="0">
-            <a:normAutofit/>
+            <a:normAutofit fontScale="23000"/>
           </a:bodyPr>
           <a:p>
             <a:endParaRPr b="0" lang="en-GB" sz="3200" spc="-1" strike="noStrike">
@@ -10180,7 +10180,7 @@
         </p:spPr>
         <p:txBody>
           <a:bodyPr lIns="0" rIns="0" tIns="0" bIns="0">
-            <a:normAutofit/>
+            <a:normAutofit fontScale="7000"/>
           </a:bodyPr>
           <a:p>
             <a:endParaRPr b="0" lang="en-GB" sz="3200" spc="-1" strike="noStrike">
@@ -10210,7 +10210,7 @@
         </p:spPr>
         <p:txBody>
           <a:bodyPr lIns="0" rIns="0" tIns="0" bIns="0">
-            <a:normAutofit/>
+            <a:normAutofit fontScale="7000"/>
           </a:bodyPr>
           <a:p>
             <a:endParaRPr b="0" lang="en-GB" sz="3200" spc="-1" strike="noStrike">
@@ -10293,7 +10293,7 @@
         </p:spPr>
         <p:txBody>
           <a:bodyPr lIns="0" rIns="0" tIns="0" bIns="0">
-            <a:normAutofit/>
+            <a:normAutofit fontScale="7000"/>
           </a:bodyPr>
           <a:p>
             <a:endParaRPr b="0" lang="en-GB" sz="3200" spc="-1" strike="noStrike">
@@ -10323,7 +10323,7 @@
         </p:spPr>
         <p:txBody>
           <a:bodyPr lIns="0" rIns="0" tIns="0" bIns="0">
-            <a:normAutofit/>
+            <a:normAutofit fontScale="7000"/>
           </a:bodyPr>
           <a:p>
             <a:endParaRPr b="0" lang="en-GB" sz="3200" spc="-1" strike="noStrike">
@@ -10353,7 +10353,7 @@
         </p:spPr>
         <p:txBody>
           <a:bodyPr lIns="0" rIns="0" tIns="0" bIns="0">
-            <a:normAutofit/>
+            <a:normAutofit fontScale="7000"/>
           </a:bodyPr>
           <a:p>
             <a:endParaRPr b="0" lang="en-GB" sz="3200" spc="-1" strike="noStrike">
@@ -10436,7 +10436,7 @@
         </p:spPr>
         <p:txBody>
           <a:bodyPr lIns="0" rIns="0" tIns="0" bIns="0">
-            <a:normAutofit/>
+            <a:normAutofit fontScale="7000"/>
           </a:bodyPr>
           <a:p>
             <a:endParaRPr b="0" lang="en-GB" sz="3200" spc="-1" strike="noStrike">
@@ -10466,7 +10466,7 @@
         </p:spPr>
         <p:txBody>
           <a:bodyPr lIns="0" rIns="0" tIns="0" bIns="0">
-            <a:normAutofit/>
+            <a:normAutofit fontScale="7000"/>
           </a:bodyPr>
           <a:p>
             <a:endParaRPr b="0" lang="en-GB" sz="3200" spc="-1" strike="noStrike">
@@ -10549,7 +10549,7 @@
         </p:spPr>
         <p:txBody>
           <a:bodyPr lIns="0" rIns="0" tIns="0" bIns="0">
-            <a:normAutofit/>
+            <a:normAutofit fontScale="7000"/>
           </a:bodyPr>
           <a:p>
             <a:endParaRPr b="0" lang="en-GB" sz="3200" spc="-1" strike="noStrike">
@@ -10579,7 +10579,7 @@
         </p:spPr>
         <p:txBody>
           <a:bodyPr lIns="0" rIns="0" tIns="0" bIns="0">
-            <a:normAutofit/>
+            <a:normAutofit fontScale="7000"/>
           </a:bodyPr>
           <a:p>
             <a:endParaRPr b="0" lang="en-GB" sz="3200" spc="-1" strike="noStrike">
@@ -10609,7 +10609,7 @@
         </p:spPr>
         <p:txBody>
           <a:bodyPr lIns="0" rIns="0" tIns="0" bIns="0">
-            <a:normAutofit/>
+            <a:normAutofit fontScale="7000"/>
           </a:bodyPr>
           <a:p>
             <a:endParaRPr b="0" lang="en-GB" sz="3200" spc="-1" strike="noStrike">
@@ -10639,7 +10639,7 @@
         </p:spPr>
         <p:txBody>
           <a:bodyPr lIns="0" rIns="0" tIns="0" bIns="0">
-            <a:normAutofit/>
+            <a:normAutofit fontScale="7000"/>
           </a:bodyPr>
           <a:p>
             <a:endParaRPr b="0" lang="en-GB" sz="3200" spc="-1" strike="noStrike">
@@ -10722,7 +10722,7 @@
         </p:spPr>
         <p:txBody>
           <a:bodyPr lIns="0" rIns="0" tIns="0" bIns="0">
-            <a:normAutofit/>
+            <a:normAutofit fontScale="7000"/>
           </a:bodyPr>
           <a:p>
             <a:endParaRPr b="0" lang="en-GB" sz="3200" spc="-1" strike="noStrike">
@@ -10752,7 +10752,7 @@
         </p:spPr>
         <p:txBody>
           <a:bodyPr lIns="0" rIns="0" tIns="0" bIns="0">
-            <a:normAutofit/>
+            <a:normAutofit fontScale="7000"/>
           </a:bodyPr>
           <a:p>
             <a:endParaRPr b="0" lang="en-GB" sz="3200" spc="-1" strike="noStrike">
@@ -10782,7 +10782,7 @@
         </p:spPr>
         <p:txBody>
           <a:bodyPr lIns="0" rIns="0" tIns="0" bIns="0">
-            <a:normAutofit/>
+            <a:normAutofit fontScale="7000"/>
           </a:bodyPr>
           <a:p>
             <a:endParaRPr b="0" lang="en-GB" sz="3200" spc="-1" strike="noStrike">
@@ -10812,7 +10812,7 @@
         </p:spPr>
         <p:txBody>
           <a:bodyPr lIns="0" rIns="0" tIns="0" bIns="0">
-            <a:normAutofit/>
+            <a:normAutofit fontScale="7000"/>
           </a:bodyPr>
           <a:p>
             <a:endParaRPr b="0" lang="en-GB" sz="3200" spc="-1" strike="noStrike">
@@ -10842,7 +10842,7 @@
         </p:spPr>
         <p:txBody>
           <a:bodyPr lIns="0" rIns="0" tIns="0" bIns="0">
-            <a:normAutofit/>
+            <a:normAutofit fontScale="7000"/>
           </a:bodyPr>
           <a:p>
             <a:endParaRPr b="0" lang="en-GB" sz="3200" spc="-1" strike="noStrike">
@@ -10872,7 +10872,7 @@
         </p:spPr>
         <p:txBody>
           <a:bodyPr lIns="0" rIns="0" tIns="0" bIns="0">
-            <a:normAutofit/>
+            <a:normAutofit fontScale="7000"/>
           </a:bodyPr>
           <a:p>
             <a:endParaRPr b="0" lang="en-GB" sz="3200" spc="-1" strike="noStrike">
@@ -10918,8 +10918,8 @@
         </p:nvSpPr>
         <p:spPr>
           <a:xfrm flipH="1">
-            <a:off x="3240" y="301680"/>
-            <a:ext cx="9146880" cy="4493520"/>
+            <a:off x="2520" y="301680"/>
+            <a:ext cx="9146520" cy="4493160"/>
           </a:xfrm>
           <a:custGeom>
             <a:avLst/>
@@ -10975,7 +10975,7 @@
         <p:spPr>
           <a:xfrm>
             <a:off x="-5760" y="759960"/>
-            <a:ext cx="9140760" cy="3766680"/>
+            <a:ext cx="9140400" cy="3766320"/>
           </a:xfrm>
           <a:custGeom>
             <a:avLst/>
@@ -11031,7 +11031,7 @@
         <p:spPr>
           <a:xfrm>
             <a:off x="0" y="1351080"/>
-            <a:ext cx="9153000" cy="2885760"/>
+            <a:ext cx="9152640" cy="2885400"/>
           </a:xfrm>
           <a:custGeom>
             <a:avLst/>
@@ -11130,19 +11130,18 @@
         </p:spPr>
         <p:txBody>
           <a:bodyPr lIns="0" rIns="0" tIns="0" bIns="0">
-            <a:normAutofit/>
-          </a:bodyPr>
-          <a:p>
-            <a:pPr marL="432000" indent="-324000">
+            <a:normAutofit fontScale="1000"/>
+          </a:bodyPr>
+          <a:p>
+            <a:pPr marL="1065167640" indent="23592960">
               <a:spcBef>
                 <a:spcPts val="1417"/>
               </a:spcBef>
               <a:buClr>
-                <a:srgbClr val="ffffff"/>
+                <a:srgbClr val="000000"/>
               </a:buClr>
-              <a:buSzPct val="45000"/>
-              <a:buFont typeface="Wingdings" charset="2"/>
-              <a:buChar char=""/>
+              <a:buFont typeface="Wingdings"/>
+              <a:buChar char="l"/>
             </a:pPr>
             <a:r>
               <a:rPr b="0" lang="en-GB" sz="3200" spc="-1" strike="noStrike">
@@ -11155,16 +11154,15 @@
             </a:endParaRPr>
           </a:p>
           <a:p>
-            <a:pPr lvl="1" marL="864000" indent="-324000">
+            <a:pPr lvl="1" marL="1772427960" indent="23592960">
               <a:spcBef>
                 <a:spcPts val="1134"/>
               </a:spcBef>
               <a:buClr>
-                <a:srgbClr val="ffffff"/>
+                <a:srgbClr val="000000"/>
               </a:buClr>
-              <a:buSzPct val="75000"/>
-              <a:buFont typeface="Symbol" charset="2"/>
-              <a:buChar char=""/>
+              <a:buFont typeface="Wingdings"/>
+              <a:buChar char="l"/>
             </a:pPr>
             <a:r>
               <a:rPr b="0" lang="en-GB" sz="2800" spc="-1" strike="noStrike">
@@ -11177,16 +11175,15 @@
             </a:endParaRPr>
           </a:p>
           <a:p>
-            <a:pPr lvl="2" marL="1296000" indent="-288000">
+            <a:pPr lvl="2" marL="1065167640" indent="23592960">
               <a:spcBef>
                 <a:spcPts val="850"/>
               </a:spcBef>
               <a:buClr>
-                <a:srgbClr val="ffffff"/>
+                <a:srgbClr val="000000"/>
               </a:buClr>
-              <a:buSzPct val="45000"/>
-              <a:buFont typeface="Wingdings" charset="2"/>
-              <a:buChar char=""/>
+              <a:buFont typeface="Wingdings"/>
+              <a:buChar char="l"/>
             </a:pPr>
             <a:r>
               <a:rPr b="0" lang="en-GB" sz="2400" spc="-1" strike="noStrike">
@@ -11199,16 +11196,15 @@
             </a:endParaRPr>
           </a:p>
           <a:p>
-            <a:pPr lvl="3" marL="1728000" indent="-216000">
+            <a:pPr lvl="3" marL="1772427960" indent="23592960">
               <a:spcBef>
                 <a:spcPts val="567"/>
               </a:spcBef>
               <a:buClr>
-                <a:srgbClr val="ffffff"/>
+                <a:srgbClr val="000000"/>
               </a:buClr>
-              <a:buSzPct val="75000"/>
-              <a:buFont typeface="Symbol" charset="2"/>
-              <a:buChar char=""/>
+              <a:buFont typeface="Wingdings"/>
+              <a:buChar char="l"/>
             </a:pPr>
             <a:r>
               <a:rPr b="0" lang="en-GB" sz="2000" spc="-1" strike="noStrike">
@@ -11221,16 +11217,15 @@
             </a:endParaRPr>
           </a:p>
           <a:p>
-            <a:pPr lvl="4" marL="2160000" indent="-216000">
+            <a:pPr lvl="4" marL="1065167640" indent="23592960">
               <a:spcBef>
                 <a:spcPts val="283"/>
               </a:spcBef>
               <a:buClr>
-                <a:srgbClr val="ffffff"/>
+                <a:srgbClr val="000000"/>
               </a:buClr>
-              <a:buSzPct val="45000"/>
-              <a:buFont typeface="Wingdings" charset="2"/>
-              <a:buChar char=""/>
+              <a:buFont typeface="Wingdings"/>
+              <a:buChar char="l"/>
             </a:pPr>
             <a:r>
               <a:rPr b="0" lang="en-GB" sz="2000" spc="-1" strike="noStrike">
@@ -11243,16 +11238,15 @@
             </a:endParaRPr>
           </a:p>
           <a:p>
-            <a:pPr lvl="5" marL="2592000" indent="-216000">
+            <a:pPr lvl="5" marL="1065167640" indent="23592960">
               <a:spcBef>
                 <a:spcPts val="283"/>
               </a:spcBef>
               <a:buClr>
-                <a:srgbClr val="ffffff"/>
+                <a:srgbClr val="000000"/>
               </a:buClr>
-              <a:buSzPct val="45000"/>
-              <a:buFont typeface="Wingdings" charset="2"/>
-              <a:buChar char=""/>
+              <a:buFont typeface="Wingdings"/>
+              <a:buChar char="l"/>
             </a:pPr>
             <a:r>
               <a:rPr b="0" lang="en-GB" sz="2000" spc="-1" strike="noStrike">
@@ -11265,16 +11259,15 @@
             </a:endParaRPr>
           </a:p>
           <a:p>
-            <a:pPr lvl="6" marL="3024000" indent="-216000">
+            <a:pPr lvl="6" marL="1065167640" indent="23592960">
               <a:spcBef>
                 <a:spcPts val="283"/>
               </a:spcBef>
               <a:buClr>
-                <a:srgbClr val="ffffff"/>
+                <a:srgbClr val="000000"/>
               </a:buClr>
-              <a:buSzPct val="45000"/>
-              <a:buFont typeface="Wingdings" charset="2"/>
-              <a:buChar char=""/>
+              <a:buFont typeface="Wingdings"/>
+              <a:buChar char="l"/>
             </a:pPr>
             <a:r>
               <a:rPr b="0" lang="en-GB" sz="2000" spc="-1" strike="noStrike">
@@ -11341,9 +11334,9 @@
         <p:grpSpPr>
           <a:xfrm>
             <a:off x="-6120" y="0"/>
-            <a:ext cx="9164880" cy="5159880"/>
+            <a:ext cx="9164520" cy="5159520"/>
             <a:chOff x="-6120" y="0"/>
-            <a:chExt cx="9164880" cy="5159880"/>
+            <a:chExt cx="9164520" cy="5159520"/>
           </a:xfrm>
         </p:grpSpPr>
         <p:sp>
@@ -11355,7 +11348,7 @@
           <p:spPr>
             <a:xfrm>
               <a:off x="0" y="0"/>
-              <a:ext cx="8549640" cy="1329840"/>
+              <a:ext cx="8549280" cy="1329480"/>
             </a:xfrm>
             <a:custGeom>
               <a:avLst/>
@@ -11400,7 +11393,7 @@
           <p:spPr>
             <a:xfrm>
               <a:off x="2563560" y="0"/>
-              <a:ext cx="6577200" cy="1269360"/>
+              <a:ext cx="6576840" cy="1269000"/>
             </a:xfrm>
             <a:custGeom>
               <a:avLst/>
@@ -11450,7 +11443,7 @@
           <p:spPr>
             <a:xfrm>
               <a:off x="-6120" y="0"/>
-              <a:ext cx="7295040" cy="1468440"/>
+              <a:ext cx="7294680" cy="1468080"/>
             </a:xfrm>
             <a:custGeom>
               <a:avLst/>
@@ -11500,7 +11493,7 @@
           <p:spPr>
             <a:xfrm>
               <a:off x="3596040" y="4667040"/>
-              <a:ext cx="5087520" cy="473400"/>
+              <a:ext cx="5087160" cy="473040"/>
             </a:xfrm>
             <a:custGeom>
               <a:avLst/>
@@ -11545,7 +11538,7 @@
           <p:spPr>
             <a:xfrm>
               <a:off x="5524920" y="4692600"/>
-              <a:ext cx="3633840" cy="467280"/>
+              <a:ext cx="3633480" cy="466920"/>
             </a:xfrm>
             <a:custGeom>
               <a:avLst/>
@@ -11592,7 +11585,7 @@
           <p:spPr>
             <a:xfrm>
               <a:off x="7521480" y="4023000"/>
-              <a:ext cx="1631520" cy="1136880"/>
+              <a:ext cx="1631160" cy="1136520"/>
             </a:xfrm>
             <a:custGeom>
               <a:avLst/>
@@ -11689,19 +11682,18 @@
         </p:spPr>
         <p:txBody>
           <a:bodyPr lIns="0" rIns="0" tIns="0" bIns="0">
-            <a:normAutofit fontScale="97000"/>
-          </a:bodyPr>
-          <a:p>
-            <a:pPr marL="432000" indent="-324000" algn="ctr">
+            <a:normAutofit fontScale="1000"/>
+          </a:bodyPr>
+          <a:p>
+            <a:pPr marL="1065167640" indent="23592960" algn="ctr">
               <a:spcBef>
                 <a:spcPts val="1417"/>
               </a:spcBef>
               <a:buClr>
                 <a:srgbClr val="000000"/>
               </a:buClr>
-              <a:buSzPct val="45000"/>
-              <a:buFont typeface="Wingdings" charset="2"/>
-              <a:buChar char=""/>
+              <a:buFont typeface="Wingdings"/>
+              <a:buChar char="l"/>
             </a:pPr>
             <a:r>
               <a:rPr b="0" lang="en-GB" sz="1800" spc="-1" strike="noStrike">
@@ -11714,16 +11706,15 @@
             </a:endParaRPr>
           </a:p>
           <a:p>
-            <a:pPr lvl="1" marL="864000" indent="-324000" algn="ctr">
+            <a:pPr lvl="1" marL="1772427960" indent="23592960" algn="ctr">
               <a:spcBef>
                 <a:spcPts val="1134"/>
               </a:spcBef>
               <a:buClr>
                 <a:srgbClr val="000000"/>
               </a:buClr>
-              <a:buSzPct val="75000"/>
-              <a:buFont typeface="Symbol" charset="2"/>
-              <a:buChar char=""/>
+              <a:buFont typeface="Wingdings"/>
+              <a:buChar char="l"/>
             </a:pPr>
             <a:r>
               <a:rPr b="0" lang="en-GB" sz="1800" spc="-1" strike="noStrike">
@@ -11736,16 +11727,15 @@
             </a:endParaRPr>
           </a:p>
           <a:p>
-            <a:pPr lvl="2" marL="1296000" indent="-288000" algn="ctr">
+            <a:pPr lvl="2" marL="1065167640" indent="23592960" algn="ctr">
               <a:spcBef>
                 <a:spcPts val="850"/>
               </a:spcBef>
               <a:buClr>
                 <a:srgbClr val="000000"/>
               </a:buClr>
-              <a:buSzPct val="45000"/>
-              <a:buFont typeface="Wingdings" charset="2"/>
-              <a:buChar char=""/>
+              <a:buFont typeface="Wingdings"/>
+              <a:buChar char="l"/>
             </a:pPr>
             <a:r>
               <a:rPr b="0" lang="en-GB" sz="1800" spc="-1" strike="noStrike">
@@ -11758,16 +11748,15 @@
             </a:endParaRPr>
           </a:p>
           <a:p>
-            <a:pPr lvl="3" marL="1728000" indent="-216000" algn="ctr">
+            <a:pPr lvl="3" marL="1772427960" indent="23592960" algn="ctr">
               <a:spcBef>
                 <a:spcPts val="567"/>
               </a:spcBef>
               <a:buClr>
                 <a:srgbClr val="000000"/>
               </a:buClr>
-              <a:buSzPct val="75000"/>
-              <a:buFont typeface="Symbol" charset="2"/>
-              <a:buChar char=""/>
+              <a:buFont typeface="Wingdings"/>
+              <a:buChar char="l"/>
             </a:pPr>
             <a:r>
               <a:rPr b="0" lang="en-GB" sz="1800" spc="-1" strike="noStrike">
@@ -11780,16 +11769,15 @@
             </a:endParaRPr>
           </a:p>
           <a:p>
-            <a:pPr lvl="4" marL="2160000" indent="-216000" algn="ctr">
+            <a:pPr lvl="4" marL="1065167640" indent="23592960" algn="ctr">
               <a:spcBef>
                 <a:spcPts val="283"/>
               </a:spcBef>
               <a:buClr>
                 <a:srgbClr val="000000"/>
               </a:buClr>
-              <a:buSzPct val="45000"/>
-              <a:buFont typeface="Wingdings" charset="2"/>
-              <a:buChar char=""/>
+              <a:buFont typeface="Wingdings"/>
+              <a:buChar char="l"/>
             </a:pPr>
             <a:r>
               <a:rPr b="0" lang="en-GB" sz="1800" spc="-1" strike="noStrike">
@@ -11802,16 +11790,15 @@
             </a:endParaRPr>
           </a:p>
           <a:p>
-            <a:pPr lvl="5" marL="2592000" indent="-216000" algn="ctr">
+            <a:pPr lvl="5" marL="1065167640" indent="23592960" algn="ctr">
               <a:spcBef>
                 <a:spcPts val="283"/>
               </a:spcBef>
               <a:buClr>
                 <a:srgbClr val="000000"/>
               </a:buClr>
-              <a:buSzPct val="45000"/>
-              <a:buFont typeface="Wingdings" charset="2"/>
-              <a:buChar char=""/>
+              <a:buFont typeface="Wingdings"/>
+              <a:buChar char="l"/>
             </a:pPr>
             <a:r>
               <a:rPr b="0" lang="en-GB" sz="1800" spc="-1" strike="noStrike">
@@ -11824,16 +11811,15 @@
             </a:endParaRPr>
           </a:p>
           <a:p>
-            <a:pPr lvl="6" marL="3024000" indent="-216000" algn="ctr">
+            <a:pPr lvl="6" marL="1065167640" indent="23592960" algn="ctr">
               <a:spcBef>
                 <a:spcPts val="283"/>
               </a:spcBef>
               <a:buClr>
                 <a:srgbClr val="000000"/>
               </a:buClr>
-              <a:buSzPct val="45000"/>
-              <a:buFont typeface="Wingdings" charset="2"/>
-              <a:buChar char=""/>
+              <a:buFont typeface="Wingdings"/>
+              <a:buChar char="l"/>
             </a:pPr>
             <a:r>
               <a:rPr b="0" lang="en-GB" sz="1800" spc="-1" strike="noStrike">
@@ -11868,19 +11854,18 @@
         </p:spPr>
         <p:txBody>
           <a:bodyPr lIns="0" rIns="0" tIns="0" bIns="0">
-            <a:normAutofit fontScale="97000"/>
-          </a:bodyPr>
-          <a:p>
-            <a:pPr marL="432000" indent="-324000" algn="ctr">
+            <a:normAutofit fontScale="1000"/>
+          </a:bodyPr>
+          <a:p>
+            <a:pPr marL="1065167640" indent="23592960" algn="ctr">
               <a:spcBef>
                 <a:spcPts val="1417"/>
               </a:spcBef>
               <a:buClr>
                 <a:srgbClr val="000000"/>
               </a:buClr>
-              <a:buSzPct val="45000"/>
-              <a:buFont typeface="Wingdings" charset="2"/>
-              <a:buChar char=""/>
+              <a:buFont typeface="Wingdings"/>
+              <a:buChar char="l"/>
             </a:pPr>
             <a:r>
               <a:rPr b="0" lang="en-GB" sz="1800" spc="-1" strike="noStrike">
@@ -11893,16 +11878,15 @@
             </a:endParaRPr>
           </a:p>
           <a:p>
-            <a:pPr lvl="1" marL="864000" indent="-324000" algn="ctr">
+            <a:pPr lvl="1" marL="1772427960" indent="23592960" algn="ctr">
               <a:spcBef>
                 <a:spcPts val="1134"/>
               </a:spcBef>
               <a:buClr>
                 <a:srgbClr val="000000"/>
               </a:buClr>
-              <a:buSzPct val="75000"/>
-              <a:buFont typeface="Symbol" charset="2"/>
-              <a:buChar char=""/>
+              <a:buFont typeface="Wingdings"/>
+              <a:buChar char="l"/>
             </a:pPr>
             <a:r>
               <a:rPr b="0" lang="en-GB" sz="1800" spc="-1" strike="noStrike">
@@ -11915,16 +11899,15 @@
             </a:endParaRPr>
           </a:p>
           <a:p>
-            <a:pPr lvl="2" marL="1296000" indent="-288000" algn="ctr">
+            <a:pPr lvl="2" marL="1065167640" indent="23592960" algn="ctr">
               <a:spcBef>
                 <a:spcPts val="850"/>
               </a:spcBef>
               <a:buClr>
                 <a:srgbClr val="000000"/>
               </a:buClr>
-              <a:buSzPct val="45000"/>
-              <a:buFont typeface="Wingdings" charset="2"/>
-              <a:buChar char=""/>
+              <a:buFont typeface="Wingdings"/>
+              <a:buChar char="l"/>
             </a:pPr>
             <a:r>
               <a:rPr b="0" lang="en-GB" sz="1800" spc="-1" strike="noStrike">
@@ -11937,16 +11920,15 @@
             </a:endParaRPr>
           </a:p>
           <a:p>
-            <a:pPr lvl="3" marL="1728000" indent="-216000" algn="ctr">
+            <a:pPr lvl="3" marL="1772427960" indent="23592960" algn="ctr">
               <a:spcBef>
                 <a:spcPts val="567"/>
               </a:spcBef>
               <a:buClr>
                 <a:srgbClr val="000000"/>
               </a:buClr>
-              <a:buSzPct val="75000"/>
-              <a:buFont typeface="Symbol" charset="2"/>
-              <a:buChar char=""/>
+              <a:buFont typeface="Wingdings"/>
+              <a:buChar char="l"/>
             </a:pPr>
             <a:r>
               <a:rPr b="0" lang="en-GB" sz="1800" spc="-1" strike="noStrike">
@@ -11959,16 +11941,15 @@
             </a:endParaRPr>
           </a:p>
           <a:p>
-            <a:pPr lvl="4" marL="2160000" indent="-216000" algn="ctr">
+            <a:pPr lvl="4" marL="1065167640" indent="23592960" algn="ctr">
               <a:spcBef>
                 <a:spcPts val="283"/>
               </a:spcBef>
               <a:buClr>
                 <a:srgbClr val="000000"/>
               </a:buClr>
-              <a:buSzPct val="45000"/>
-              <a:buFont typeface="Wingdings" charset="2"/>
-              <a:buChar char=""/>
+              <a:buFont typeface="Wingdings"/>
+              <a:buChar char="l"/>
             </a:pPr>
             <a:r>
               <a:rPr b="0" lang="en-GB" sz="1800" spc="-1" strike="noStrike">
@@ -11981,16 +11962,15 @@
             </a:endParaRPr>
           </a:p>
           <a:p>
-            <a:pPr lvl="5" marL="2592000" indent="-216000" algn="ctr">
+            <a:pPr lvl="5" marL="1065167640" indent="23592960" algn="ctr">
               <a:spcBef>
                 <a:spcPts val="283"/>
               </a:spcBef>
               <a:buClr>
                 <a:srgbClr val="000000"/>
               </a:buClr>
-              <a:buSzPct val="45000"/>
-              <a:buFont typeface="Wingdings" charset="2"/>
-              <a:buChar char=""/>
+              <a:buFont typeface="Wingdings"/>
+              <a:buChar char="l"/>
             </a:pPr>
             <a:r>
               <a:rPr b="0" lang="en-GB" sz="1800" spc="-1" strike="noStrike">
@@ -12003,16 +11983,15 @@
             </a:endParaRPr>
           </a:p>
           <a:p>
-            <a:pPr lvl="6" marL="3024000" indent="-216000" algn="ctr">
+            <a:pPr lvl="6" marL="1065167640" indent="23592960" algn="ctr">
               <a:spcBef>
                 <a:spcPts val="283"/>
               </a:spcBef>
               <a:buClr>
                 <a:srgbClr val="000000"/>
               </a:buClr>
-              <a:buSzPct val="45000"/>
-              <a:buFont typeface="Wingdings" charset="2"/>
-              <a:buChar char=""/>
+              <a:buFont typeface="Wingdings"/>
+              <a:buChar char="l"/>
             </a:pPr>
             <a:r>
               <a:rPr b="0" lang="en-GB" sz="1800" spc="-1" strike="noStrike">
@@ -12079,9 +12058,9 @@
         <p:grpSpPr>
           <a:xfrm>
             <a:off x="-6120" y="0"/>
-            <a:ext cx="9165600" cy="5160600"/>
+            <a:ext cx="9165240" cy="5160240"/>
             <a:chOff x="-6120" y="0"/>
-            <a:chExt cx="9165600" cy="5160600"/>
+            <a:chExt cx="9165240" cy="5160240"/>
           </a:xfrm>
         </p:grpSpPr>
         <p:sp>
@@ -12093,7 +12072,7 @@
           <p:spPr>
             <a:xfrm>
               <a:off x="0" y="0"/>
-              <a:ext cx="8550360" cy="1330560"/>
+              <a:ext cx="8550000" cy="1330200"/>
             </a:xfrm>
             <a:custGeom>
               <a:avLst/>
@@ -12138,7 +12117,7 @@
           <p:spPr>
             <a:xfrm>
               <a:off x="2563560" y="0"/>
-              <a:ext cx="6577920" cy="1270080"/>
+              <a:ext cx="6577560" cy="1269720"/>
             </a:xfrm>
             <a:custGeom>
               <a:avLst/>
@@ -12188,7 +12167,7 @@
           <p:spPr>
             <a:xfrm>
               <a:off x="-6120" y="0"/>
-              <a:ext cx="7295760" cy="1469160"/>
+              <a:ext cx="7295400" cy="1468800"/>
             </a:xfrm>
             <a:custGeom>
               <a:avLst/>
@@ -12238,7 +12217,7 @@
           <p:spPr>
             <a:xfrm>
               <a:off x="3596040" y="4667040"/>
-              <a:ext cx="5088240" cy="474120"/>
+              <a:ext cx="5087880" cy="473760"/>
             </a:xfrm>
             <a:custGeom>
               <a:avLst/>
@@ -12283,7 +12262,7 @@
           <p:spPr>
             <a:xfrm>
               <a:off x="5524920" y="4692600"/>
-              <a:ext cx="3634560" cy="468000"/>
+              <a:ext cx="3634200" cy="467640"/>
             </a:xfrm>
             <a:custGeom>
               <a:avLst/>
@@ -12330,7 +12309,7 @@
           <p:spPr>
             <a:xfrm>
               <a:off x="7521480" y="4023000"/>
-              <a:ext cx="1632240" cy="1137600"/>
+              <a:ext cx="1631880" cy="1137240"/>
             </a:xfrm>
             <a:custGeom>
               <a:avLst/>
@@ -12427,19 +12406,18 @@
         </p:spPr>
         <p:txBody>
           <a:bodyPr lIns="0" rIns="0" tIns="0" bIns="0">
-            <a:normAutofit/>
-          </a:bodyPr>
-          <a:p>
-            <a:pPr marL="432000" indent="-324000">
+            <a:normAutofit fontScale="1000"/>
+          </a:bodyPr>
+          <a:p>
+            <a:pPr marL="1065167640" indent="23592960">
               <a:spcBef>
                 <a:spcPts val="1417"/>
               </a:spcBef>
               <a:buClr>
                 <a:srgbClr val="000000"/>
               </a:buClr>
-              <a:buSzPct val="45000"/>
-              <a:buFont typeface="Wingdings" charset="2"/>
-              <a:buChar char=""/>
+              <a:buFont typeface="Wingdings"/>
+              <a:buChar char="l"/>
             </a:pPr>
             <a:r>
               <a:rPr b="0" lang="en-GB" sz="3200" spc="-1" strike="noStrike">
@@ -12452,16 +12430,15 @@
             </a:endParaRPr>
           </a:p>
           <a:p>
-            <a:pPr lvl="1" marL="864000" indent="-324000">
+            <a:pPr lvl="1" marL="1772427960" indent="23592960">
               <a:spcBef>
                 <a:spcPts val="1134"/>
               </a:spcBef>
               <a:buClr>
                 <a:srgbClr val="000000"/>
               </a:buClr>
-              <a:buSzPct val="75000"/>
-              <a:buFont typeface="Symbol" charset="2"/>
-              <a:buChar char=""/>
+              <a:buFont typeface="Wingdings"/>
+              <a:buChar char="l"/>
             </a:pPr>
             <a:r>
               <a:rPr b="0" lang="en-GB" sz="2800" spc="-1" strike="noStrike">
@@ -12474,16 +12451,15 @@
             </a:endParaRPr>
           </a:p>
           <a:p>
-            <a:pPr lvl="2" marL="1296000" indent="-288000">
+            <a:pPr lvl="2" marL="1065167640" indent="23592960">
               <a:spcBef>
                 <a:spcPts val="850"/>
               </a:spcBef>
               <a:buClr>
                 <a:srgbClr val="000000"/>
               </a:buClr>
-              <a:buSzPct val="45000"/>
-              <a:buFont typeface="Wingdings" charset="2"/>
-              <a:buChar char=""/>
+              <a:buFont typeface="Wingdings"/>
+              <a:buChar char="l"/>
             </a:pPr>
             <a:r>
               <a:rPr b="0" lang="en-GB" sz="2400" spc="-1" strike="noStrike">
@@ -12496,16 +12472,15 @@
             </a:endParaRPr>
           </a:p>
           <a:p>
-            <a:pPr lvl="3" marL="1728000" indent="-216000">
+            <a:pPr lvl="3" marL="1772427960" indent="23592960">
               <a:spcBef>
                 <a:spcPts val="567"/>
               </a:spcBef>
               <a:buClr>
                 <a:srgbClr val="000000"/>
               </a:buClr>
-              <a:buSzPct val="75000"/>
-              <a:buFont typeface="Symbol" charset="2"/>
-              <a:buChar char=""/>
+              <a:buFont typeface="Wingdings"/>
+              <a:buChar char="l"/>
             </a:pPr>
             <a:r>
               <a:rPr b="0" lang="en-GB" sz="2000" spc="-1" strike="noStrike">
@@ -12518,16 +12493,15 @@
             </a:endParaRPr>
           </a:p>
           <a:p>
-            <a:pPr lvl="4" marL="2160000" indent="-216000">
+            <a:pPr lvl="4" marL="1065167640" indent="23592960">
               <a:spcBef>
                 <a:spcPts val="283"/>
               </a:spcBef>
               <a:buClr>
                 <a:srgbClr val="000000"/>
               </a:buClr>
-              <a:buSzPct val="45000"/>
-              <a:buFont typeface="Wingdings" charset="2"/>
-              <a:buChar char=""/>
+              <a:buFont typeface="Wingdings"/>
+              <a:buChar char="l"/>
             </a:pPr>
             <a:r>
               <a:rPr b="0" lang="en-GB" sz="2000" spc="-1" strike="noStrike">
@@ -12540,16 +12514,15 @@
             </a:endParaRPr>
           </a:p>
           <a:p>
-            <a:pPr lvl="5" marL="2592000" indent="-216000">
+            <a:pPr lvl="5" marL="1065167640" indent="23592960">
               <a:spcBef>
                 <a:spcPts val="283"/>
               </a:spcBef>
               <a:buClr>
                 <a:srgbClr val="000000"/>
               </a:buClr>
-              <a:buSzPct val="45000"/>
-              <a:buFont typeface="Wingdings" charset="2"/>
-              <a:buChar char=""/>
+              <a:buFont typeface="Wingdings"/>
+              <a:buChar char="l"/>
             </a:pPr>
             <a:r>
               <a:rPr b="0" lang="en-GB" sz="2000" spc="-1" strike="noStrike">
@@ -12562,16 +12535,15 @@
             </a:endParaRPr>
           </a:p>
           <a:p>
-            <a:pPr lvl="6" marL="3024000" indent="-216000">
+            <a:pPr lvl="6" marL="1065167640" indent="23592960">
               <a:spcBef>
                 <a:spcPts val="283"/>
               </a:spcBef>
               <a:buClr>
                 <a:srgbClr val="000000"/>
               </a:buClr>
-              <a:buSzPct val="45000"/>
-              <a:buFont typeface="Wingdings" charset="2"/>
-              <a:buChar char=""/>
+              <a:buFont typeface="Wingdings"/>
+              <a:buChar char="l"/>
             </a:pPr>
             <a:r>
               <a:rPr b="0" lang="en-GB" sz="2000" spc="-1" strike="noStrike">
@@ -12638,7 +12610,7 @@
         <p:spPr>
           <a:xfrm>
             <a:off x="-2520" y="0"/>
-            <a:ext cx="5206320" cy="980280"/>
+            <a:ext cx="5205960" cy="979920"/>
           </a:xfrm>
           <a:custGeom>
             <a:avLst/>
@@ -12683,7 +12655,7 @@
         <p:spPr>
           <a:xfrm>
             <a:off x="-6120" y="0"/>
-            <a:ext cx="4442040" cy="1082520"/>
+            <a:ext cx="4441680" cy="1082160"/>
           </a:xfrm>
           <a:custGeom>
             <a:avLst/>
@@ -12733,7 +12705,7 @@
         <p:spPr>
           <a:xfrm>
             <a:off x="6375600" y="4745880"/>
-            <a:ext cx="2545560" cy="397800"/>
+            <a:ext cx="2545200" cy="397440"/>
           </a:xfrm>
           <a:custGeom>
             <a:avLst/>
@@ -12778,7 +12750,7 @@
         <p:spPr>
           <a:xfrm>
             <a:off x="7341120" y="4767480"/>
-            <a:ext cx="1818000" cy="392400"/>
+            <a:ext cx="1817640" cy="392040"/>
           </a:xfrm>
           <a:custGeom>
             <a:avLst/>
@@ -12825,7 +12797,7 @@
         <p:spPr>
           <a:xfrm>
             <a:off x="8340840" y="4204080"/>
-            <a:ext cx="815040" cy="955800"/>
+            <a:ext cx="814680" cy="955440"/>
           </a:xfrm>
           <a:custGeom>
             <a:avLst/>
@@ -12872,7 +12844,7 @@
         <p:spPr>
           <a:xfrm>
             <a:off x="1559160" y="-6120"/>
-            <a:ext cx="4113360" cy="941760"/>
+            <a:ext cx="4113000" cy="941400"/>
           </a:xfrm>
           <a:custGeom>
             <a:avLst/>
@@ -12971,19 +12943,18 @@
         </p:spPr>
         <p:txBody>
           <a:bodyPr lIns="0" rIns="0" tIns="0" bIns="0">
-            <a:normAutofit/>
-          </a:bodyPr>
-          <a:p>
-            <a:pPr marL="432000" indent="-324000">
+            <a:normAutofit fontScale="1000"/>
+          </a:bodyPr>
+          <a:p>
+            <a:pPr marL="1065167640" indent="23592960">
               <a:spcBef>
                 <a:spcPts val="1417"/>
               </a:spcBef>
               <a:buClr>
                 <a:srgbClr val="000000"/>
               </a:buClr>
-              <a:buSzPct val="45000"/>
-              <a:buFont typeface="Wingdings" charset="2"/>
-              <a:buChar char=""/>
+              <a:buFont typeface="Wingdings"/>
+              <a:buChar char="l"/>
             </a:pPr>
             <a:r>
               <a:rPr b="0" lang="en-GB" sz="3200" spc="-1" strike="noStrike">
@@ -12996,16 +12967,15 @@
             </a:endParaRPr>
           </a:p>
           <a:p>
-            <a:pPr lvl="1" marL="864000" indent="-324000">
+            <a:pPr lvl="1" marL="1772427960" indent="23592960">
               <a:spcBef>
                 <a:spcPts val="1134"/>
               </a:spcBef>
               <a:buClr>
                 <a:srgbClr val="000000"/>
               </a:buClr>
-              <a:buSzPct val="75000"/>
-              <a:buFont typeface="Symbol" charset="2"/>
-              <a:buChar char=""/>
+              <a:buFont typeface="Wingdings"/>
+              <a:buChar char="l"/>
             </a:pPr>
             <a:r>
               <a:rPr b="0" lang="en-GB" sz="2800" spc="-1" strike="noStrike">
@@ -13018,16 +12988,15 @@
             </a:endParaRPr>
           </a:p>
           <a:p>
-            <a:pPr lvl="2" marL="1296000" indent="-288000">
+            <a:pPr lvl="2" marL="1065167640" indent="23592960">
               <a:spcBef>
                 <a:spcPts val="850"/>
               </a:spcBef>
               <a:buClr>
                 <a:srgbClr val="000000"/>
               </a:buClr>
-              <a:buSzPct val="45000"/>
-              <a:buFont typeface="Wingdings" charset="2"/>
-              <a:buChar char=""/>
+              <a:buFont typeface="Wingdings"/>
+              <a:buChar char="l"/>
             </a:pPr>
             <a:r>
               <a:rPr b="0" lang="en-GB" sz="2400" spc="-1" strike="noStrike">
@@ -13040,16 +13009,15 @@
             </a:endParaRPr>
           </a:p>
           <a:p>
-            <a:pPr lvl="3" marL="1728000" indent="-216000">
+            <a:pPr lvl="3" marL="1772427960" indent="23592960">
               <a:spcBef>
                 <a:spcPts val="567"/>
               </a:spcBef>
               <a:buClr>
                 <a:srgbClr val="000000"/>
               </a:buClr>
-              <a:buSzPct val="75000"/>
-              <a:buFont typeface="Symbol" charset="2"/>
-              <a:buChar char=""/>
+              <a:buFont typeface="Wingdings"/>
+              <a:buChar char="l"/>
             </a:pPr>
             <a:r>
               <a:rPr b="0" lang="en-GB" sz="2000" spc="-1" strike="noStrike">
@@ -13062,16 +13030,15 @@
             </a:endParaRPr>
           </a:p>
           <a:p>
-            <a:pPr lvl="4" marL="2160000" indent="-216000">
+            <a:pPr lvl="4" marL="1065167640" indent="23592960">
               <a:spcBef>
                 <a:spcPts val="283"/>
               </a:spcBef>
               <a:buClr>
                 <a:srgbClr val="000000"/>
               </a:buClr>
-              <a:buSzPct val="45000"/>
-              <a:buFont typeface="Wingdings" charset="2"/>
-              <a:buChar char=""/>
+              <a:buFont typeface="Wingdings"/>
+              <a:buChar char="l"/>
             </a:pPr>
             <a:r>
               <a:rPr b="0" lang="en-GB" sz="2000" spc="-1" strike="noStrike">
@@ -13084,16 +13051,15 @@
             </a:endParaRPr>
           </a:p>
           <a:p>
-            <a:pPr lvl="5" marL="2592000" indent="-216000">
+            <a:pPr lvl="5" marL="1065167640" indent="23592960">
               <a:spcBef>
                 <a:spcPts val="283"/>
               </a:spcBef>
               <a:buClr>
                 <a:srgbClr val="000000"/>
               </a:buClr>
-              <a:buSzPct val="45000"/>
-              <a:buFont typeface="Wingdings" charset="2"/>
-              <a:buChar char=""/>
+              <a:buFont typeface="Wingdings"/>
+              <a:buChar char="l"/>
             </a:pPr>
             <a:r>
               <a:rPr b="0" lang="en-GB" sz="2000" spc="-1" strike="noStrike">
@@ -13106,16 +13072,15 @@
             </a:endParaRPr>
           </a:p>
           <a:p>
-            <a:pPr lvl="6" marL="3024000" indent="-216000">
+            <a:pPr lvl="6" marL="1065167640" indent="23592960">
               <a:spcBef>
                 <a:spcPts val="283"/>
               </a:spcBef>
               <a:buClr>
                 <a:srgbClr val="000000"/>
               </a:buClr>
-              <a:buSzPct val="45000"/>
-              <a:buFont typeface="Wingdings" charset="2"/>
-              <a:buChar char=""/>
+              <a:buFont typeface="Wingdings"/>
+              <a:buChar char="l"/>
             </a:pPr>
             <a:r>
               <a:rPr b="0" lang="en-GB" sz="2000" spc="-1" strike="noStrike">
@@ -13182,7 +13147,7 @@
         <p:spPr>
           <a:xfrm>
             <a:off x="-2520" y="0"/>
-            <a:ext cx="5206320" cy="980280"/>
+            <a:ext cx="5205960" cy="979920"/>
           </a:xfrm>
           <a:custGeom>
             <a:avLst/>
@@ -13227,7 +13192,7 @@
         <p:spPr>
           <a:xfrm>
             <a:off x="-6120" y="0"/>
-            <a:ext cx="4442040" cy="1082520"/>
+            <a:ext cx="4441680" cy="1082160"/>
           </a:xfrm>
           <a:custGeom>
             <a:avLst/>
@@ -13277,7 +13242,7 @@
         <p:spPr>
           <a:xfrm>
             <a:off x="6375600" y="4745880"/>
-            <a:ext cx="2545560" cy="397800"/>
+            <a:ext cx="2545200" cy="397440"/>
           </a:xfrm>
           <a:custGeom>
             <a:avLst/>
@@ -13322,7 +13287,7 @@
         <p:spPr>
           <a:xfrm>
             <a:off x="7341120" y="4767480"/>
-            <a:ext cx="1818000" cy="392400"/>
+            <a:ext cx="1817640" cy="392040"/>
           </a:xfrm>
           <a:custGeom>
             <a:avLst/>
@@ -13369,7 +13334,7 @@
         <p:spPr>
           <a:xfrm>
             <a:off x="8340840" y="4204080"/>
-            <a:ext cx="815040" cy="955800"/>
+            <a:ext cx="814680" cy="955440"/>
           </a:xfrm>
           <a:custGeom>
             <a:avLst/>
@@ -13416,7 +13381,7 @@
         <p:spPr>
           <a:xfrm>
             <a:off x="1559160" y="-6120"/>
-            <a:ext cx="4113360" cy="941760"/>
+            <a:ext cx="4113000" cy="941400"/>
           </a:xfrm>
           <a:custGeom>
             <a:avLst/>
@@ -13515,19 +13480,18 @@
         </p:spPr>
         <p:txBody>
           <a:bodyPr lIns="0" rIns="0" tIns="0" bIns="0">
-            <a:normAutofit/>
-          </a:bodyPr>
-          <a:p>
-            <a:pPr marL="432000" indent="-324000">
+            <a:normAutofit fontScale="1000"/>
+          </a:bodyPr>
+          <a:p>
+            <a:pPr marL="1065167640" indent="23592960">
               <a:spcBef>
                 <a:spcPts val="1417"/>
               </a:spcBef>
               <a:buClr>
                 <a:srgbClr val="000000"/>
               </a:buClr>
-              <a:buSzPct val="45000"/>
-              <a:buFont typeface="Wingdings" charset="2"/>
-              <a:buChar char=""/>
+              <a:buFont typeface="Wingdings"/>
+              <a:buChar char="l"/>
             </a:pPr>
             <a:r>
               <a:rPr b="0" lang="en-GB" sz="3200" spc="-1" strike="noStrike">
@@ -13540,16 +13504,15 @@
             </a:endParaRPr>
           </a:p>
           <a:p>
-            <a:pPr lvl="1" marL="864000" indent="-324000">
+            <a:pPr lvl="1" marL="1772427960" indent="23592960">
               <a:spcBef>
                 <a:spcPts val="1134"/>
               </a:spcBef>
               <a:buClr>
                 <a:srgbClr val="000000"/>
               </a:buClr>
-              <a:buSzPct val="75000"/>
-              <a:buFont typeface="Symbol" charset="2"/>
-              <a:buChar char=""/>
+              <a:buFont typeface="Wingdings"/>
+              <a:buChar char="l"/>
             </a:pPr>
             <a:r>
               <a:rPr b="0" lang="en-GB" sz="2800" spc="-1" strike="noStrike">
@@ -13562,16 +13525,15 @@
             </a:endParaRPr>
           </a:p>
           <a:p>
-            <a:pPr lvl="2" marL="1296000" indent="-288000">
+            <a:pPr lvl="2" marL="1065167640" indent="23592960">
               <a:spcBef>
                 <a:spcPts val="850"/>
               </a:spcBef>
               <a:buClr>
                 <a:srgbClr val="000000"/>
               </a:buClr>
-              <a:buSzPct val="45000"/>
-              <a:buFont typeface="Wingdings" charset="2"/>
-              <a:buChar char=""/>
+              <a:buFont typeface="Wingdings"/>
+              <a:buChar char="l"/>
             </a:pPr>
             <a:r>
               <a:rPr b="0" lang="en-GB" sz="2400" spc="-1" strike="noStrike">
@@ -13584,16 +13546,15 @@
             </a:endParaRPr>
           </a:p>
           <a:p>
-            <a:pPr lvl="3" marL="1728000" indent="-216000">
+            <a:pPr lvl="3" marL="1772427960" indent="23592960">
               <a:spcBef>
                 <a:spcPts val="567"/>
               </a:spcBef>
               <a:buClr>
                 <a:srgbClr val="000000"/>
               </a:buClr>
-              <a:buSzPct val="75000"/>
-              <a:buFont typeface="Symbol" charset="2"/>
-              <a:buChar char=""/>
+              <a:buFont typeface="Wingdings"/>
+              <a:buChar char="l"/>
             </a:pPr>
             <a:r>
               <a:rPr b="0" lang="en-GB" sz="2000" spc="-1" strike="noStrike">
@@ -13606,16 +13567,15 @@
             </a:endParaRPr>
           </a:p>
           <a:p>
-            <a:pPr lvl="4" marL="2160000" indent="-216000">
+            <a:pPr lvl="4" marL="1065167640" indent="23592960">
               <a:spcBef>
                 <a:spcPts val="283"/>
               </a:spcBef>
               <a:buClr>
                 <a:srgbClr val="000000"/>
               </a:buClr>
-              <a:buSzPct val="45000"/>
-              <a:buFont typeface="Wingdings" charset="2"/>
-              <a:buChar char=""/>
+              <a:buFont typeface="Wingdings"/>
+              <a:buChar char="l"/>
             </a:pPr>
             <a:r>
               <a:rPr b="0" lang="en-GB" sz="2000" spc="-1" strike="noStrike">
@@ -13628,16 +13588,15 @@
             </a:endParaRPr>
           </a:p>
           <a:p>
-            <a:pPr lvl="5" marL="2592000" indent="-216000">
+            <a:pPr lvl="5" marL="1065167640" indent="23592960">
               <a:spcBef>
                 <a:spcPts val="283"/>
               </a:spcBef>
               <a:buClr>
                 <a:srgbClr val="000000"/>
               </a:buClr>
-              <a:buSzPct val="45000"/>
-              <a:buFont typeface="Wingdings" charset="2"/>
-              <a:buChar char=""/>
+              <a:buFont typeface="Wingdings"/>
+              <a:buChar char="l"/>
             </a:pPr>
             <a:r>
               <a:rPr b="0" lang="en-GB" sz="2000" spc="-1" strike="noStrike">
@@ -13650,16 +13609,15 @@
             </a:endParaRPr>
           </a:p>
           <a:p>
-            <a:pPr lvl="6" marL="3024000" indent="-216000">
+            <a:pPr lvl="6" marL="1065167640" indent="23592960">
               <a:spcBef>
                 <a:spcPts val="283"/>
               </a:spcBef>
               <a:buClr>
                 <a:srgbClr val="000000"/>
               </a:buClr>
-              <a:buSzPct val="45000"/>
-              <a:buFont typeface="Wingdings" charset="2"/>
-              <a:buChar char=""/>
+              <a:buFont typeface="Wingdings"/>
+              <a:buChar char="l"/>
             </a:pPr>
             <a:r>
               <a:rPr b="0" lang="en-GB" sz="2000" spc="-1" strike="noStrike">
@@ -13726,9 +13684,9 @@
         <p:grpSpPr>
           <a:xfrm>
             <a:off x="-6120" y="0"/>
-            <a:ext cx="9164880" cy="5159880"/>
+            <a:ext cx="9164520" cy="5159520"/>
             <a:chOff x="-6120" y="0"/>
-            <a:chExt cx="9164880" cy="5159880"/>
+            <a:chExt cx="9164520" cy="5159520"/>
           </a:xfrm>
         </p:grpSpPr>
         <p:sp>
@@ -13740,7 +13698,7 @@
           <p:spPr>
             <a:xfrm>
               <a:off x="0" y="0"/>
-              <a:ext cx="8549640" cy="1329840"/>
+              <a:ext cx="8549280" cy="1329480"/>
             </a:xfrm>
             <a:custGeom>
               <a:avLst/>
@@ -13785,7 +13743,7 @@
           <p:spPr>
             <a:xfrm>
               <a:off x="2563560" y="0"/>
-              <a:ext cx="6577200" cy="1269360"/>
+              <a:ext cx="6576840" cy="1269000"/>
             </a:xfrm>
             <a:custGeom>
               <a:avLst/>
@@ -13835,7 +13793,7 @@
           <p:spPr>
             <a:xfrm>
               <a:off x="-6120" y="0"/>
-              <a:ext cx="7295040" cy="1468440"/>
+              <a:ext cx="7294680" cy="1468080"/>
             </a:xfrm>
             <a:custGeom>
               <a:avLst/>
@@ -13885,7 +13843,7 @@
           <p:spPr>
             <a:xfrm>
               <a:off x="3596040" y="4667040"/>
-              <a:ext cx="5087520" cy="473400"/>
+              <a:ext cx="5087160" cy="473040"/>
             </a:xfrm>
             <a:custGeom>
               <a:avLst/>
@@ -13930,7 +13888,7 @@
           <p:spPr>
             <a:xfrm>
               <a:off x="5524920" y="4692600"/>
-              <a:ext cx="3633840" cy="467280"/>
+              <a:ext cx="3633480" cy="466920"/>
             </a:xfrm>
             <a:custGeom>
               <a:avLst/>
@@ -13977,7 +13935,7 @@
           <p:spPr>
             <a:xfrm>
               <a:off x="7521480" y="4023000"/>
-              <a:ext cx="1631520" cy="1136880"/>
+              <a:ext cx="1631160" cy="1136520"/>
             </a:xfrm>
             <a:custGeom>
               <a:avLst/>
@@ -14074,19 +14032,18 @@
         </p:spPr>
         <p:txBody>
           <a:bodyPr lIns="0" rIns="0" tIns="0" bIns="0">
-            <a:normAutofit/>
-          </a:bodyPr>
-          <a:p>
-            <a:pPr marL="432000" indent="-324000">
+            <a:normAutofit fontScale="1000"/>
+          </a:bodyPr>
+          <a:p>
+            <a:pPr marL="1065167640" indent="23592960">
               <a:spcBef>
                 <a:spcPts val="1417"/>
               </a:spcBef>
               <a:buClr>
                 <a:srgbClr val="000000"/>
               </a:buClr>
-              <a:buSzPct val="45000"/>
-              <a:buFont typeface="Wingdings" charset="2"/>
-              <a:buChar char=""/>
+              <a:buFont typeface="Wingdings"/>
+              <a:buChar char="l"/>
             </a:pPr>
             <a:r>
               <a:rPr b="0" lang="en-GB" sz="3200" spc="-1" strike="noStrike">
@@ -14099,16 +14056,15 @@
             </a:endParaRPr>
           </a:p>
           <a:p>
-            <a:pPr lvl="1" marL="864000" indent="-324000">
+            <a:pPr lvl="1" marL="1772427960" indent="23592960">
               <a:spcBef>
                 <a:spcPts val="1134"/>
               </a:spcBef>
               <a:buClr>
                 <a:srgbClr val="000000"/>
               </a:buClr>
-              <a:buSzPct val="75000"/>
-              <a:buFont typeface="Symbol" charset="2"/>
-              <a:buChar char=""/>
+              <a:buFont typeface="Wingdings"/>
+              <a:buChar char="l"/>
             </a:pPr>
             <a:r>
               <a:rPr b="0" lang="en-GB" sz="2800" spc="-1" strike="noStrike">
@@ -14121,16 +14077,15 @@
             </a:endParaRPr>
           </a:p>
           <a:p>
-            <a:pPr lvl="2" marL="1296000" indent="-288000">
+            <a:pPr lvl="2" marL="1065167640" indent="23592960">
               <a:spcBef>
                 <a:spcPts val="850"/>
               </a:spcBef>
               <a:buClr>
                 <a:srgbClr val="000000"/>
               </a:buClr>
-              <a:buSzPct val="45000"/>
-              <a:buFont typeface="Wingdings" charset="2"/>
-              <a:buChar char=""/>
+              <a:buFont typeface="Wingdings"/>
+              <a:buChar char="l"/>
             </a:pPr>
             <a:r>
               <a:rPr b="0" lang="en-GB" sz="2400" spc="-1" strike="noStrike">
@@ -14143,16 +14098,15 @@
             </a:endParaRPr>
           </a:p>
           <a:p>
-            <a:pPr lvl="3" marL="1728000" indent="-216000">
+            <a:pPr lvl="3" marL="1772427960" indent="23592960">
               <a:spcBef>
                 <a:spcPts val="567"/>
               </a:spcBef>
               <a:buClr>
                 <a:srgbClr val="000000"/>
               </a:buClr>
-              <a:buSzPct val="75000"/>
-              <a:buFont typeface="Symbol" charset="2"/>
-              <a:buChar char=""/>
+              <a:buFont typeface="Wingdings"/>
+              <a:buChar char="l"/>
             </a:pPr>
             <a:r>
               <a:rPr b="0" lang="en-GB" sz="2000" spc="-1" strike="noStrike">
@@ -14165,16 +14119,15 @@
             </a:endParaRPr>
           </a:p>
           <a:p>
-            <a:pPr lvl="4" marL="2160000" indent="-216000">
+            <a:pPr lvl="4" marL="1065167640" indent="23592960">
               <a:spcBef>
                 <a:spcPts val="283"/>
               </a:spcBef>
               <a:buClr>
                 <a:srgbClr val="000000"/>
               </a:buClr>
-              <a:buSzPct val="45000"/>
-              <a:buFont typeface="Wingdings" charset="2"/>
-              <a:buChar char=""/>
+              <a:buFont typeface="Wingdings"/>
+              <a:buChar char="l"/>
             </a:pPr>
             <a:r>
               <a:rPr b="0" lang="en-GB" sz="2000" spc="-1" strike="noStrike">
@@ -14187,16 +14140,15 @@
             </a:endParaRPr>
           </a:p>
           <a:p>
-            <a:pPr lvl="5" marL="2592000" indent="-216000">
+            <a:pPr lvl="5" marL="1065167640" indent="23592960">
               <a:spcBef>
                 <a:spcPts val="283"/>
               </a:spcBef>
               <a:buClr>
                 <a:srgbClr val="000000"/>
               </a:buClr>
-              <a:buSzPct val="45000"/>
-              <a:buFont typeface="Wingdings" charset="2"/>
-              <a:buChar char=""/>
+              <a:buFont typeface="Wingdings"/>
+              <a:buChar char="l"/>
             </a:pPr>
             <a:r>
               <a:rPr b="0" lang="en-GB" sz="2000" spc="-1" strike="noStrike">
@@ -14209,16 +14161,15 @@
             </a:endParaRPr>
           </a:p>
           <a:p>
-            <a:pPr lvl="6" marL="3024000" indent="-216000">
+            <a:pPr lvl="6" marL="1065167640" indent="23592960">
               <a:spcBef>
                 <a:spcPts val="283"/>
               </a:spcBef>
               <a:buClr>
                 <a:srgbClr val="000000"/>
               </a:buClr>
-              <a:buSzPct val="45000"/>
-              <a:buFont typeface="Wingdings" charset="2"/>
-              <a:buChar char=""/>
+              <a:buFont typeface="Wingdings"/>
+              <a:buChar char="l"/>
             </a:pPr>
             <a:r>
               <a:rPr b="0" lang="en-GB" sz="2000" spc="-1" strike="noStrike">
@@ -14285,9 +14236,9 @@
         <p:grpSpPr>
           <a:xfrm>
             <a:off x="-6120" y="0"/>
-            <a:ext cx="9164880" cy="5159880"/>
+            <a:ext cx="9164520" cy="5159520"/>
             <a:chOff x="-6120" y="0"/>
-            <a:chExt cx="9164880" cy="5159880"/>
+            <a:chExt cx="9164520" cy="5159520"/>
           </a:xfrm>
         </p:grpSpPr>
         <p:sp>
@@ -14299,7 +14250,7 @@
           <p:spPr>
             <a:xfrm>
               <a:off x="0" y="0"/>
-              <a:ext cx="8549640" cy="1329840"/>
+              <a:ext cx="8549280" cy="1329480"/>
             </a:xfrm>
             <a:custGeom>
               <a:avLst/>
@@ -14344,7 +14295,7 @@
           <p:spPr>
             <a:xfrm>
               <a:off x="2563560" y="0"/>
-              <a:ext cx="6577200" cy="1269360"/>
+              <a:ext cx="6576840" cy="1269000"/>
             </a:xfrm>
             <a:custGeom>
               <a:avLst/>
@@ -14394,7 +14345,7 @@
           <p:spPr>
             <a:xfrm>
               <a:off x="-6120" y="0"/>
-              <a:ext cx="7295040" cy="1468440"/>
+              <a:ext cx="7294680" cy="1468080"/>
             </a:xfrm>
             <a:custGeom>
               <a:avLst/>
@@ -14444,7 +14395,7 @@
           <p:spPr>
             <a:xfrm>
               <a:off x="3596040" y="4667040"/>
-              <a:ext cx="5087520" cy="473400"/>
+              <a:ext cx="5087160" cy="473040"/>
             </a:xfrm>
             <a:custGeom>
               <a:avLst/>
@@ -14489,7 +14440,7 @@
           <p:spPr>
             <a:xfrm>
               <a:off x="5524920" y="4692600"/>
-              <a:ext cx="3633840" cy="467280"/>
+              <a:ext cx="3633480" cy="466920"/>
             </a:xfrm>
             <a:custGeom>
               <a:avLst/>
@@ -14536,7 +14487,7 @@
           <p:spPr>
             <a:xfrm>
               <a:off x="7521480" y="4023000"/>
-              <a:ext cx="1631520" cy="1136880"/>
+              <a:ext cx="1631160" cy="1136520"/>
             </a:xfrm>
             <a:custGeom>
               <a:avLst/>
@@ -14633,19 +14584,18 @@
         </p:spPr>
         <p:txBody>
           <a:bodyPr lIns="0" rIns="0" tIns="0" bIns="0">
-            <a:normAutofit/>
-          </a:bodyPr>
-          <a:p>
-            <a:pPr marL="432000" indent="-324000">
+            <a:normAutofit fontScale="1000"/>
+          </a:bodyPr>
+          <a:p>
+            <a:pPr marL="1065167640" indent="23592960">
               <a:spcBef>
                 <a:spcPts val="1417"/>
               </a:spcBef>
               <a:buClr>
                 <a:srgbClr val="000000"/>
               </a:buClr>
-              <a:buSzPct val="45000"/>
-              <a:buFont typeface="Wingdings" charset="2"/>
-              <a:buChar char=""/>
+              <a:buFont typeface="Wingdings"/>
+              <a:buChar char="l"/>
             </a:pPr>
             <a:r>
               <a:rPr b="0" lang="en-GB" sz="3200" spc="-1" strike="noStrike">
@@ -14658,16 +14608,15 @@
             </a:endParaRPr>
           </a:p>
           <a:p>
-            <a:pPr lvl="1" marL="864000" indent="-324000">
+            <a:pPr lvl="1" marL="1772427960" indent="23592960">
               <a:spcBef>
                 <a:spcPts val="1134"/>
               </a:spcBef>
               <a:buClr>
                 <a:srgbClr val="000000"/>
               </a:buClr>
-              <a:buSzPct val="75000"/>
-              <a:buFont typeface="Symbol" charset="2"/>
-              <a:buChar char=""/>
+              <a:buFont typeface="Wingdings"/>
+              <a:buChar char="l"/>
             </a:pPr>
             <a:r>
               <a:rPr b="0" lang="en-GB" sz="2800" spc="-1" strike="noStrike">
@@ -14680,16 +14629,15 @@
             </a:endParaRPr>
           </a:p>
           <a:p>
-            <a:pPr lvl="2" marL="1296000" indent="-288000">
+            <a:pPr lvl="2" marL="1065167640" indent="23592960">
               <a:spcBef>
                 <a:spcPts val="850"/>
               </a:spcBef>
               <a:buClr>
                 <a:srgbClr val="000000"/>
               </a:buClr>
-              <a:buSzPct val="45000"/>
-              <a:buFont typeface="Wingdings" charset="2"/>
-              <a:buChar char=""/>
+              <a:buFont typeface="Wingdings"/>
+              <a:buChar char="l"/>
             </a:pPr>
             <a:r>
               <a:rPr b="0" lang="en-GB" sz="2400" spc="-1" strike="noStrike">
@@ -14702,16 +14650,15 @@
             </a:endParaRPr>
           </a:p>
           <a:p>
-            <a:pPr lvl="3" marL="1728000" indent="-216000">
+            <a:pPr lvl="3" marL="1772427960" indent="23592960">
               <a:spcBef>
                 <a:spcPts val="567"/>
               </a:spcBef>
               <a:buClr>
                 <a:srgbClr val="000000"/>
               </a:buClr>
-              <a:buSzPct val="75000"/>
-              <a:buFont typeface="Symbol" charset="2"/>
-              <a:buChar char=""/>
+              <a:buFont typeface="Wingdings"/>
+              <a:buChar char="l"/>
             </a:pPr>
             <a:r>
               <a:rPr b="0" lang="en-GB" sz="2000" spc="-1" strike="noStrike">
@@ -14724,16 +14671,15 @@
             </a:endParaRPr>
           </a:p>
           <a:p>
-            <a:pPr lvl="4" marL="2160000" indent="-216000">
+            <a:pPr lvl="4" marL="1065167640" indent="23592960">
               <a:spcBef>
                 <a:spcPts val="283"/>
               </a:spcBef>
               <a:buClr>
                 <a:srgbClr val="000000"/>
               </a:buClr>
-              <a:buSzPct val="45000"/>
-              <a:buFont typeface="Wingdings" charset="2"/>
-              <a:buChar char=""/>
+              <a:buFont typeface="Wingdings"/>
+              <a:buChar char="l"/>
             </a:pPr>
             <a:r>
               <a:rPr b="0" lang="en-GB" sz="2000" spc="-1" strike="noStrike">
@@ -14746,16 +14692,15 @@
             </a:endParaRPr>
           </a:p>
           <a:p>
-            <a:pPr lvl="5" marL="2592000" indent="-216000">
+            <a:pPr lvl="5" marL="1065167640" indent="23592960">
               <a:spcBef>
                 <a:spcPts val="283"/>
               </a:spcBef>
               <a:buClr>
                 <a:srgbClr val="000000"/>
               </a:buClr>
-              <a:buSzPct val="45000"/>
-              <a:buFont typeface="Wingdings" charset="2"/>
-              <a:buChar char=""/>
+              <a:buFont typeface="Wingdings"/>
+              <a:buChar char="l"/>
             </a:pPr>
             <a:r>
               <a:rPr b="0" lang="en-GB" sz="2000" spc="-1" strike="noStrike">
@@ -14768,16 +14713,15 @@
             </a:endParaRPr>
           </a:p>
           <a:p>
-            <a:pPr lvl="6" marL="3024000" indent="-216000">
+            <a:pPr lvl="6" marL="1065167640" indent="23592960">
               <a:spcBef>
                 <a:spcPts val="283"/>
               </a:spcBef>
               <a:buClr>
                 <a:srgbClr val="000000"/>
               </a:buClr>
-              <a:buSzPct val="45000"/>
-              <a:buFont typeface="Wingdings" charset="2"/>
-              <a:buChar char=""/>
+              <a:buFont typeface="Wingdings"/>
+              <a:buChar char="l"/>
             </a:pPr>
             <a:r>
               <a:rPr b="0" lang="en-GB" sz="2000" spc="-1" strike="noStrike">
@@ -14844,7 +14788,7 @@
         <p:spPr>
           <a:xfrm>
             <a:off x="-2520" y="0"/>
-            <a:ext cx="5206320" cy="980280"/>
+            <a:ext cx="5205960" cy="979920"/>
           </a:xfrm>
           <a:custGeom>
             <a:avLst/>
@@ -14889,7 +14833,7 @@
         <p:spPr>
           <a:xfrm>
             <a:off x="-6120" y="0"/>
-            <a:ext cx="4442040" cy="1082520"/>
+            <a:ext cx="4441680" cy="1082160"/>
           </a:xfrm>
           <a:custGeom>
             <a:avLst/>
@@ -14939,7 +14883,7 @@
         <p:spPr>
           <a:xfrm>
             <a:off x="6375600" y="4745880"/>
-            <a:ext cx="2545560" cy="397800"/>
+            <a:ext cx="2545200" cy="397440"/>
           </a:xfrm>
           <a:custGeom>
             <a:avLst/>
@@ -14984,7 +14928,7 @@
         <p:spPr>
           <a:xfrm>
             <a:off x="7341120" y="4767480"/>
-            <a:ext cx="1818000" cy="392400"/>
+            <a:ext cx="1817640" cy="392040"/>
           </a:xfrm>
           <a:custGeom>
             <a:avLst/>
@@ -15031,7 +14975,7 @@
         <p:spPr>
           <a:xfrm>
             <a:off x="8340840" y="4204080"/>
-            <a:ext cx="815040" cy="955800"/>
+            <a:ext cx="814680" cy="955440"/>
           </a:xfrm>
           <a:custGeom>
             <a:avLst/>
@@ -15078,7 +15022,7 @@
         <p:spPr>
           <a:xfrm>
             <a:off x="1559160" y="-6120"/>
-            <a:ext cx="4113360" cy="941760"/>
+            <a:ext cx="4113000" cy="941400"/>
           </a:xfrm>
           <a:custGeom>
             <a:avLst/>
@@ -15177,19 +15121,18 @@
         </p:spPr>
         <p:txBody>
           <a:bodyPr lIns="0" rIns="0" tIns="0" bIns="0">
-            <a:normAutofit/>
-          </a:bodyPr>
-          <a:p>
-            <a:pPr marL="432000" indent="-324000">
+            <a:normAutofit fontScale="1000"/>
+          </a:bodyPr>
+          <a:p>
+            <a:pPr marL="1065167640" indent="23592960">
               <a:spcBef>
                 <a:spcPts val="1417"/>
               </a:spcBef>
               <a:buClr>
                 <a:srgbClr val="000000"/>
               </a:buClr>
-              <a:buSzPct val="45000"/>
-              <a:buFont typeface="Wingdings" charset="2"/>
-              <a:buChar char=""/>
+              <a:buFont typeface="Wingdings"/>
+              <a:buChar char="l"/>
             </a:pPr>
             <a:r>
               <a:rPr b="0" lang="en-GB" sz="3200" spc="-1" strike="noStrike">
@@ -15202,16 +15145,15 @@
             </a:endParaRPr>
           </a:p>
           <a:p>
-            <a:pPr lvl="1" marL="864000" indent="-324000">
+            <a:pPr lvl="1" marL="1772427960" indent="23592960">
               <a:spcBef>
                 <a:spcPts val="1134"/>
               </a:spcBef>
               <a:buClr>
                 <a:srgbClr val="000000"/>
               </a:buClr>
-              <a:buSzPct val="75000"/>
-              <a:buFont typeface="Symbol" charset="2"/>
-              <a:buChar char=""/>
+              <a:buFont typeface="Wingdings"/>
+              <a:buChar char="l"/>
             </a:pPr>
             <a:r>
               <a:rPr b="0" lang="en-GB" sz="2800" spc="-1" strike="noStrike">
@@ -15224,16 +15166,15 @@
             </a:endParaRPr>
           </a:p>
           <a:p>
-            <a:pPr lvl="2" marL="1296000" indent="-288000">
+            <a:pPr lvl="2" marL="1065167640" indent="23592960">
               <a:spcBef>
                 <a:spcPts val="850"/>
               </a:spcBef>
               <a:buClr>
                 <a:srgbClr val="000000"/>
               </a:buClr>
-              <a:buSzPct val="45000"/>
-              <a:buFont typeface="Wingdings" charset="2"/>
-              <a:buChar char=""/>
+              <a:buFont typeface="Wingdings"/>
+              <a:buChar char="l"/>
             </a:pPr>
             <a:r>
               <a:rPr b="0" lang="en-GB" sz="2400" spc="-1" strike="noStrike">
@@ -15246,16 +15187,15 @@
             </a:endParaRPr>
           </a:p>
           <a:p>
-            <a:pPr lvl="3" marL="1728000" indent="-216000">
+            <a:pPr lvl="3" marL="1772427960" indent="23592960">
               <a:spcBef>
                 <a:spcPts val="567"/>
               </a:spcBef>
               <a:buClr>
                 <a:srgbClr val="000000"/>
               </a:buClr>
-              <a:buSzPct val="75000"/>
-              <a:buFont typeface="Symbol" charset="2"/>
-              <a:buChar char=""/>
+              <a:buFont typeface="Wingdings"/>
+              <a:buChar char="l"/>
             </a:pPr>
             <a:r>
               <a:rPr b="0" lang="en-GB" sz="2000" spc="-1" strike="noStrike">
@@ -15268,16 +15208,15 @@
             </a:endParaRPr>
           </a:p>
           <a:p>
-            <a:pPr lvl="4" marL="2160000" indent="-216000">
+            <a:pPr lvl="4" marL="1065167640" indent="23592960">
               <a:spcBef>
                 <a:spcPts val="283"/>
               </a:spcBef>
               <a:buClr>
                 <a:srgbClr val="000000"/>
               </a:buClr>
-              <a:buSzPct val="45000"/>
-              <a:buFont typeface="Wingdings" charset="2"/>
-              <a:buChar char=""/>
+              <a:buFont typeface="Wingdings"/>
+              <a:buChar char="l"/>
             </a:pPr>
             <a:r>
               <a:rPr b="0" lang="en-GB" sz="2000" spc="-1" strike="noStrike">
@@ -15290,16 +15229,15 @@
             </a:endParaRPr>
           </a:p>
           <a:p>
-            <a:pPr lvl="5" marL="2592000" indent="-216000">
+            <a:pPr lvl="5" marL="1065167640" indent="23592960">
               <a:spcBef>
                 <a:spcPts val="283"/>
               </a:spcBef>
               <a:buClr>
                 <a:srgbClr val="000000"/>
               </a:buClr>
-              <a:buSzPct val="45000"/>
-              <a:buFont typeface="Wingdings" charset="2"/>
-              <a:buChar char=""/>
+              <a:buFont typeface="Wingdings"/>
+              <a:buChar char="l"/>
             </a:pPr>
             <a:r>
               <a:rPr b="0" lang="en-GB" sz="2000" spc="-1" strike="noStrike">
@@ -15312,16 +15250,15 @@
             </a:endParaRPr>
           </a:p>
           <a:p>
-            <a:pPr lvl="6" marL="3024000" indent="-216000">
+            <a:pPr lvl="6" marL="1065167640" indent="23592960">
               <a:spcBef>
                 <a:spcPts val="283"/>
               </a:spcBef>
               <a:buClr>
                 <a:srgbClr val="000000"/>
               </a:buClr>
-              <a:buSzPct val="45000"/>
-              <a:buFont typeface="Wingdings" charset="2"/>
-              <a:buChar char=""/>
+              <a:buFont typeface="Wingdings"/>
+              <a:buChar char="l"/>
             </a:pPr>
             <a:r>
               <a:rPr b="0" lang="en-GB" sz="2000" spc="-1" strike="noStrike">
@@ -15381,7 +15318,7 @@
         <p:spPr>
           <a:xfrm>
             <a:off x="1719000" y="1991880"/>
-            <a:ext cx="5702760" cy="1156680"/>
+            <a:ext cx="5702400" cy="1156320"/>
           </a:xfrm>
           <a:prstGeom prst="rect">
             <a:avLst/>
@@ -15432,7 +15369,7 @@
         <p:spPr>
           <a:xfrm>
             <a:off x="0" y="2815560"/>
-            <a:ext cx="9141120" cy="781560"/>
+            <a:ext cx="9140760" cy="781200"/>
           </a:xfrm>
           <a:prstGeom prst="rect">
             <a:avLst/>
@@ -15513,7 +15450,7 @@
         <p:spPr>
           <a:xfrm>
             <a:off x="27000" y="4749840"/>
-            <a:ext cx="545400" cy="390240"/>
+            <a:ext cx="545040" cy="389880"/>
           </a:xfrm>
           <a:prstGeom prst="rect">
             <a:avLst/>
@@ -15539,7 +15476,7 @@
                 <a:spcPct val="100000"/>
               </a:lnSpc>
             </a:pPr>
-            <a:fld id="{9010E3A5-9998-4ADA-A30C-097D5E2393DD}" type="slidenum">
+            <a:fld id="{27CAFFF1-8B13-4ACB-B395-2922F7C8E67C}" type="slidenum">
               <a:rPr b="0" lang="en" sz="1200" spc="-1" strike="noStrike">
                 <a:solidFill>
                   <a:srgbClr val="00ae9d"/>
@@ -15568,7 +15505,7 @@
         <p:spPr>
           <a:xfrm>
             <a:off x="3600000" y="1008000"/>
-            <a:ext cx="2761200" cy="3957120"/>
+            <a:ext cx="2760840" cy="3956760"/>
           </a:xfrm>
           <a:prstGeom prst="rect">
             <a:avLst/>
@@ -15617,7 +15554,7 @@
         <p:spPr>
           <a:xfrm>
             <a:off x="27000" y="4749840"/>
-            <a:ext cx="545400" cy="390240"/>
+            <a:ext cx="545040" cy="389880"/>
           </a:xfrm>
           <a:prstGeom prst="rect">
             <a:avLst/>
@@ -15643,7 +15580,7 @@
                 <a:spcPct val="100000"/>
               </a:lnSpc>
             </a:pPr>
-            <a:fld id="{48D8E4F1-9809-4F20-A572-0E976531A4D5}" type="slidenum">
+            <a:fld id="{1A582EF2-22C0-4104-A46E-F3B0CEBC811C}" type="slidenum">
               <a:rPr b="0" lang="en" sz="1200" spc="-1" strike="noStrike">
                 <a:solidFill>
                   <a:srgbClr val="00ae9d"/>
@@ -15672,7 +15609,7 @@
         <p:spPr>
           <a:xfrm>
             <a:off x="1224000" y="1080000"/>
-            <a:ext cx="6765120" cy="3712680"/>
+            <a:ext cx="6764760" cy="3712320"/>
           </a:xfrm>
           <a:prstGeom prst="rect">
             <a:avLst/>
@@ -15721,7 +15658,7 @@
         <p:spPr>
           <a:xfrm>
             <a:off x="27000" y="4749840"/>
-            <a:ext cx="545400" cy="390240"/>
+            <a:ext cx="545040" cy="389880"/>
           </a:xfrm>
           <a:prstGeom prst="rect">
             <a:avLst/>
@@ -15747,7 +15684,7 @@
                 <a:spcPct val="100000"/>
               </a:lnSpc>
             </a:pPr>
-            <a:fld id="{3895FE82-6670-42DA-BFF6-6E9C4FABD907}" type="slidenum">
+            <a:fld id="{081979F9-407F-4065-AF92-9C14F7BEE7A2}" type="slidenum">
               <a:rPr b="0" lang="en" sz="1200" spc="-1" strike="noStrike">
                 <a:solidFill>
                   <a:srgbClr val="00ae9d"/>
@@ -15776,7 +15713,7 @@
         <p:spPr>
           <a:xfrm>
             <a:off x="859680" y="1080000"/>
-            <a:ext cx="7407000" cy="3598920"/>
+            <a:ext cx="7406640" cy="3598560"/>
           </a:xfrm>
           <a:prstGeom prst="rect">
             <a:avLst/>
@@ -15825,7 +15762,7 @@
         <p:spPr>
           <a:xfrm>
             <a:off x="27000" y="4749840"/>
-            <a:ext cx="545400" cy="390240"/>
+            <a:ext cx="545040" cy="389880"/>
           </a:xfrm>
           <a:prstGeom prst="rect">
             <a:avLst/>
@@ -15851,7 +15788,7 @@
                 <a:spcPct val="100000"/>
               </a:lnSpc>
             </a:pPr>
-            <a:fld id="{90C8D98B-CF50-4F1A-8B11-99256E8A091F}" type="slidenum">
+            <a:fld id="{0F05D965-721D-483E-BCFA-37A62450FE4A}" type="slidenum">
               <a:rPr b="0" lang="en" sz="1200" spc="-1" strike="noStrike">
                 <a:solidFill>
                   <a:srgbClr val="00ae9d"/>
@@ -15880,7 +15817,7 @@
         <p:spPr>
           <a:xfrm>
             <a:off x="1872000" y="1129680"/>
-            <a:ext cx="6112080" cy="3691440"/>
+            <a:ext cx="6111720" cy="3691080"/>
           </a:xfrm>
           <a:prstGeom prst="rect">
             <a:avLst/>
@@ -15929,7 +15866,7 @@
         <p:spPr>
           <a:xfrm>
             <a:off x="886680" y="398520"/>
-            <a:ext cx="7367400" cy="854280"/>
+            <a:ext cx="7367040" cy="853920"/>
           </a:xfrm>
           <a:prstGeom prst="rect">
             <a:avLst/>
@@ -15980,7 +15917,7 @@
         <p:spPr>
           <a:xfrm>
             <a:off x="904680" y="1467000"/>
-            <a:ext cx="2404440" cy="1301760"/>
+            <a:ext cx="2404080" cy="1301400"/>
           </a:xfrm>
           <a:prstGeom prst="rect">
             <a:avLst/>
@@ -16100,47 +16037,7 @@
                 <a:latin typeface="Karla"/>
                 <a:ea typeface="Karla"/>
               </a:rPr>
-              <a:t>danie fiszek, generowanie widoków oraz komunikacj</a:t>
-            </a:r>
-            <a:r>
-              <a:rPr b="0" lang="en" sz="1100" spc="-1" strike="noStrike">
-                <a:solidFill>
-                  <a:srgbClr val="004c52"/>
-                </a:solidFill>
-                <a:latin typeface="franklin gothic"/>
-                <a:ea typeface="Karla"/>
-              </a:rPr>
-              <a:t>ę</a:t>
-            </a:r>
-            <a:r>
-              <a:rPr b="0" lang="en" sz="1200" spc="-1" strike="noStrike">
-                <a:solidFill>
-                  <a:srgbClr val="004c52"/>
-                </a:solidFill>
-                <a:latin typeface="Karla"/>
-                <a:ea typeface="Karla"/>
-              </a:rPr>
-              <a:t> z pozosta</a:t>
-            </a:r>
-            <a:r>
-              <a:rPr b="0" lang="en" sz="1100" spc="-1" strike="noStrike">
-                <a:solidFill>
-                  <a:srgbClr val="004c52"/>
-                </a:solidFill>
-                <a:latin typeface="franklin gothic"/>
-                <a:ea typeface="Karla"/>
-              </a:rPr>
-              <a:t>ł</a:t>
-            </a:r>
-            <a:r>
-              <a:rPr b="0" lang="en" sz="1200" spc="-1" strike="noStrike">
-                <a:solidFill>
-                  <a:srgbClr val="004c52"/>
-                </a:solidFill>
-                <a:latin typeface="Karla"/>
-                <a:ea typeface="Karla"/>
-              </a:rPr>
-              <a:t>ymi serwisami.</a:t>
+              <a:t>danie fiszek oraz generowanie widoków.</a:t>
             </a:r>
             <a:endParaRPr b="0" lang="en-GB" sz="1200" spc="-1" strike="noStrike">
               <a:latin typeface="Arial"/>
@@ -16157,7 +16054,7 @@
         <p:spPr>
           <a:xfrm>
             <a:off x="3404160" y="1467000"/>
-            <a:ext cx="2568960" cy="1301760"/>
+            <a:ext cx="2568600" cy="1301400"/>
           </a:xfrm>
           <a:prstGeom prst="rect">
             <a:avLst/>
@@ -16257,7 +16154,18 @@
                 <a:latin typeface="Karla"/>
                 <a:ea typeface="Karla"/>
               </a:rPr>
-              <a:t>zane z logowaniem.</a:t>
+              <a:t>zane</a:t>
+            </a:r>
+            <a:br/>
+            <a:r>
+              <a:rPr b="0" lang="en" sz="1200" spc="-1" strike="noStrike">
+                <a:solidFill>
+                  <a:srgbClr val="004c52"/>
+                </a:solidFill>
+                <a:latin typeface="Karla"/>
+                <a:ea typeface="Karla"/>
+              </a:rPr>
+              <a:t>z logowaniem.</a:t>
             </a:r>
             <a:endParaRPr b="0" lang="en-GB" sz="1200" spc="-1" strike="noStrike">
               <a:latin typeface="Arial"/>
@@ -16274,7 +16182,7 @@
         <p:spPr>
           <a:xfrm>
             <a:off x="5939640" y="1467000"/>
-            <a:ext cx="2409480" cy="1301760"/>
+            <a:ext cx="2409120" cy="1301400"/>
           </a:xfrm>
           <a:prstGeom prst="rect">
             <a:avLst/>
@@ -16344,7 +16252,7 @@
                 <a:latin typeface="franklin gothic"/>
                 <a:ea typeface="Karla"/>
               </a:rPr>
-              <a:t>ę</a:t>
+              <a:t>ę i</a:t>
             </a:r>
             <a:r>
               <a:rPr b="0" lang="en" sz="1200" spc="-1" strike="noStrike">
@@ -16354,17 +16262,7 @@
                 <a:latin typeface="Karla"/>
                 <a:ea typeface="Karla"/>
               </a:rPr>
-              <a:t> </a:t>
-            </a:r>
-            <a:r>
-              <a:rPr b="0" lang="en" sz="1200" spc="-1" strike="noStrike">
-                <a:solidFill>
-                  <a:srgbClr val="004c52"/>
-                </a:solidFill>
-                <a:latin typeface="Karla"/>
-                <a:ea typeface="Karla"/>
-              </a:rPr>
-              <a:t>oraz przechowywanie fiszek oraz informacji o nich.</a:t>
+              <a:t> przechowywanie fiszek oraz informacji o nich.</a:t>
             </a:r>
             <a:endParaRPr b="0" lang="en-GB" sz="1200" spc="-1" strike="noStrike">
               <a:latin typeface="Arial"/>
@@ -16381,7 +16279,7 @@
         <p:spPr>
           <a:xfrm>
             <a:off x="904680" y="3048120"/>
-            <a:ext cx="2404440" cy="1301760"/>
+            <a:ext cx="2404080" cy="1301400"/>
           </a:xfrm>
           <a:prstGeom prst="rect">
             <a:avLst/>
@@ -16508,7 +16406,7 @@
         <p:spPr>
           <a:xfrm>
             <a:off x="3404160" y="3048120"/>
-            <a:ext cx="2340360" cy="1301760"/>
+            <a:ext cx="2340000" cy="1301400"/>
           </a:xfrm>
           <a:prstGeom prst="rect">
             <a:avLst/>
@@ -16588,7 +16486,18 @@
                 <a:latin typeface="Karla"/>
                 <a:ea typeface="Karla"/>
               </a:rPr>
-              <a:t>liwia bardzo szybkie tworzenie nowych fiszek z poziomu przegl</a:t>
+              <a:t>liwia bardzo szybkie tworzenie nowych fiszek </a:t>
+            </a:r>
+            <a:br/>
+            <a:r>
+              <a:rPr b="0" lang="en" sz="1200" spc="-1" strike="noStrike">
+                <a:solidFill>
+                  <a:srgbClr val="004c52"/>
+                </a:solidFill>
+                <a:latin typeface="Karla"/>
+                <a:ea typeface="Karla"/>
+              </a:rPr>
+              <a:t>z poziomu przegl</a:t>
             </a:r>
             <a:r>
               <a:rPr b="0" lang="en" sz="1100" spc="-1" strike="noStrike">
@@ -16625,7 +16534,7 @@
         <p:spPr>
           <a:xfrm>
             <a:off x="27000" y="4749840"/>
-            <a:ext cx="545400" cy="390240"/>
+            <a:ext cx="545040" cy="389880"/>
           </a:xfrm>
           <a:prstGeom prst="rect">
             <a:avLst/>
@@ -16651,7 +16560,7 @@
                 <a:spcPct val="100000"/>
               </a:lnSpc>
             </a:pPr>
-            <a:fld id="{FDDD0C98-F622-454B-B1B8-22B8ED7AA779}" type="slidenum">
+            <a:fld id="{9AB8AD79-3C95-41C9-AEE7-31C5858C921D}" type="slidenum">
               <a:rPr b="0" lang="en" sz="1200" spc="-1" strike="noStrike">
                 <a:solidFill>
                   <a:srgbClr val="00ae9d"/>
@@ -16706,7 +16615,7 @@
         <p:spPr>
           <a:xfrm>
             <a:off x="886680" y="398520"/>
-            <a:ext cx="7367400" cy="854280"/>
+            <a:ext cx="7367040" cy="853920"/>
           </a:xfrm>
           <a:prstGeom prst="rect">
             <a:avLst/>
@@ -16757,7 +16666,7 @@
         <p:spPr>
           <a:xfrm>
             <a:off x="27000" y="4749840"/>
-            <a:ext cx="545400" cy="390240"/>
+            <a:ext cx="545040" cy="389880"/>
           </a:xfrm>
           <a:prstGeom prst="rect">
             <a:avLst/>
@@ -16783,7 +16692,7 @@
                 <a:spcPct val="100000"/>
               </a:lnSpc>
             </a:pPr>
-            <a:fld id="{4F6F0817-750B-490E-906B-779A2B7DE8D0}" type="slidenum">
+            <a:fld id="{334A7E03-FBCC-4F82-AFDC-3A8D9F650A0C}" type="slidenum">
               <a:rPr b="0" lang="en" sz="1200" spc="-1" strike="noStrike">
                 <a:solidFill>
                   <a:srgbClr val="00ae9d"/>
@@ -16811,8 +16720,8 @@
         </p:blipFill>
         <p:spPr>
           <a:xfrm>
-            <a:off x="1511280" y="1836000"/>
-            <a:ext cx="6082200" cy="2508120"/>
+            <a:off x="1440000" y="1748160"/>
+            <a:ext cx="6408000" cy="2643840"/>
           </a:xfrm>
           <a:prstGeom prst="rect">
             <a:avLst/>
@@ -16861,7 +16770,7 @@
         <p:spPr>
           <a:xfrm>
             <a:off x="886680" y="398520"/>
-            <a:ext cx="7367400" cy="854280"/>
+            <a:ext cx="7367040" cy="853920"/>
           </a:xfrm>
           <a:prstGeom prst="rect">
             <a:avLst/>
@@ -16912,7 +16821,7 @@
         <p:spPr>
           <a:xfrm>
             <a:off x="27000" y="4749840"/>
-            <a:ext cx="545400" cy="390240"/>
+            <a:ext cx="545040" cy="389880"/>
           </a:xfrm>
           <a:prstGeom prst="rect">
             <a:avLst/>
@@ -16938,7 +16847,7 @@
                 <a:spcPct val="100000"/>
               </a:lnSpc>
             </a:pPr>
-            <a:fld id="{7C64C5CB-993D-48FA-BFE5-5EA0B46F91CA}" type="slidenum">
+            <a:fld id="{0C873293-3A6E-415D-A58C-F4D26A30A5ED}" type="slidenum">
               <a:rPr b="0" lang="en" sz="1200" spc="-1" strike="noStrike">
                 <a:solidFill>
                   <a:srgbClr val="00ae9d"/>
@@ -16966,8 +16875,8 @@
         </p:blipFill>
         <p:spPr>
           <a:xfrm>
-            <a:off x="720000" y="1800000"/>
-            <a:ext cx="8169120" cy="2209680"/>
+            <a:off x="648000" y="1716840"/>
+            <a:ext cx="8136000" cy="2743200"/>
           </a:xfrm>
           <a:prstGeom prst="rect">
             <a:avLst/>
@@ -17016,7 +16925,7 @@
         <p:spPr>
           <a:xfrm>
             <a:off x="886680" y="398520"/>
-            <a:ext cx="7367400" cy="854280"/>
+            <a:ext cx="7367040" cy="853920"/>
           </a:xfrm>
           <a:prstGeom prst="rect">
             <a:avLst/>
@@ -17067,7 +16976,7 @@
         <p:spPr>
           <a:xfrm>
             <a:off x="27000" y="4749840"/>
-            <a:ext cx="545400" cy="390240"/>
+            <a:ext cx="545040" cy="389880"/>
           </a:xfrm>
           <a:prstGeom prst="rect">
             <a:avLst/>
@@ -17093,7 +17002,7 @@
                 <a:spcPct val="100000"/>
               </a:lnSpc>
             </a:pPr>
-            <a:fld id="{C6E0CBF0-9BBF-4FD1-9277-D30E103C2DA9}" type="slidenum">
+            <a:fld id="{CEF36313-BB7D-47FC-8710-BD7B3E968159}" type="slidenum">
               <a:rPr b="0" lang="en" sz="1200" spc="-1" strike="noStrike">
                 <a:solidFill>
                   <a:srgbClr val="00ae9d"/>
@@ -17121,8 +17030,8 @@
         </p:blipFill>
         <p:spPr>
           <a:xfrm>
-            <a:off x="1424520" y="1831680"/>
-            <a:ext cx="6204960" cy="2053800"/>
+            <a:off x="1212120" y="1831680"/>
+            <a:ext cx="6648480" cy="2200320"/>
           </a:xfrm>
           <a:prstGeom prst="rect">
             <a:avLst/>
@@ -17171,7 +17080,7 @@
         <p:spPr>
           <a:xfrm>
             <a:off x="886680" y="398520"/>
-            <a:ext cx="7367400" cy="854280"/>
+            <a:ext cx="7367040" cy="853920"/>
           </a:xfrm>
           <a:prstGeom prst="rect">
             <a:avLst/>
@@ -17222,7 +17131,7 @@
         <p:spPr>
           <a:xfrm>
             <a:off x="27000" y="4749840"/>
-            <a:ext cx="545400" cy="390240"/>
+            <a:ext cx="545040" cy="389880"/>
           </a:xfrm>
           <a:prstGeom prst="rect">
             <a:avLst/>
@@ -17248,7 +17157,7 @@
                 <a:spcPct val="100000"/>
               </a:lnSpc>
             </a:pPr>
-            <a:fld id="{2C3864E5-0BBC-4723-B7E6-EAF04216ABBD}" type="slidenum">
+            <a:fld id="{CDEB53AE-92BD-4DDC-AEE6-DBDCC970EA01}" type="slidenum">
               <a:rPr b="0" lang="en" sz="1200" spc="-1" strike="noStrike">
                 <a:solidFill>
                   <a:srgbClr val="00ae9d"/>
@@ -17276,8 +17185,8 @@
         </p:blipFill>
         <p:spPr>
           <a:xfrm>
-            <a:off x="1460520" y="1832040"/>
-            <a:ext cx="6204600" cy="2053440"/>
+            <a:off x="1188000" y="1832040"/>
+            <a:ext cx="6648120" cy="2199960"/>
           </a:xfrm>
           <a:prstGeom prst="rect">
             <a:avLst/>
@@ -17326,7 +17235,7 @@
         <p:spPr>
           <a:xfrm>
             <a:off x="3064680" y="1513080"/>
-            <a:ext cx="5530680" cy="1156680"/>
+            <a:ext cx="5530320" cy="1156320"/>
           </a:xfrm>
           <a:prstGeom prst="rect">
             <a:avLst/>
@@ -17377,7 +17286,7 @@
         <p:spPr>
           <a:xfrm>
             <a:off x="3064680" y="2636280"/>
-            <a:ext cx="5530680" cy="2194560"/>
+            <a:ext cx="5530320" cy="2194200"/>
           </a:xfrm>
           <a:prstGeom prst="rect">
             <a:avLst/>
@@ -17417,7 +17326,7 @@
               <a:t>Jakieś pytania?</a:t>
             </a:r>
             <a:endParaRPr b="0" lang="en-GB" sz="3600" spc="-1" strike="noStrike">
-              <a:latin typeface="Raleway"/>
+              <a:latin typeface="Arial"/>
             </a:endParaRPr>
           </a:p>
           <a:p>
@@ -17430,7 +17339,7 @@
               </a:spcBef>
             </a:pPr>
             <a:endParaRPr b="0" lang="en-GB" sz="3600" spc="-1" strike="noStrike">
-              <a:latin typeface="Raleway"/>
+              <a:latin typeface="Arial"/>
             </a:endParaRPr>
           </a:p>
           <a:p>
@@ -17453,7 +17362,7 @@
               <a:t>Gerard Dróżdż</a:t>
             </a:r>
             <a:endParaRPr b="0" lang="en-GB" sz="1800" spc="-1" strike="noStrike">
-              <a:latin typeface="Raleway"/>
+              <a:latin typeface="Arial"/>
             </a:endParaRPr>
           </a:p>
           <a:p>
@@ -17476,7 +17385,7 @@
               <a:t>Artur Matyjasek</a:t>
             </a:r>
             <a:endParaRPr b="0" lang="en-GB" sz="1800" spc="-1" strike="noStrike">
-              <a:latin typeface="Raleway"/>
+              <a:latin typeface="Arial"/>
             </a:endParaRPr>
           </a:p>
         </p:txBody>
@@ -17490,9 +17399,9 @@
         <p:grpSpPr>
           <a:xfrm>
             <a:off x="685800" y="1814400"/>
-            <a:ext cx="1678680" cy="1176480"/>
+            <a:ext cx="1678320" cy="1176120"/>
             <a:chOff x="685800" y="1814400"/>
-            <a:chExt cx="1678680" cy="1176480"/>
+            <a:chExt cx="1678320" cy="1176120"/>
           </a:xfrm>
         </p:grpSpPr>
         <p:sp>
@@ -17504,7 +17413,7 @@
           <p:spPr>
             <a:xfrm>
               <a:off x="685800" y="1814400"/>
-              <a:ext cx="1678680" cy="709920"/>
+              <a:ext cx="1678320" cy="709560"/>
             </a:xfrm>
             <a:custGeom>
               <a:avLst/>
@@ -17599,7 +17508,7 @@
           <p:spPr>
             <a:xfrm>
               <a:off x="685800" y="1972800"/>
-              <a:ext cx="1678680" cy="1018080"/>
+              <a:ext cx="1678320" cy="1017720"/>
             </a:xfrm>
             <a:custGeom>
               <a:avLst/>
@@ -17737,7 +17646,7 @@
         <p:spPr>
           <a:xfrm>
             <a:off x="1681920" y="2683080"/>
-            <a:ext cx="1271520" cy="1156680"/>
+            <a:ext cx="1271160" cy="1156320"/>
           </a:xfrm>
           <a:custGeom>
             <a:avLst/>
@@ -18198,7 +18107,7 @@
         <p:spPr>
           <a:xfrm>
             <a:off x="27000" y="4749840"/>
-            <a:ext cx="545400" cy="390240"/>
+            <a:ext cx="545040" cy="389880"/>
           </a:xfrm>
           <a:prstGeom prst="rect">
             <a:avLst/>
@@ -18224,7 +18133,7 @@
                 <a:spcPct val="100000"/>
               </a:lnSpc>
             </a:pPr>
-            <a:fld id="{2357476B-947F-4FB7-868A-E86964FD1776}" type="slidenum">
+            <a:fld id="{EA1D152C-CFA2-46D5-944C-26EF56C3AEB4}" type="slidenum">
               <a:rPr b="0" lang="en" sz="1200" spc="-1" strike="noStrike">
                 <a:solidFill>
                   <a:srgbClr val="00ae9d"/>
@@ -18279,7 +18188,7 @@
         <p:spPr>
           <a:xfrm>
             <a:off x="886680" y="398520"/>
-            <a:ext cx="7367400" cy="854280"/>
+            <a:ext cx="7367040" cy="853920"/>
           </a:xfrm>
           <a:prstGeom prst="rect">
             <a:avLst/>
@@ -18330,7 +18239,7 @@
         <p:spPr>
           <a:xfrm>
             <a:off x="886680" y="1592280"/>
-            <a:ext cx="3215880" cy="2835360"/>
+            <a:ext cx="3215520" cy="2835000"/>
           </a:xfrm>
           <a:prstGeom prst="rect">
             <a:avLst/>
@@ -18370,7 +18279,7 @@
               <a:t>UCZ SIĘ OPTYMALNIE</a:t>
             </a:r>
             <a:endParaRPr b="0" lang="en-GB" sz="1200" spc="-1" strike="noStrike">
-              <a:latin typeface="Karla"/>
+              <a:latin typeface="Arial"/>
             </a:endParaRPr>
           </a:p>
           <a:p>
@@ -18453,7 +18362,7 @@
               <a:t>ów do nauki.</a:t>
             </a:r>
             <a:endParaRPr b="0" lang="en-GB" sz="1200" spc="-1" strike="noStrike">
-              <a:latin typeface="Karla"/>
+              <a:latin typeface="Arial"/>
             </a:endParaRPr>
           </a:p>
           <a:p>
@@ -18533,17 +18442,7 @@
                 <a:latin typeface="Karla"/>
                 <a:ea typeface="Karla"/>
               </a:rPr>
-              <a:t>, praktycznie bez przerywania </a:t>
-            </a:r>
-            <a:r>
-              <a:rPr b="0" lang="en" sz="1200" spc="-1" strike="noStrike">
-                <a:solidFill>
-                  <a:srgbClr val="004c52"/>
-                </a:solidFill>
-                <a:latin typeface="Karla"/>
-                <a:ea typeface="Karla"/>
-              </a:rPr>
-              <a:t>tego co w</a:t>
+              <a:t>, praktycznie bez przerywania tego co w</a:t>
             </a:r>
             <a:r>
               <a:rPr b="0" lang="en" sz="1100" spc="-1" strike="noStrike">
@@ -18626,7 +18525,7 @@
               <a:t> wykona za Ciebie.</a:t>
             </a:r>
             <a:endParaRPr b="0" lang="en-GB" sz="1200" spc="-1" strike="noStrike">
-              <a:latin typeface="Karla"/>
+              <a:latin typeface="Arial"/>
             </a:endParaRPr>
           </a:p>
           <a:p>
@@ -18746,20 +18645,10 @@
                 <a:latin typeface="Karla"/>
                 <a:ea typeface="Karla"/>
               </a:rPr>
-              <a:t> tylko na nauce</a:t>
-            </a:r>
-            <a:r>
-              <a:rPr b="0" lang="en" sz="1200" spc="-1" strike="noStrike">
-                <a:solidFill>
-                  <a:srgbClr val="004c52"/>
-                </a:solidFill>
-                <a:latin typeface="Karla"/>
-                <a:ea typeface="Karla"/>
-              </a:rPr>
-              <a:t>.</a:t>
+              <a:t> tylko na nauce.</a:t>
             </a:r>
             <a:endParaRPr b="0" lang="en-GB" sz="1200" spc="-1" strike="noStrike">
-              <a:latin typeface="Karla"/>
+              <a:latin typeface="Arial"/>
             </a:endParaRPr>
           </a:p>
         </p:txBody>
@@ -18773,7 +18662,7 @@
         <p:spPr>
           <a:xfrm>
             <a:off x="4242960" y="1556280"/>
-            <a:ext cx="3749040" cy="2835360"/>
+            <a:ext cx="3748680" cy="2835000"/>
           </a:xfrm>
           <a:prstGeom prst="rect">
             <a:avLst/>
@@ -18813,7 +18702,7 @@
               <a:t>UCZ SIĘ O CZYM CHCESZ</a:t>
             </a:r>
             <a:endParaRPr b="0" lang="en-GB" sz="1200" spc="-1" strike="noStrike">
-              <a:latin typeface="Karla"/>
+              <a:latin typeface="Arial"/>
             </a:endParaRPr>
           </a:p>
           <a:p>
@@ -18876,7 +18765,7 @@
               <a:t>dy temat.</a:t>
             </a:r>
             <a:endParaRPr b="0" lang="en-GB" sz="1200" spc="-1" strike="noStrike">
-              <a:latin typeface="Karla"/>
+              <a:latin typeface="Arial"/>
             </a:endParaRPr>
           </a:p>
           <a:p>
@@ -18939,7 +18828,7 @@
               <a:t>ki”.</a:t>
             </a:r>
             <a:endParaRPr b="0" lang="en-GB" sz="1200" spc="-1" strike="noStrike">
-              <a:latin typeface="Karla"/>
+              <a:latin typeface="Arial"/>
             </a:endParaRPr>
           </a:p>
           <a:p>
@@ -19042,7 +18931,7 @@
               <a:t>cych konkretnych aspektów twojego wyszukiwania, takich jak “data”, “miejsce urodzenia” czy “autor”.</a:t>
             </a:r>
             <a:endParaRPr b="0" lang="en-GB" sz="1200" spc="-1" strike="noStrike">
-              <a:latin typeface="Karla"/>
+              <a:latin typeface="Arial"/>
             </a:endParaRPr>
           </a:p>
         </p:txBody>
@@ -19056,7 +18945,7 @@
         <p:spPr>
           <a:xfrm>
             <a:off x="886680" y="3753360"/>
-            <a:ext cx="6863040" cy="823320"/>
+            <a:ext cx="6862680" cy="822960"/>
           </a:xfrm>
           <a:prstGeom prst="rect">
             <a:avLst/>
@@ -19082,7 +18971,7 @@
         <p:spPr>
           <a:xfrm>
             <a:off x="27000" y="4749840"/>
-            <a:ext cx="545400" cy="390240"/>
+            <a:ext cx="545040" cy="389880"/>
           </a:xfrm>
           <a:prstGeom prst="rect">
             <a:avLst/>
@@ -19108,7 +18997,7 @@
                 <a:spcPct val="100000"/>
               </a:lnSpc>
             </a:pPr>
-            <a:fld id="{71CEC374-921C-4771-BB76-F0A3606FADB4}" type="slidenum">
+            <a:fld id="{8FF20AC4-6521-4D92-A33C-51F8E77CC319}" type="slidenum">
               <a:rPr b="0" lang="en" sz="1200" spc="-1" strike="noStrike">
                 <a:solidFill>
                   <a:srgbClr val="00ae9d"/>
@@ -19184,7 +19073,7 @@
         <p:spPr>
           <a:xfrm>
             <a:off x="3426480" y="1451160"/>
-            <a:ext cx="2287800" cy="547200"/>
+            <a:ext cx="2287440" cy="546840"/>
           </a:xfrm>
           <a:prstGeom prst="rect">
             <a:avLst/>
@@ -19203,7 +19092,7 @@
         <p:spPr>
           <a:xfrm>
             <a:off x="1106280" y="2209680"/>
-            <a:ext cx="6928560" cy="264240"/>
+            <a:ext cx="6928200" cy="263880"/>
           </a:xfrm>
           <a:prstGeom prst="rect">
             <a:avLst/>
@@ -19254,9 +19143,9 @@
         <p:grpSpPr>
           <a:xfrm>
             <a:off x="690480" y="3290040"/>
-            <a:ext cx="7759800" cy="889200"/>
+            <a:ext cx="7759440" cy="888840"/>
             <a:chOff x="690480" y="3290040"/>
-            <a:chExt cx="7759800" cy="889200"/>
+            <a:chExt cx="7759440" cy="888840"/>
           </a:xfrm>
         </p:grpSpPr>
         <p:grpSp>
@@ -19268,9 +19157,9 @@
           <p:grpSpPr>
             <a:xfrm>
               <a:off x="4735080" y="3290040"/>
-              <a:ext cx="1692720" cy="889200"/>
+              <a:ext cx="1692360" cy="888840"/>
               <a:chOff x="4735080" y="3290040"/>
-              <a:chExt cx="1692720" cy="889200"/>
+              <a:chExt cx="1692360" cy="888840"/>
             </a:xfrm>
           </p:grpSpPr>
           <p:sp>
@@ -19282,7 +19171,7 @@
             <p:spPr>
               <a:xfrm>
                 <a:off x="4735080" y="3545640"/>
-                <a:ext cx="1692720" cy="633600"/>
+                <a:ext cx="1692360" cy="633240"/>
               </a:xfrm>
               <a:prstGeom prst="rect">
                 <a:avLst/>
@@ -19333,7 +19222,7 @@
             <p:spPr>
               <a:xfrm>
                 <a:off x="5492880" y="3290040"/>
-                <a:ext cx="177480" cy="177840"/>
+                <a:ext cx="177120" cy="177480"/>
               </a:xfrm>
               <a:custGeom>
                 <a:avLst/>
@@ -19589,9 +19478,9 @@
           <p:grpSpPr>
             <a:xfrm>
               <a:off x="2712960" y="3290400"/>
-              <a:ext cx="1692720" cy="888840"/>
+              <a:ext cx="1692360" cy="888480"/>
               <a:chOff x="2712960" y="3290400"/>
-              <a:chExt cx="1692720" cy="888840"/>
+              <a:chExt cx="1692360" cy="888480"/>
             </a:xfrm>
           </p:grpSpPr>
           <p:sp>
@@ -19603,7 +19492,7 @@
             <p:spPr>
               <a:xfrm>
                 <a:off x="2712960" y="3545640"/>
-                <a:ext cx="1692720" cy="633600"/>
+                <a:ext cx="1692360" cy="633240"/>
               </a:xfrm>
               <a:prstGeom prst="rect">
                 <a:avLst/>
@@ -19654,7 +19543,7 @@
             <p:spPr>
               <a:xfrm>
                 <a:off x="3459240" y="3290400"/>
-                <a:ext cx="200160" cy="177480"/>
+                <a:ext cx="199800" cy="177120"/>
               </a:xfrm>
               <a:custGeom>
                 <a:avLst/>
@@ -20004,9 +19893,9 @@
           <p:grpSpPr>
             <a:xfrm>
               <a:off x="6757560" y="3290040"/>
-              <a:ext cx="1692720" cy="889200"/>
+              <a:ext cx="1692360" cy="888840"/>
               <a:chOff x="6757560" y="3290040"/>
-              <a:chExt cx="1692720" cy="889200"/>
+              <a:chExt cx="1692360" cy="888840"/>
             </a:xfrm>
           </p:grpSpPr>
           <p:sp>
@@ -20018,7 +19907,7 @@
             <p:spPr>
               <a:xfrm>
                 <a:off x="6757560" y="3545640"/>
-                <a:ext cx="1692720" cy="633600"/>
+                <a:ext cx="1692360" cy="633240"/>
               </a:xfrm>
               <a:prstGeom prst="rect">
                 <a:avLst/>
@@ -20069,7 +19958,7 @@
             <p:spPr>
               <a:xfrm>
                 <a:off x="7515000" y="3290040"/>
-                <a:ext cx="177480" cy="177840"/>
+                <a:ext cx="177120" cy="177480"/>
               </a:xfrm>
               <a:custGeom>
                 <a:avLst/>
@@ -20522,9 +20411,9 @@
           <p:grpSpPr>
             <a:xfrm>
               <a:off x="690480" y="3290400"/>
-              <a:ext cx="1692720" cy="888840"/>
+              <a:ext cx="1692360" cy="888480"/>
               <a:chOff x="690480" y="3290400"/>
-              <a:chExt cx="1692720" cy="888840"/>
+              <a:chExt cx="1692360" cy="888480"/>
             </a:xfrm>
           </p:grpSpPr>
           <p:sp>
@@ -20536,7 +20425,7 @@
             <p:spPr>
               <a:xfrm>
                 <a:off x="690480" y="3545640"/>
-                <a:ext cx="1692720" cy="633600"/>
+                <a:ext cx="1692360" cy="633240"/>
               </a:xfrm>
               <a:prstGeom prst="rect">
                 <a:avLst/>
@@ -20587,7 +20476,7 @@
             <p:spPr>
               <a:xfrm>
                 <a:off x="1425240" y="3290400"/>
-                <a:ext cx="223560" cy="177480"/>
+                <a:ext cx="223200" cy="177120"/>
               </a:xfrm>
               <a:custGeom>
                 <a:avLst/>
@@ -20855,7 +20744,7 @@
         <p:spPr>
           <a:xfrm>
             <a:off x="886680" y="398520"/>
-            <a:ext cx="7368120" cy="855000"/>
+            <a:ext cx="7367760" cy="854640"/>
           </a:xfrm>
           <a:prstGeom prst="rect">
             <a:avLst/>
@@ -20906,7 +20795,7 @@
         <p:spPr>
           <a:xfrm>
             <a:off x="870840" y="1972800"/>
-            <a:ext cx="2362680" cy="2950560"/>
+            <a:ext cx="2362320" cy="2950200"/>
           </a:xfrm>
           <a:prstGeom prst="rect">
             <a:avLst/>
@@ -21143,7 +21032,7 @@
         <p:spPr>
           <a:xfrm>
             <a:off x="3357360" y="1972800"/>
-            <a:ext cx="2362680" cy="2950560"/>
+            <a:ext cx="2362320" cy="2950200"/>
           </a:xfrm>
           <a:prstGeom prst="rect">
             <a:avLst/>
@@ -21183,7 +21072,7 @@
               <a:t>2.  Wróć do swoich spraw</a:t>
             </a:r>
             <a:endParaRPr b="0" lang="en-GB" sz="1400" spc="-1" strike="noStrike">
-              <a:latin typeface="Book antiqua"/>
+              <a:latin typeface="Arial"/>
             </a:endParaRPr>
           </a:p>
           <a:p>
@@ -21306,7 +21195,7 @@
               <a:t>.</a:t>
             </a:r>
             <a:endParaRPr b="0" lang="en-GB" sz="1200" spc="-1" strike="noStrike">
-              <a:latin typeface="Book antiqua"/>
+              <a:latin typeface="Arial"/>
             </a:endParaRPr>
           </a:p>
         </p:txBody>
@@ -21320,7 +21209,7 @@
         <p:spPr>
           <a:xfrm>
             <a:off x="5843880" y="1972800"/>
-            <a:ext cx="2362680" cy="2950560"/>
+            <a:ext cx="2362320" cy="2950200"/>
           </a:xfrm>
           <a:prstGeom prst="rect">
             <a:avLst/>
@@ -21360,7 +21249,7 @@
               <a:t>3. Ucz się</a:t>
             </a:r>
             <a:endParaRPr b="0" lang="en-GB" sz="1400" spc="-1" strike="noStrike">
-              <a:latin typeface="Karla"/>
+              <a:latin typeface="Arial"/>
             </a:endParaRPr>
           </a:p>
           <a:p>
@@ -21603,7 +21492,7 @@
               <a:t>asne.</a:t>
             </a:r>
             <a:endParaRPr b="0" lang="en-GB" sz="1200" spc="-1" strike="noStrike">
-              <a:latin typeface="Karla"/>
+              <a:latin typeface="Arial"/>
             </a:endParaRPr>
           </a:p>
         </p:txBody>
@@ -21617,7 +21506,7 @@
         <p:spPr>
           <a:xfrm>
             <a:off x="27000" y="4749840"/>
-            <a:ext cx="546120" cy="390960"/>
+            <a:ext cx="545760" cy="390600"/>
           </a:xfrm>
           <a:prstGeom prst="rect">
             <a:avLst/>
@@ -21643,7 +21532,7 @@
                 <a:spcPct val="100000"/>
               </a:lnSpc>
             </a:pPr>
-            <a:fld id="{C22E9FBF-6CFB-43FE-B7A2-6AB424EC6A4E}" type="slidenum">
+            <a:fld id="{C2C40645-C2C4-4DAA-9F39-0A5A45683D06}" type="slidenum">
               <a:rPr b="0" lang="en" sz="1200" spc="-1" strike="noStrike">
                 <a:solidFill>
                   <a:srgbClr val="00ae9d"/>
@@ -21698,7 +21587,7 @@
         <p:spPr>
           <a:xfrm>
             <a:off x="27000" y="4749840"/>
-            <a:ext cx="545400" cy="390240"/>
+            <a:ext cx="545040" cy="389880"/>
           </a:xfrm>
           <a:prstGeom prst="rect">
             <a:avLst/>
@@ -21724,7 +21613,7 @@
                 <a:spcPct val="100000"/>
               </a:lnSpc>
             </a:pPr>
-            <a:fld id="{530DDA25-E3B3-45AF-A6E6-3E9B8AE96745}" type="slidenum">
+            <a:fld id="{33CE666B-67E7-44AE-8E0A-7D3861CAE014}" type="slidenum">
               <a:rPr b="0" lang="en" sz="1200" spc="-1" strike="noStrike">
                 <a:solidFill>
                   <a:srgbClr val="00ae9d"/>
@@ -21753,7 +21642,7 @@
         <p:spPr>
           <a:xfrm>
             <a:off x="828000" y="1104840"/>
-            <a:ext cx="7125120" cy="3716280"/>
+            <a:ext cx="7124760" cy="3715920"/>
           </a:xfrm>
           <a:prstGeom prst="rect">
             <a:avLst/>
@@ -21802,7 +21691,7 @@
         <p:spPr>
           <a:xfrm>
             <a:off x="27000" y="4749840"/>
-            <a:ext cx="545400" cy="390240"/>
+            <a:ext cx="545040" cy="389880"/>
           </a:xfrm>
           <a:prstGeom prst="rect">
             <a:avLst/>
@@ -21828,7 +21717,7 @@
                 <a:spcPct val="100000"/>
               </a:lnSpc>
             </a:pPr>
-            <a:fld id="{1C21D50E-EF09-488A-BF7B-68842D193A30}" type="slidenum">
+            <a:fld id="{7085555A-F9E3-44EA-8F9D-8FA103E8AB27}" type="slidenum">
               <a:rPr b="0" lang="en" sz="1200" spc="-1" strike="noStrike">
                 <a:solidFill>
                   <a:srgbClr val="00ae9d"/>
@@ -21857,7 +21746,7 @@
         <p:spPr>
           <a:xfrm>
             <a:off x="3568320" y="999360"/>
-            <a:ext cx="2796480" cy="3965760"/>
+            <a:ext cx="2796120" cy="3965400"/>
           </a:xfrm>
           <a:prstGeom prst="rect">
             <a:avLst/>
@@ -21906,7 +21795,7 @@
         <p:spPr>
           <a:xfrm>
             <a:off x="27000" y="4749840"/>
-            <a:ext cx="545400" cy="390240"/>
+            <a:ext cx="545040" cy="389880"/>
           </a:xfrm>
           <a:prstGeom prst="rect">
             <a:avLst/>
@@ -21932,7 +21821,7 @@
                 <a:spcPct val="100000"/>
               </a:lnSpc>
             </a:pPr>
-            <a:fld id="{107201DD-8107-46B2-84D3-38CDC4A22377}" type="slidenum">
+            <a:fld id="{E8D2DB59-1CA9-48A7-83EA-E166751D86E5}" type="slidenum">
               <a:rPr b="0" lang="en" sz="1200" spc="-1" strike="noStrike">
                 <a:solidFill>
                   <a:srgbClr val="00ae9d"/>
@@ -21961,7 +21850,7 @@
         <p:spPr>
           <a:xfrm>
             <a:off x="3571920" y="1008000"/>
-            <a:ext cx="2791080" cy="3957120"/>
+            <a:ext cx="2790720" cy="3956760"/>
           </a:xfrm>
           <a:prstGeom prst="rect">
             <a:avLst/>
@@ -22010,7 +21899,7 @@
         <p:spPr>
           <a:xfrm>
             <a:off x="27000" y="4749840"/>
-            <a:ext cx="545400" cy="390240"/>
+            <a:ext cx="545040" cy="389880"/>
           </a:xfrm>
           <a:prstGeom prst="rect">
             <a:avLst/>
@@ -22036,7 +21925,7 @@
                 <a:spcPct val="100000"/>
               </a:lnSpc>
             </a:pPr>
-            <a:fld id="{989ABC1E-9EF7-43B6-94D2-BD2F6FDD9C3A}" type="slidenum">
+            <a:fld id="{C2E881D0-F4E8-4606-82E5-3AAB9D25793B}" type="slidenum">
               <a:rPr b="0" lang="en" sz="1200" spc="-1" strike="noStrike">
                 <a:solidFill>
                   <a:srgbClr val="00ae9d"/>
@@ -22065,7 +21954,7 @@
         <p:spPr>
           <a:xfrm>
             <a:off x="3567960" y="1008000"/>
-            <a:ext cx="2788200" cy="3958920"/>
+            <a:ext cx="2787840" cy="3958560"/>
           </a:xfrm>
           <a:prstGeom prst="rect">
             <a:avLst/>
@@ -22114,7 +22003,7 @@
         <p:spPr>
           <a:xfrm>
             <a:off x="27000" y="4749840"/>
-            <a:ext cx="545400" cy="390240"/>
+            <a:ext cx="545040" cy="389880"/>
           </a:xfrm>
           <a:prstGeom prst="rect">
             <a:avLst/>
@@ -22140,7 +22029,7 @@
                 <a:spcPct val="100000"/>
               </a:lnSpc>
             </a:pPr>
-            <a:fld id="{BC17D3DF-422E-4046-9247-6199A1890619}" type="slidenum">
+            <a:fld id="{F9DD3DA1-B842-42C9-BA5F-F3894A73E980}" type="slidenum">
               <a:rPr b="0" lang="en" sz="1200" spc="-1" strike="noStrike">
                 <a:solidFill>
                   <a:srgbClr val="00ae9d"/>
@@ -22169,7 +22058,7 @@
         <p:spPr>
           <a:xfrm>
             <a:off x="1688040" y="1080000"/>
-            <a:ext cx="5581080" cy="3867840"/>
+            <a:ext cx="5580720" cy="3867480"/>
           </a:xfrm>
           <a:prstGeom prst="rect">
             <a:avLst/>
@@ -22218,7 +22107,7 @@
         <p:spPr>
           <a:xfrm>
             <a:off x="27000" y="4749840"/>
-            <a:ext cx="545400" cy="390240"/>
+            <a:ext cx="545040" cy="389880"/>
           </a:xfrm>
           <a:prstGeom prst="rect">
             <a:avLst/>
@@ -22244,7 +22133,7 @@
                 <a:spcPct val="100000"/>
               </a:lnSpc>
             </a:pPr>
-            <a:fld id="{54B5CF35-1CF0-45F8-A0C3-9184C60D7728}" type="slidenum">
+            <a:fld id="{CBC30A0D-471B-4D05-86F4-0F68BC5D4432}" type="slidenum">
               <a:rPr b="0" lang="en" sz="1200" spc="-1" strike="noStrike">
                 <a:solidFill>
                   <a:srgbClr val="00ae9d"/>
@@ -22273,7 +22162,7 @@
         <p:spPr>
           <a:xfrm>
             <a:off x="3600000" y="1008000"/>
-            <a:ext cx="2761200" cy="3957120"/>
+            <a:ext cx="2760840" cy="3956760"/>
           </a:xfrm>
           <a:prstGeom prst="rect">
             <a:avLst/>

</xml_diff>

<commit_message>
Minor change in the presentation
</commit_message>
<xml_diff>
--- a/DesCards.pptx
+++ b/DesCards.pptx
@@ -129,7 +129,7 @@
         </p:spPr>
         <p:txBody>
           <a:bodyPr lIns="0" rIns="0" tIns="0" bIns="0">
-            <a:normAutofit fontScale="7000"/>
+            <a:normAutofit/>
           </a:bodyPr>
           <a:p>
             <a:endParaRPr b="0" lang="en-GB" sz="3200" spc="-1" strike="noStrike">
@@ -159,7 +159,7 @@
         </p:spPr>
         <p:txBody>
           <a:bodyPr lIns="0" rIns="0" tIns="0" bIns="0">
-            <a:normAutofit fontScale="7000"/>
+            <a:normAutofit/>
           </a:bodyPr>
           <a:p>
             <a:endParaRPr b="0" lang="en-GB" sz="3200" spc="-1" strike="noStrike">
@@ -242,7 +242,7 @@
         </p:spPr>
         <p:txBody>
           <a:bodyPr lIns="0" rIns="0" tIns="0" bIns="0">
-            <a:normAutofit fontScale="7000"/>
+            <a:normAutofit/>
           </a:bodyPr>
           <a:p>
             <a:endParaRPr b="0" lang="en-GB" sz="3200" spc="-1" strike="noStrike">
@@ -272,7 +272,7 @@
         </p:spPr>
         <p:txBody>
           <a:bodyPr lIns="0" rIns="0" tIns="0" bIns="0">
-            <a:normAutofit fontScale="7000"/>
+            <a:normAutofit/>
           </a:bodyPr>
           <a:p>
             <a:endParaRPr b="0" lang="en-GB" sz="3200" spc="-1" strike="noStrike">
@@ -302,7 +302,7 @@
         </p:spPr>
         <p:txBody>
           <a:bodyPr lIns="0" rIns="0" tIns="0" bIns="0">
-            <a:normAutofit fontScale="7000"/>
+            <a:normAutofit/>
           </a:bodyPr>
           <a:p>
             <a:endParaRPr b="0" lang="en-GB" sz="3200" spc="-1" strike="noStrike">
@@ -332,7 +332,7 @@
         </p:spPr>
         <p:txBody>
           <a:bodyPr lIns="0" rIns="0" tIns="0" bIns="0">
-            <a:normAutofit fontScale="7000"/>
+            <a:normAutofit/>
           </a:bodyPr>
           <a:p>
             <a:endParaRPr b="0" lang="en-GB" sz="3200" spc="-1" strike="noStrike">
@@ -415,7 +415,7 @@
         </p:spPr>
         <p:txBody>
           <a:bodyPr lIns="0" rIns="0" tIns="0" bIns="0">
-            <a:normAutofit fontScale="7000"/>
+            <a:normAutofit/>
           </a:bodyPr>
           <a:p>
             <a:endParaRPr b="0" lang="en-GB" sz="3200" spc="-1" strike="noStrike">
@@ -445,7 +445,7 @@
         </p:spPr>
         <p:txBody>
           <a:bodyPr lIns="0" rIns="0" tIns="0" bIns="0">
-            <a:normAutofit fontScale="7000"/>
+            <a:normAutofit/>
           </a:bodyPr>
           <a:p>
             <a:endParaRPr b="0" lang="en-GB" sz="3200" spc="-1" strike="noStrike">
@@ -475,7 +475,7 @@
         </p:spPr>
         <p:txBody>
           <a:bodyPr lIns="0" rIns="0" tIns="0" bIns="0">
-            <a:normAutofit fontScale="7000"/>
+            <a:normAutofit/>
           </a:bodyPr>
           <a:p>
             <a:endParaRPr b="0" lang="en-GB" sz="3200" spc="-1" strike="noStrike">
@@ -505,7 +505,7 @@
         </p:spPr>
         <p:txBody>
           <a:bodyPr lIns="0" rIns="0" tIns="0" bIns="0">
-            <a:normAutofit fontScale="7000"/>
+            <a:normAutofit/>
           </a:bodyPr>
           <a:p>
             <a:endParaRPr b="0" lang="en-GB" sz="3200" spc="-1" strike="noStrike">
@@ -535,7 +535,7 @@
         </p:spPr>
         <p:txBody>
           <a:bodyPr lIns="0" rIns="0" tIns="0" bIns="0">
-            <a:normAutofit fontScale="7000"/>
+            <a:normAutofit/>
           </a:bodyPr>
           <a:p>
             <a:endParaRPr b="0" lang="en-GB" sz="3200" spc="-1" strike="noStrike">
@@ -565,7 +565,7 @@
         </p:spPr>
         <p:txBody>
           <a:bodyPr lIns="0" rIns="0" tIns="0" bIns="0">
-            <a:normAutofit fontScale="7000"/>
+            <a:normAutofit/>
           </a:bodyPr>
           <a:p>
             <a:endParaRPr b="0" lang="en-GB" sz="3200" spc="-1" strike="noStrike">
@@ -754,7 +754,7 @@
         </p:spPr>
         <p:txBody>
           <a:bodyPr lIns="0" rIns="0" tIns="0" bIns="0">
-            <a:normAutofit fontScale="23000"/>
+            <a:normAutofit/>
           </a:bodyPr>
           <a:p>
             <a:endParaRPr b="0" lang="en-GB" sz="3200" spc="-1" strike="noStrike">
@@ -837,7 +837,7 @@
         </p:spPr>
         <p:txBody>
           <a:bodyPr lIns="0" rIns="0" tIns="0" bIns="0">
-            <a:normAutofit fontScale="23000"/>
+            <a:normAutofit/>
           </a:bodyPr>
           <a:p>
             <a:endParaRPr b="0" lang="en-GB" sz="3200" spc="-1" strike="noStrike">
@@ -867,7 +867,7 @@
         </p:spPr>
         <p:txBody>
           <a:bodyPr lIns="0" rIns="0" tIns="0" bIns="0">
-            <a:normAutofit fontScale="23000"/>
+            <a:normAutofit/>
           </a:bodyPr>
           <a:p>
             <a:endParaRPr b="0" lang="en-GB" sz="3200" spc="-1" strike="noStrike">
@@ -1056,7 +1056,7 @@
         </p:spPr>
         <p:txBody>
           <a:bodyPr lIns="0" rIns="0" tIns="0" bIns="0">
-            <a:normAutofit fontScale="7000"/>
+            <a:normAutofit/>
           </a:bodyPr>
           <a:p>
             <a:endParaRPr b="0" lang="en-GB" sz="3200" spc="-1" strike="noStrike">
@@ -1086,7 +1086,7 @@
         </p:spPr>
         <p:txBody>
           <a:bodyPr lIns="0" rIns="0" tIns="0" bIns="0">
-            <a:normAutofit fontScale="23000"/>
+            <a:normAutofit/>
           </a:bodyPr>
           <a:p>
             <a:endParaRPr b="0" lang="en-GB" sz="3200" spc="-1" strike="noStrike">
@@ -1116,7 +1116,7 @@
         </p:spPr>
         <p:txBody>
           <a:bodyPr lIns="0" rIns="0" tIns="0" bIns="0">
-            <a:normAutofit fontScale="7000"/>
+            <a:normAutofit/>
           </a:bodyPr>
           <a:p>
             <a:endParaRPr b="0" lang="en-GB" sz="3200" spc="-1" strike="noStrike">
@@ -1283,7 +1283,7 @@
         </p:spPr>
         <p:txBody>
           <a:bodyPr lIns="0" rIns="0" tIns="0" bIns="0">
-            <a:normAutofit fontScale="23000"/>
+            <a:normAutofit/>
           </a:bodyPr>
           <a:p>
             <a:endParaRPr b="0" lang="en-GB" sz="3200" spc="-1" strike="noStrike">
@@ -1313,7 +1313,7 @@
         </p:spPr>
         <p:txBody>
           <a:bodyPr lIns="0" rIns="0" tIns="0" bIns="0">
-            <a:normAutofit fontScale="7000"/>
+            <a:normAutofit/>
           </a:bodyPr>
           <a:p>
             <a:endParaRPr b="0" lang="en-GB" sz="3200" spc="-1" strike="noStrike">
@@ -1343,7 +1343,7 @@
         </p:spPr>
         <p:txBody>
           <a:bodyPr lIns="0" rIns="0" tIns="0" bIns="0">
-            <a:normAutofit fontScale="7000"/>
+            <a:normAutofit/>
           </a:bodyPr>
           <a:p>
             <a:endParaRPr b="0" lang="en-GB" sz="3200" spc="-1" strike="noStrike">
@@ -1426,7 +1426,7 @@
         </p:spPr>
         <p:txBody>
           <a:bodyPr lIns="0" rIns="0" tIns="0" bIns="0">
-            <a:normAutofit fontScale="7000"/>
+            <a:normAutofit/>
           </a:bodyPr>
           <a:p>
             <a:endParaRPr b="0" lang="en-GB" sz="3200" spc="-1" strike="noStrike">
@@ -1456,7 +1456,7 @@
         </p:spPr>
         <p:txBody>
           <a:bodyPr lIns="0" rIns="0" tIns="0" bIns="0">
-            <a:normAutofit fontScale="7000"/>
+            <a:normAutofit/>
           </a:bodyPr>
           <a:p>
             <a:endParaRPr b="0" lang="en-GB" sz="3200" spc="-1" strike="noStrike">
@@ -1486,7 +1486,7 @@
         </p:spPr>
         <p:txBody>
           <a:bodyPr lIns="0" rIns="0" tIns="0" bIns="0">
-            <a:normAutofit fontScale="7000"/>
+            <a:normAutofit/>
           </a:bodyPr>
           <a:p>
             <a:endParaRPr b="0" lang="en-GB" sz="3200" spc="-1" strike="noStrike">
@@ -1569,7 +1569,7 @@
         </p:spPr>
         <p:txBody>
           <a:bodyPr lIns="0" rIns="0" tIns="0" bIns="0">
-            <a:normAutofit fontScale="7000"/>
+            <a:normAutofit/>
           </a:bodyPr>
           <a:p>
             <a:endParaRPr b="0" lang="en-GB" sz="3200" spc="-1" strike="noStrike">
@@ -1599,7 +1599,7 @@
         </p:spPr>
         <p:txBody>
           <a:bodyPr lIns="0" rIns="0" tIns="0" bIns="0">
-            <a:normAutofit fontScale="7000"/>
+            <a:normAutofit/>
           </a:bodyPr>
           <a:p>
             <a:endParaRPr b="0" lang="en-GB" sz="3200" spc="-1" strike="noStrike">
@@ -1682,7 +1682,7 @@
         </p:spPr>
         <p:txBody>
           <a:bodyPr lIns="0" rIns="0" tIns="0" bIns="0">
-            <a:normAutofit fontScale="7000"/>
+            <a:normAutofit/>
           </a:bodyPr>
           <a:p>
             <a:endParaRPr b="0" lang="en-GB" sz="3200" spc="-1" strike="noStrike">
@@ -1712,7 +1712,7 @@
         </p:spPr>
         <p:txBody>
           <a:bodyPr lIns="0" rIns="0" tIns="0" bIns="0">
-            <a:normAutofit fontScale="7000"/>
+            <a:normAutofit/>
           </a:bodyPr>
           <a:p>
             <a:endParaRPr b="0" lang="en-GB" sz="3200" spc="-1" strike="noStrike">
@@ -1742,7 +1742,7 @@
         </p:spPr>
         <p:txBody>
           <a:bodyPr lIns="0" rIns="0" tIns="0" bIns="0">
-            <a:normAutofit fontScale="7000"/>
+            <a:normAutofit/>
           </a:bodyPr>
           <a:p>
             <a:endParaRPr b="0" lang="en-GB" sz="3200" spc="-1" strike="noStrike">
@@ -1772,7 +1772,7 @@
         </p:spPr>
         <p:txBody>
           <a:bodyPr lIns="0" rIns="0" tIns="0" bIns="0">
-            <a:normAutofit fontScale="7000"/>
+            <a:normAutofit/>
           </a:bodyPr>
           <a:p>
             <a:endParaRPr b="0" lang="en-GB" sz="3200" spc="-1" strike="noStrike">
@@ -1855,7 +1855,7 @@
         </p:spPr>
         <p:txBody>
           <a:bodyPr lIns="0" rIns="0" tIns="0" bIns="0">
-            <a:normAutofit fontScale="7000"/>
+            <a:normAutofit/>
           </a:bodyPr>
           <a:p>
             <a:endParaRPr b="0" lang="en-GB" sz="3200" spc="-1" strike="noStrike">
@@ -1885,7 +1885,7 @@
         </p:spPr>
         <p:txBody>
           <a:bodyPr lIns="0" rIns="0" tIns="0" bIns="0">
-            <a:normAutofit fontScale="7000"/>
+            <a:normAutofit/>
           </a:bodyPr>
           <a:p>
             <a:endParaRPr b="0" lang="en-GB" sz="3200" spc="-1" strike="noStrike">
@@ -1915,7 +1915,7 @@
         </p:spPr>
         <p:txBody>
           <a:bodyPr lIns="0" rIns="0" tIns="0" bIns="0">
-            <a:normAutofit fontScale="7000"/>
+            <a:normAutofit/>
           </a:bodyPr>
           <a:p>
             <a:endParaRPr b="0" lang="en-GB" sz="3200" spc="-1" strike="noStrike">
@@ -1945,7 +1945,7 @@
         </p:spPr>
         <p:txBody>
           <a:bodyPr lIns="0" rIns="0" tIns="0" bIns="0">
-            <a:normAutofit fontScale="7000"/>
+            <a:normAutofit/>
           </a:bodyPr>
           <a:p>
             <a:endParaRPr b="0" lang="en-GB" sz="3200" spc="-1" strike="noStrike">
@@ -1975,7 +1975,7 @@
         </p:spPr>
         <p:txBody>
           <a:bodyPr lIns="0" rIns="0" tIns="0" bIns="0">
-            <a:normAutofit fontScale="7000"/>
+            <a:normAutofit/>
           </a:bodyPr>
           <a:p>
             <a:endParaRPr b="0" lang="en-GB" sz="3200" spc="-1" strike="noStrike">
@@ -2005,7 +2005,7 @@
         </p:spPr>
         <p:txBody>
           <a:bodyPr lIns="0" rIns="0" tIns="0" bIns="0">
-            <a:normAutofit fontScale="7000"/>
+            <a:normAutofit/>
           </a:bodyPr>
           <a:p>
             <a:endParaRPr b="0" lang="en-GB" sz="3200" spc="-1" strike="noStrike">
@@ -2194,7 +2194,7 @@
         </p:spPr>
         <p:txBody>
           <a:bodyPr lIns="0" rIns="0" tIns="0" bIns="0">
-            <a:normAutofit fontScale="23000"/>
+            <a:normAutofit/>
           </a:bodyPr>
           <a:p>
             <a:endParaRPr b="0" lang="en-GB" sz="3200" spc="-1" strike="noStrike">
@@ -2277,7 +2277,7 @@
         </p:spPr>
         <p:txBody>
           <a:bodyPr lIns="0" rIns="0" tIns="0" bIns="0">
-            <a:normAutofit fontScale="23000"/>
+            <a:normAutofit/>
           </a:bodyPr>
           <a:p>
             <a:endParaRPr b="0" lang="en-GB" sz="3200" spc="-1" strike="noStrike">
@@ -2307,7 +2307,7 @@
         </p:spPr>
         <p:txBody>
           <a:bodyPr lIns="0" rIns="0" tIns="0" bIns="0">
-            <a:normAutofit fontScale="23000"/>
+            <a:normAutofit/>
           </a:bodyPr>
           <a:p>
             <a:endParaRPr b="0" lang="en-GB" sz="3200" spc="-1" strike="noStrike">
@@ -2443,7 +2443,7 @@
         </p:spPr>
         <p:txBody>
           <a:bodyPr lIns="0" rIns="0" tIns="0" bIns="0">
-            <a:normAutofit fontScale="23000"/>
+            <a:normAutofit/>
           </a:bodyPr>
           <a:p>
             <a:endParaRPr b="0" lang="en-GB" sz="3200" spc="-1" strike="noStrike">
@@ -2579,7 +2579,7 @@
         </p:spPr>
         <p:txBody>
           <a:bodyPr lIns="0" rIns="0" tIns="0" bIns="0">
-            <a:normAutofit fontScale="7000"/>
+            <a:normAutofit/>
           </a:bodyPr>
           <a:p>
             <a:endParaRPr b="0" lang="en-GB" sz="3200" spc="-1" strike="noStrike">
@@ -2609,7 +2609,7 @@
         </p:spPr>
         <p:txBody>
           <a:bodyPr lIns="0" rIns="0" tIns="0" bIns="0">
-            <a:normAutofit fontScale="23000"/>
+            <a:normAutofit/>
           </a:bodyPr>
           <a:p>
             <a:endParaRPr b="0" lang="en-GB" sz="3200" spc="-1" strike="noStrike">
@@ -2639,7 +2639,7 @@
         </p:spPr>
         <p:txBody>
           <a:bodyPr lIns="0" rIns="0" tIns="0" bIns="0">
-            <a:normAutofit fontScale="7000"/>
+            <a:normAutofit/>
           </a:bodyPr>
           <a:p>
             <a:endParaRPr b="0" lang="en-GB" sz="3200" spc="-1" strike="noStrike">
@@ -2722,7 +2722,7 @@
         </p:spPr>
         <p:txBody>
           <a:bodyPr lIns="0" rIns="0" tIns="0" bIns="0">
-            <a:normAutofit fontScale="23000"/>
+            <a:normAutofit/>
           </a:bodyPr>
           <a:p>
             <a:endParaRPr b="0" lang="en-GB" sz="3200" spc="-1" strike="noStrike">
@@ -2752,7 +2752,7 @@
         </p:spPr>
         <p:txBody>
           <a:bodyPr lIns="0" rIns="0" tIns="0" bIns="0">
-            <a:normAutofit fontScale="7000"/>
+            <a:normAutofit/>
           </a:bodyPr>
           <a:p>
             <a:endParaRPr b="0" lang="en-GB" sz="3200" spc="-1" strike="noStrike">
@@ -2782,7 +2782,7 @@
         </p:spPr>
         <p:txBody>
           <a:bodyPr lIns="0" rIns="0" tIns="0" bIns="0">
-            <a:normAutofit fontScale="7000"/>
+            <a:normAutofit/>
           </a:bodyPr>
           <a:p>
             <a:endParaRPr b="0" lang="en-GB" sz="3200" spc="-1" strike="noStrike">
@@ -2865,7 +2865,7 @@
         </p:spPr>
         <p:txBody>
           <a:bodyPr lIns="0" rIns="0" tIns="0" bIns="0">
-            <a:normAutofit fontScale="7000"/>
+            <a:normAutofit/>
           </a:bodyPr>
           <a:p>
             <a:endParaRPr b="0" lang="en-GB" sz="3200" spc="-1" strike="noStrike">
@@ -2895,7 +2895,7 @@
         </p:spPr>
         <p:txBody>
           <a:bodyPr lIns="0" rIns="0" tIns="0" bIns="0">
-            <a:normAutofit fontScale="7000"/>
+            <a:normAutofit/>
           </a:bodyPr>
           <a:p>
             <a:endParaRPr b="0" lang="en-GB" sz="3200" spc="-1" strike="noStrike">
@@ -2925,7 +2925,7 @@
         </p:spPr>
         <p:txBody>
           <a:bodyPr lIns="0" rIns="0" tIns="0" bIns="0">
-            <a:normAutofit fontScale="7000"/>
+            <a:normAutofit/>
           </a:bodyPr>
           <a:p>
             <a:endParaRPr b="0" lang="en-GB" sz="3200" spc="-1" strike="noStrike">
@@ -3008,7 +3008,7 @@
         </p:spPr>
         <p:txBody>
           <a:bodyPr lIns="0" rIns="0" tIns="0" bIns="0">
-            <a:normAutofit fontScale="7000"/>
+            <a:normAutofit/>
           </a:bodyPr>
           <a:p>
             <a:endParaRPr b="0" lang="en-GB" sz="3200" spc="-1" strike="noStrike">
@@ -3038,7 +3038,7 @@
         </p:spPr>
         <p:txBody>
           <a:bodyPr lIns="0" rIns="0" tIns="0" bIns="0">
-            <a:normAutofit fontScale="7000"/>
+            <a:normAutofit/>
           </a:bodyPr>
           <a:p>
             <a:endParaRPr b="0" lang="en-GB" sz="3200" spc="-1" strike="noStrike">
@@ -3121,7 +3121,7 @@
         </p:spPr>
         <p:txBody>
           <a:bodyPr lIns="0" rIns="0" tIns="0" bIns="0">
-            <a:normAutofit fontScale="7000"/>
+            <a:normAutofit/>
           </a:bodyPr>
           <a:p>
             <a:endParaRPr b="0" lang="en-GB" sz="3200" spc="-1" strike="noStrike">
@@ -3151,7 +3151,7 @@
         </p:spPr>
         <p:txBody>
           <a:bodyPr lIns="0" rIns="0" tIns="0" bIns="0">
-            <a:normAutofit fontScale="7000"/>
+            <a:normAutofit/>
           </a:bodyPr>
           <a:p>
             <a:endParaRPr b="0" lang="en-GB" sz="3200" spc="-1" strike="noStrike">
@@ -3181,7 +3181,7 @@
         </p:spPr>
         <p:txBody>
           <a:bodyPr lIns="0" rIns="0" tIns="0" bIns="0">
-            <a:normAutofit fontScale="7000"/>
+            <a:normAutofit/>
           </a:bodyPr>
           <a:p>
             <a:endParaRPr b="0" lang="en-GB" sz="3200" spc="-1" strike="noStrike">
@@ -3211,7 +3211,7 @@
         </p:spPr>
         <p:txBody>
           <a:bodyPr lIns="0" rIns="0" tIns="0" bIns="0">
-            <a:normAutofit fontScale="7000"/>
+            <a:normAutofit/>
           </a:bodyPr>
           <a:p>
             <a:endParaRPr b="0" lang="en-GB" sz="3200" spc="-1" strike="noStrike">
@@ -3294,7 +3294,7 @@
         </p:spPr>
         <p:txBody>
           <a:bodyPr lIns="0" rIns="0" tIns="0" bIns="0">
-            <a:normAutofit fontScale="7000"/>
+            <a:normAutofit/>
           </a:bodyPr>
           <a:p>
             <a:endParaRPr b="0" lang="en-GB" sz="3200" spc="-1" strike="noStrike">
@@ -3324,7 +3324,7 @@
         </p:spPr>
         <p:txBody>
           <a:bodyPr lIns="0" rIns="0" tIns="0" bIns="0">
-            <a:normAutofit fontScale="7000"/>
+            <a:normAutofit/>
           </a:bodyPr>
           <a:p>
             <a:endParaRPr b="0" lang="en-GB" sz="3200" spc="-1" strike="noStrike">
@@ -3354,7 +3354,7 @@
         </p:spPr>
         <p:txBody>
           <a:bodyPr lIns="0" rIns="0" tIns="0" bIns="0">
-            <a:normAutofit fontScale="7000"/>
+            <a:normAutofit/>
           </a:bodyPr>
           <a:p>
             <a:endParaRPr b="0" lang="en-GB" sz="3200" spc="-1" strike="noStrike">
@@ -3384,7 +3384,7 @@
         </p:spPr>
         <p:txBody>
           <a:bodyPr lIns="0" rIns="0" tIns="0" bIns="0">
-            <a:normAutofit fontScale="7000"/>
+            <a:normAutofit/>
           </a:bodyPr>
           <a:p>
             <a:endParaRPr b="0" lang="en-GB" sz="3200" spc="-1" strike="noStrike">
@@ -3414,7 +3414,7 @@
         </p:spPr>
         <p:txBody>
           <a:bodyPr lIns="0" rIns="0" tIns="0" bIns="0">
-            <a:normAutofit fontScale="7000"/>
+            <a:normAutofit/>
           </a:bodyPr>
           <a:p>
             <a:endParaRPr b="0" lang="en-GB" sz="3200" spc="-1" strike="noStrike">
@@ -3444,7 +3444,7 @@
         </p:spPr>
         <p:txBody>
           <a:bodyPr lIns="0" rIns="0" tIns="0" bIns="0">
-            <a:normAutofit fontScale="7000"/>
+            <a:normAutofit/>
           </a:bodyPr>
           <a:p>
             <a:endParaRPr b="0" lang="en-GB" sz="3200" spc="-1" strike="noStrike">
@@ -3633,7 +3633,7 @@
         </p:spPr>
         <p:txBody>
           <a:bodyPr lIns="0" rIns="0" tIns="0" bIns="0">
-            <a:normAutofit fontScale="23000"/>
+            <a:normAutofit/>
           </a:bodyPr>
           <a:p>
             <a:endParaRPr b="0" lang="en-GB" sz="3200" spc="-1" strike="noStrike">
@@ -3716,7 +3716,7 @@
         </p:spPr>
         <p:txBody>
           <a:bodyPr lIns="0" rIns="0" tIns="0" bIns="0">
-            <a:normAutofit fontScale="23000"/>
+            <a:normAutofit/>
           </a:bodyPr>
           <a:p>
             <a:endParaRPr b="0" lang="en-GB" sz="3200" spc="-1" strike="noStrike">
@@ -3746,7 +3746,7 @@
         </p:spPr>
         <p:txBody>
           <a:bodyPr lIns="0" rIns="0" tIns="0" bIns="0">
-            <a:normAutofit fontScale="23000"/>
+            <a:normAutofit/>
           </a:bodyPr>
           <a:p>
             <a:endParaRPr b="0" lang="en-GB" sz="3200" spc="-1" strike="noStrike">
@@ -3829,7 +3829,7 @@
         </p:spPr>
         <p:txBody>
           <a:bodyPr lIns="0" rIns="0" tIns="0" bIns="0">
-            <a:normAutofit fontScale="23000"/>
+            <a:normAutofit/>
           </a:bodyPr>
           <a:p>
             <a:endParaRPr b="0" lang="en-GB" sz="3200" spc="-1" strike="noStrike">
@@ -3859,7 +3859,7 @@
         </p:spPr>
         <p:txBody>
           <a:bodyPr lIns="0" rIns="0" tIns="0" bIns="0">
-            <a:normAutofit fontScale="23000"/>
+            <a:normAutofit/>
           </a:bodyPr>
           <a:p>
             <a:endParaRPr b="0" lang="en-GB" sz="3200" spc="-1" strike="noStrike">
@@ -4048,7 +4048,7 @@
         </p:spPr>
         <p:txBody>
           <a:bodyPr lIns="0" rIns="0" tIns="0" bIns="0">
-            <a:normAutofit fontScale="7000"/>
+            <a:normAutofit/>
           </a:bodyPr>
           <a:p>
             <a:endParaRPr b="0" lang="en-GB" sz="3200" spc="-1" strike="noStrike">
@@ -4078,7 +4078,7 @@
         </p:spPr>
         <p:txBody>
           <a:bodyPr lIns="0" rIns="0" tIns="0" bIns="0">
-            <a:normAutofit fontScale="23000"/>
+            <a:normAutofit/>
           </a:bodyPr>
           <a:p>
             <a:endParaRPr b="0" lang="en-GB" sz="3200" spc="-1" strike="noStrike">
@@ -4108,7 +4108,7 @@
         </p:spPr>
         <p:txBody>
           <a:bodyPr lIns="0" rIns="0" tIns="0" bIns="0">
-            <a:normAutofit fontScale="7000"/>
+            <a:normAutofit/>
           </a:bodyPr>
           <a:p>
             <a:endParaRPr b="0" lang="en-GB" sz="3200" spc="-1" strike="noStrike">
@@ -4191,7 +4191,7 @@
         </p:spPr>
         <p:txBody>
           <a:bodyPr lIns="0" rIns="0" tIns="0" bIns="0">
-            <a:normAutofit fontScale="23000"/>
+            <a:normAutofit/>
           </a:bodyPr>
           <a:p>
             <a:endParaRPr b="0" lang="en-GB" sz="3200" spc="-1" strike="noStrike">
@@ -4221,7 +4221,7 @@
         </p:spPr>
         <p:txBody>
           <a:bodyPr lIns="0" rIns="0" tIns="0" bIns="0">
-            <a:normAutofit fontScale="7000"/>
+            <a:normAutofit/>
           </a:bodyPr>
           <a:p>
             <a:endParaRPr b="0" lang="en-GB" sz="3200" spc="-1" strike="noStrike">
@@ -4251,7 +4251,7 @@
         </p:spPr>
         <p:txBody>
           <a:bodyPr lIns="0" rIns="0" tIns="0" bIns="0">
-            <a:normAutofit fontScale="7000"/>
+            <a:normAutofit/>
           </a:bodyPr>
           <a:p>
             <a:endParaRPr b="0" lang="en-GB" sz="3200" spc="-1" strike="noStrike">
@@ -4334,7 +4334,7 @@
         </p:spPr>
         <p:txBody>
           <a:bodyPr lIns="0" rIns="0" tIns="0" bIns="0">
-            <a:normAutofit fontScale="7000"/>
+            <a:normAutofit/>
           </a:bodyPr>
           <a:p>
             <a:endParaRPr b="0" lang="en-GB" sz="3200" spc="-1" strike="noStrike">
@@ -4364,7 +4364,7 @@
         </p:spPr>
         <p:txBody>
           <a:bodyPr lIns="0" rIns="0" tIns="0" bIns="0">
-            <a:normAutofit fontScale="7000"/>
+            <a:normAutofit/>
           </a:bodyPr>
           <a:p>
             <a:endParaRPr b="0" lang="en-GB" sz="3200" spc="-1" strike="noStrike">
@@ -4394,7 +4394,7 @@
         </p:spPr>
         <p:txBody>
           <a:bodyPr lIns="0" rIns="0" tIns="0" bIns="0">
-            <a:normAutofit fontScale="7000"/>
+            <a:normAutofit/>
           </a:bodyPr>
           <a:p>
             <a:endParaRPr b="0" lang="en-GB" sz="3200" spc="-1" strike="noStrike">
@@ -4477,7 +4477,7 @@
         </p:spPr>
         <p:txBody>
           <a:bodyPr lIns="0" rIns="0" tIns="0" bIns="0">
-            <a:normAutofit fontScale="7000"/>
+            <a:normAutofit/>
           </a:bodyPr>
           <a:p>
             <a:endParaRPr b="0" lang="en-GB" sz="3200" spc="-1" strike="noStrike">
@@ -4507,7 +4507,7 @@
         </p:spPr>
         <p:txBody>
           <a:bodyPr lIns="0" rIns="0" tIns="0" bIns="0">
-            <a:normAutofit fontScale="7000"/>
+            <a:normAutofit/>
           </a:bodyPr>
           <a:p>
             <a:endParaRPr b="0" lang="en-GB" sz="3200" spc="-1" strike="noStrike">
@@ -4590,7 +4590,7 @@
         </p:spPr>
         <p:txBody>
           <a:bodyPr lIns="0" rIns="0" tIns="0" bIns="0">
-            <a:normAutofit fontScale="7000"/>
+            <a:normAutofit/>
           </a:bodyPr>
           <a:p>
             <a:endParaRPr b="0" lang="en-GB" sz="3200" spc="-1" strike="noStrike">
@@ -4620,7 +4620,7 @@
         </p:spPr>
         <p:txBody>
           <a:bodyPr lIns="0" rIns="0" tIns="0" bIns="0">
-            <a:normAutofit fontScale="7000"/>
+            <a:normAutofit/>
           </a:bodyPr>
           <a:p>
             <a:endParaRPr b="0" lang="en-GB" sz="3200" spc="-1" strike="noStrike">
@@ -4650,7 +4650,7 @@
         </p:spPr>
         <p:txBody>
           <a:bodyPr lIns="0" rIns="0" tIns="0" bIns="0">
-            <a:normAutofit fontScale="7000"/>
+            <a:normAutofit/>
           </a:bodyPr>
           <a:p>
             <a:endParaRPr b="0" lang="en-GB" sz="3200" spc="-1" strike="noStrike">
@@ -4680,7 +4680,7 @@
         </p:spPr>
         <p:txBody>
           <a:bodyPr lIns="0" rIns="0" tIns="0" bIns="0">
-            <a:normAutofit fontScale="7000"/>
+            <a:normAutofit/>
           </a:bodyPr>
           <a:p>
             <a:endParaRPr b="0" lang="en-GB" sz="3200" spc="-1" strike="noStrike">
@@ -4763,7 +4763,7 @@
         </p:spPr>
         <p:txBody>
           <a:bodyPr lIns="0" rIns="0" tIns="0" bIns="0">
-            <a:normAutofit fontScale="7000"/>
+            <a:normAutofit/>
           </a:bodyPr>
           <a:p>
             <a:endParaRPr b="0" lang="en-GB" sz="3200" spc="-1" strike="noStrike">
@@ -4793,7 +4793,7 @@
         </p:spPr>
         <p:txBody>
           <a:bodyPr lIns="0" rIns="0" tIns="0" bIns="0">
-            <a:normAutofit fontScale="7000"/>
+            <a:normAutofit/>
           </a:bodyPr>
           <a:p>
             <a:endParaRPr b="0" lang="en-GB" sz="3200" spc="-1" strike="noStrike">
@@ -4823,7 +4823,7 @@
         </p:spPr>
         <p:txBody>
           <a:bodyPr lIns="0" rIns="0" tIns="0" bIns="0">
-            <a:normAutofit fontScale="7000"/>
+            <a:normAutofit/>
           </a:bodyPr>
           <a:p>
             <a:endParaRPr b="0" lang="en-GB" sz="3200" spc="-1" strike="noStrike">
@@ -4853,7 +4853,7 @@
         </p:spPr>
         <p:txBody>
           <a:bodyPr lIns="0" rIns="0" tIns="0" bIns="0">
-            <a:normAutofit fontScale="7000"/>
+            <a:normAutofit/>
           </a:bodyPr>
           <a:p>
             <a:endParaRPr b="0" lang="en-GB" sz="3200" spc="-1" strike="noStrike">
@@ -4883,7 +4883,7 @@
         </p:spPr>
         <p:txBody>
           <a:bodyPr lIns="0" rIns="0" tIns="0" bIns="0">
-            <a:normAutofit fontScale="7000"/>
+            <a:normAutofit/>
           </a:bodyPr>
           <a:p>
             <a:endParaRPr b="0" lang="en-GB" sz="3200" spc="-1" strike="noStrike">
@@ -4913,7 +4913,7 @@
         </p:spPr>
         <p:txBody>
           <a:bodyPr lIns="0" rIns="0" tIns="0" bIns="0">
-            <a:normAutofit fontScale="7000"/>
+            <a:normAutofit/>
           </a:bodyPr>
           <a:p>
             <a:endParaRPr b="0" lang="en-GB" sz="3200" spc="-1" strike="noStrike">
@@ -5155,7 +5155,7 @@
         </p:spPr>
         <p:txBody>
           <a:bodyPr lIns="0" rIns="0" tIns="0" bIns="0">
-            <a:normAutofit fontScale="23000"/>
+            <a:normAutofit/>
           </a:bodyPr>
           <a:p>
             <a:endParaRPr b="0" lang="en-GB" sz="3200" spc="-1" strike="noStrike">
@@ -5238,7 +5238,7 @@
         </p:spPr>
         <p:txBody>
           <a:bodyPr lIns="0" rIns="0" tIns="0" bIns="0">
-            <a:normAutofit fontScale="23000"/>
+            <a:normAutofit/>
           </a:bodyPr>
           <a:p>
             <a:endParaRPr b="0" lang="en-GB" sz="3200" spc="-1" strike="noStrike">
@@ -5268,7 +5268,7 @@
         </p:spPr>
         <p:txBody>
           <a:bodyPr lIns="0" rIns="0" tIns="0" bIns="0">
-            <a:normAutofit fontScale="23000"/>
+            <a:normAutofit/>
           </a:bodyPr>
           <a:p>
             <a:endParaRPr b="0" lang="en-GB" sz="3200" spc="-1" strike="noStrike">
@@ -5457,7 +5457,7 @@
         </p:spPr>
         <p:txBody>
           <a:bodyPr lIns="0" rIns="0" tIns="0" bIns="0">
-            <a:normAutofit fontScale="7000"/>
+            <a:normAutofit/>
           </a:bodyPr>
           <a:p>
             <a:endParaRPr b="0" lang="en-GB" sz="3200" spc="-1" strike="noStrike">
@@ -5487,7 +5487,7 @@
         </p:spPr>
         <p:txBody>
           <a:bodyPr lIns="0" rIns="0" tIns="0" bIns="0">
-            <a:normAutofit fontScale="23000"/>
+            <a:normAutofit/>
           </a:bodyPr>
           <a:p>
             <a:endParaRPr b="0" lang="en-GB" sz="3200" spc="-1" strike="noStrike">
@@ -5517,7 +5517,7 @@
         </p:spPr>
         <p:txBody>
           <a:bodyPr lIns="0" rIns="0" tIns="0" bIns="0">
-            <a:normAutofit fontScale="7000"/>
+            <a:normAutofit/>
           </a:bodyPr>
           <a:p>
             <a:endParaRPr b="0" lang="en-GB" sz="3200" spc="-1" strike="noStrike">
@@ -5600,7 +5600,7 @@
         </p:spPr>
         <p:txBody>
           <a:bodyPr lIns="0" rIns="0" tIns="0" bIns="0">
-            <a:normAutofit fontScale="23000"/>
+            <a:normAutofit/>
           </a:bodyPr>
           <a:p>
             <a:endParaRPr b="0" lang="en-GB" sz="3200" spc="-1" strike="noStrike">
@@ -5630,7 +5630,7 @@
         </p:spPr>
         <p:txBody>
           <a:bodyPr lIns="0" rIns="0" tIns="0" bIns="0">
-            <a:normAutofit fontScale="7000"/>
+            <a:normAutofit/>
           </a:bodyPr>
           <a:p>
             <a:endParaRPr b="0" lang="en-GB" sz="3200" spc="-1" strike="noStrike">
@@ -5660,7 +5660,7 @@
         </p:spPr>
         <p:txBody>
           <a:bodyPr lIns="0" rIns="0" tIns="0" bIns="0">
-            <a:normAutofit fontScale="7000"/>
+            <a:normAutofit/>
           </a:bodyPr>
           <a:p>
             <a:endParaRPr b="0" lang="en-GB" sz="3200" spc="-1" strike="noStrike">
@@ -5743,7 +5743,7 @@
         </p:spPr>
         <p:txBody>
           <a:bodyPr lIns="0" rIns="0" tIns="0" bIns="0">
-            <a:normAutofit fontScale="7000"/>
+            <a:normAutofit/>
           </a:bodyPr>
           <a:p>
             <a:endParaRPr b="0" lang="en-GB" sz="3200" spc="-1" strike="noStrike">
@@ -5773,7 +5773,7 @@
         </p:spPr>
         <p:txBody>
           <a:bodyPr lIns="0" rIns="0" tIns="0" bIns="0">
-            <a:normAutofit fontScale="7000"/>
+            <a:normAutofit/>
           </a:bodyPr>
           <a:p>
             <a:endParaRPr b="0" lang="en-GB" sz="3200" spc="-1" strike="noStrike">
@@ -5803,7 +5803,7 @@
         </p:spPr>
         <p:txBody>
           <a:bodyPr lIns="0" rIns="0" tIns="0" bIns="0">
-            <a:normAutofit fontScale="7000"/>
+            <a:normAutofit/>
           </a:bodyPr>
           <a:p>
             <a:endParaRPr b="0" lang="en-GB" sz="3200" spc="-1" strike="noStrike">
@@ -5886,7 +5886,7 @@
         </p:spPr>
         <p:txBody>
           <a:bodyPr lIns="0" rIns="0" tIns="0" bIns="0">
-            <a:normAutofit fontScale="7000"/>
+            <a:normAutofit/>
           </a:bodyPr>
           <a:p>
             <a:endParaRPr b="0" lang="en-GB" sz="3200" spc="-1" strike="noStrike">
@@ -5916,7 +5916,7 @@
         </p:spPr>
         <p:txBody>
           <a:bodyPr lIns="0" rIns="0" tIns="0" bIns="0">
-            <a:normAutofit fontScale="7000"/>
+            <a:normAutofit/>
           </a:bodyPr>
           <a:p>
             <a:endParaRPr b="0" lang="en-GB" sz="3200" spc="-1" strike="noStrike">
@@ -5999,7 +5999,7 @@
         </p:spPr>
         <p:txBody>
           <a:bodyPr lIns="0" rIns="0" tIns="0" bIns="0">
-            <a:normAutofit fontScale="7000"/>
+            <a:normAutofit/>
           </a:bodyPr>
           <a:p>
             <a:endParaRPr b="0" lang="en-GB" sz="3200" spc="-1" strike="noStrike">
@@ -6029,7 +6029,7 @@
         </p:spPr>
         <p:txBody>
           <a:bodyPr lIns="0" rIns="0" tIns="0" bIns="0">
-            <a:normAutofit fontScale="7000"/>
+            <a:normAutofit/>
           </a:bodyPr>
           <a:p>
             <a:endParaRPr b="0" lang="en-GB" sz="3200" spc="-1" strike="noStrike">
@@ -6059,7 +6059,7 @@
         </p:spPr>
         <p:txBody>
           <a:bodyPr lIns="0" rIns="0" tIns="0" bIns="0">
-            <a:normAutofit fontScale="7000"/>
+            <a:normAutofit/>
           </a:bodyPr>
           <a:p>
             <a:endParaRPr b="0" lang="en-GB" sz="3200" spc="-1" strike="noStrike">
@@ -6089,7 +6089,7 @@
         </p:spPr>
         <p:txBody>
           <a:bodyPr lIns="0" rIns="0" tIns="0" bIns="0">
-            <a:normAutofit fontScale="7000"/>
+            <a:normAutofit/>
           </a:bodyPr>
           <a:p>
             <a:endParaRPr b="0" lang="en-GB" sz="3200" spc="-1" strike="noStrike">
@@ -6225,7 +6225,7 @@
         </p:spPr>
         <p:txBody>
           <a:bodyPr lIns="0" rIns="0" tIns="0" bIns="0">
-            <a:normAutofit fontScale="7000"/>
+            <a:normAutofit/>
           </a:bodyPr>
           <a:p>
             <a:endParaRPr b="0" lang="en-GB" sz="3200" spc="-1" strike="noStrike">
@@ -6255,7 +6255,7 @@
         </p:spPr>
         <p:txBody>
           <a:bodyPr lIns="0" rIns="0" tIns="0" bIns="0">
-            <a:normAutofit fontScale="7000"/>
+            <a:normAutofit/>
           </a:bodyPr>
           <a:p>
             <a:endParaRPr b="0" lang="en-GB" sz="3200" spc="-1" strike="noStrike">
@@ -6285,7 +6285,7 @@
         </p:spPr>
         <p:txBody>
           <a:bodyPr lIns="0" rIns="0" tIns="0" bIns="0">
-            <a:normAutofit fontScale="7000"/>
+            <a:normAutofit/>
           </a:bodyPr>
           <a:p>
             <a:endParaRPr b="0" lang="en-GB" sz="3200" spc="-1" strike="noStrike">
@@ -6315,7 +6315,7 @@
         </p:spPr>
         <p:txBody>
           <a:bodyPr lIns="0" rIns="0" tIns="0" bIns="0">
-            <a:normAutofit fontScale="7000"/>
+            <a:normAutofit/>
           </a:bodyPr>
           <a:p>
             <a:endParaRPr b="0" lang="en-GB" sz="3200" spc="-1" strike="noStrike">
@@ -6345,7 +6345,7 @@
         </p:spPr>
         <p:txBody>
           <a:bodyPr lIns="0" rIns="0" tIns="0" bIns="0">
-            <a:normAutofit fontScale="7000"/>
+            <a:normAutofit/>
           </a:bodyPr>
           <a:p>
             <a:endParaRPr b="0" lang="en-GB" sz="3200" spc="-1" strike="noStrike">
@@ -6375,7 +6375,7 @@
         </p:spPr>
         <p:txBody>
           <a:bodyPr lIns="0" rIns="0" tIns="0" bIns="0">
-            <a:normAutofit fontScale="7000"/>
+            <a:normAutofit/>
           </a:bodyPr>
           <a:p>
             <a:endParaRPr b="0" lang="en-GB" sz="3200" spc="-1" strike="noStrike">
@@ -6564,7 +6564,7 @@
         </p:spPr>
         <p:txBody>
           <a:bodyPr lIns="0" rIns="0" tIns="0" bIns="0">
-            <a:normAutofit fontScale="23000"/>
+            <a:normAutofit/>
           </a:bodyPr>
           <a:p>
             <a:endParaRPr b="0" lang="en-GB" sz="3200" spc="-1" strike="noStrike">
@@ -6647,7 +6647,7 @@
         </p:spPr>
         <p:txBody>
           <a:bodyPr lIns="0" rIns="0" tIns="0" bIns="0">
-            <a:normAutofit fontScale="23000"/>
+            <a:normAutofit/>
           </a:bodyPr>
           <a:p>
             <a:endParaRPr b="0" lang="en-GB" sz="3200" spc="-1" strike="noStrike">
@@ -6677,7 +6677,7 @@
         </p:spPr>
         <p:txBody>
           <a:bodyPr lIns="0" rIns="0" tIns="0" bIns="0">
-            <a:normAutofit fontScale="23000"/>
+            <a:normAutofit/>
           </a:bodyPr>
           <a:p>
             <a:endParaRPr b="0" lang="en-GB" sz="3200" spc="-1" strike="noStrike">
@@ -6866,7 +6866,7 @@
         </p:spPr>
         <p:txBody>
           <a:bodyPr lIns="0" rIns="0" tIns="0" bIns="0">
-            <a:normAutofit fontScale="7000"/>
+            <a:normAutofit/>
           </a:bodyPr>
           <a:p>
             <a:endParaRPr b="0" lang="en-GB" sz="3200" spc="-1" strike="noStrike">
@@ -6896,7 +6896,7 @@
         </p:spPr>
         <p:txBody>
           <a:bodyPr lIns="0" rIns="0" tIns="0" bIns="0">
-            <a:normAutofit fontScale="23000"/>
+            <a:normAutofit/>
           </a:bodyPr>
           <a:p>
             <a:endParaRPr b="0" lang="en-GB" sz="3200" spc="-1" strike="noStrike">
@@ -6926,7 +6926,7 @@
         </p:spPr>
         <p:txBody>
           <a:bodyPr lIns="0" rIns="0" tIns="0" bIns="0">
-            <a:normAutofit fontScale="7000"/>
+            <a:normAutofit/>
           </a:bodyPr>
           <a:p>
             <a:endParaRPr b="0" lang="en-GB" sz="3200" spc="-1" strike="noStrike">
@@ -7009,7 +7009,7 @@
         </p:spPr>
         <p:txBody>
           <a:bodyPr lIns="0" rIns="0" tIns="0" bIns="0">
-            <a:normAutofit fontScale="23000"/>
+            <a:normAutofit/>
           </a:bodyPr>
           <a:p>
             <a:endParaRPr b="0" lang="en-GB" sz="3200" spc="-1" strike="noStrike">
@@ -7039,7 +7039,7 @@
         </p:spPr>
         <p:txBody>
           <a:bodyPr lIns="0" rIns="0" tIns="0" bIns="0">
-            <a:normAutofit fontScale="7000"/>
+            <a:normAutofit/>
           </a:bodyPr>
           <a:p>
             <a:endParaRPr b="0" lang="en-GB" sz="3200" spc="-1" strike="noStrike">
@@ -7069,7 +7069,7 @@
         </p:spPr>
         <p:txBody>
           <a:bodyPr lIns="0" rIns="0" tIns="0" bIns="0">
-            <a:normAutofit fontScale="7000"/>
+            <a:normAutofit/>
           </a:bodyPr>
           <a:p>
             <a:endParaRPr b="0" lang="en-GB" sz="3200" spc="-1" strike="noStrike">
@@ -7152,7 +7152,7 @@
         </p:spPr>
         <p:txBody>
           <a:bodyPr lIns="0" rIns="0" tIns="0" bIns="0">
-            <a:normAutofit fontScale="7000"/>
+            <a:normAutofit/>
           </a:bodyPr>
           <a:p>
             <a:endParaRPr b="0" lang="en-GB" sz="3200" spc="-1" strike="noStrike">
@@ -7182,7 +7182,7 @@
         </p:spPr>
         <p:txBody>
           <a:bodyPr lIns="0" rIns="0" tIns="0" bIns="0">
-            <a:normAutofit fontScale="7000"/>
+            <a:normAutofit/>
           </a:bodyPr>
           <a:p>
             <a:endParaRPr b="0" lang="en-GB" sz="3200" spc="-1" strike="noStrike">
@@ -7212,7 +7212,7 @@
         </p:spPr>
         <p:txBody>
           <a:bodyPr lIns="0" rIns="0" tIns="0" bIns="0">
-            <a:normAutofit fontScale="7000"/>
+            <a:normAutofit/>
           </a:bodyPr>
           <a:p>
             <a:endParaRPr b="0" lang="en-GB" sz="3200" spc="-1" strike="noStrike">
@@ -7295,7 +7295,7 @@
         </p:spPr>
         <p:txBody>
           <a:bodyPr lIns="0" rIns="0" tIns="0" bIns="0">
-            <a:normAutofit fontScale="7000"/>
+            <a:normAutofit/>
           </a:bodyPr>
           <a:p>
             <a:endParaRPr b="0" lang="en-GB" sz="3200" spc="-1" strike="noStrike">
@@ -7325,7 +7325,7 @@
         </p:spPr>
         <p:txBody>
           <a:bodyPr lIns="0" rIns="0" tIns="0" bIns="0">
-            <a:normAutofit fontScale="23000"/>
+            <a:normAutofit/>
           </a:bodyPr>
           <a:p>
             <a:endParaRPr b="0" lang="en-GB" sz="3200" spc="-1" strike="noStrike">
@@ -7355,7 +7355,7 @@
         </p:spPr>
         <p:txBody>
           <a:bodyPr lIns="0" rIns="0" tIns="0" bIns="0">
-            <a:normAutofit fontScale="7000"/>
+            <a:normAutofit/>
           </a:bodyPr>
           <a:p>
             <a:endParaRPr b="0" lang="en-GB" sz="3200" spc="-1" strike="noStrike">
@@ -7438,7 +7438,7 @@
         </p:spPr>
         <p:txBody>
           <a:bodyPr lIns="0" rIns="0" tIns="0" bIns="0">
-            <a:normAutofit fontScale="7000"/>
+            <a:normAutofit/>
           </a:bodyPr>
           <a:p>
             <a:endParaRPr b="0" lang="en-GB" sz="3200" spc="-1" strike="noStrike">
@@ -7468,7 +7468,7 @@
         </p:spPr>
         <p:txBody>
           <a:bodyPr lIns="0" rIns="0" tIns="0" bIns="0">
-            <a:normAutofit fontScale="7000"/>
+            <a:normAutofit/>
           </a:bodyPr>
           <a:p>
             <a:endParaRPr b="0" lang="en-GB" sz="3200" spc="-1" strike="noStrike">
@@ -7551,7 +7551,7 @@
         </p:spPr>
         <p:txBody>
           <a:bodyPr lIns="0" rIns="0" tIns="0" bIns="0">
-            <a:normAutofit fontScale="7000"/>
+            <a:normAutofit/>
           </a:bodyPr>
           <a:p>
             <a:endParaRPr b="0" lang="en-GB" sz="3200" spc="-1" strike="noStrike">
@@ -7581,7 +7581,7 @@
         </p:spPr>
         <p:txBody>
           <a:bodyPr lIns="0" rIns="0" tIns="0" bIns="0">
-            <a:normAutofit fontScale="7000"/>
+            <a:normAutofit/>
           </a:bodyPr>
           <a:p>
             <a:endParaRPr b="0" lang="en-GB" sz="3200" spc="-1" strike="noStrike">
@@ -7611,7 +7611,7 @@
         </p:spPr>
         <p:txBody>
           <a:bodyPr lIns="0" rIns="0" tIns="0" bIns="0">
-            <a:normAutofit fontScale="7000"/>
+            <a:normAutofit/>
           </a:bodyPr>
           <a:p>
             <a:endParaRPr b="0" lang="en-GB" sz="3200" spc="-1" strike="noStrike">
@@ -7641,7 +7641,7 @@
         </p:spPr>
         <p:txBody>
           <a:bodyPr lIns="0" rIns="0" tIns="0" bIns="0">
-            <a:normAutofit fontScale="7000"/>
+            <a:normAutofit/>
           </a:bodyPr>
           <a:p>
             <a:endParaRPr b="0" lang="en-GB" sz="3200" spc="-1" strike="noStrike">
@@ -7724,7 +7724,7 @@
         </p:spPr>
         <p:txBody>
           <a:bodyPr lIns="0" rIns="0" tIns="0" bIns="0">
-            <a:normAutofit fontScale="7000"/>
+            <a:normAutofit/>
           </a:bodyPr>
           <a:p>
             <a:endParaRPr b="0" lang="en-GB" sz="3200" spc="-1" strike="noStrike">
@@ -7754,7 +7754,7 @@
         </p:spPr>
         <p:txBody>
           <a:bodyPr lIns="0" rIns="0" tIns="0" bIns="0">
-            <a:normAutofit fontScale="7000"/>
+            <a:normAutofit/>
           </a:bodyPr>
           <a:p>
             <a:endParaRPr b="0" lang="en-GB" sz="3200" spc="-1" strike="noStrike">
@@ -7784,7 +7784,7 @@
         </p:spPr>
         <p:txBody>
           <a:bodyPr lIns="0" rIns="0" tIns="0" bIns="0">
-            <a:normAutofit fontScale="7000"/>
+            <a:normAutofit/>
           </a:bodyPr>
           <a:p>
             <a:endParaRPr b="0" lang="en-GB" sz="3200" spc="-1" strike="noStrike">
@@ -7814,7 +7814,7 @@
         </p:spPr>
         <p:txBody>
           <a:bodyPr lIns="0" rIns="0" tIns="0" bIns="0">
-            <a:normAutofit fontScale="7000"/>
+            <a:normAutofit/>
           </a:bodyPr>
           <a:p>
             <a:endParaRPr b="0" lang="en-GB" sz="3200" spc="-1" strike="noStrike">
@@ -7844,7 +7844,7 @@
         </p:spPr>
         <p:txBody>
           <a:bodyPr lIns="0" rIns="0" tIns="0" bIns="0">
-            <a:normAutofit fontScale="7000"/>
+            <a:normAutofit/>
           </a:bodyPr>
           <a:p>
             <a:endParaRPr b="0" lang="en-GB" sz="3200" spc="-1" strike="noStrike">
@@ -7874,7 +7874,7 @@
         </p:spPr>
         <p:txBody>
           <a:bodyPr lIns="0" rIns="0" tIns="0" bIns="0">
-            <a:normAutofit fontScale="7000"/>
+            <a:normAutofit/>
           </a:bodyPr>
           <a:p>
             <a:endParaRPr b="0" lang="en-GB" sz="3200" spc="-1" strike="noStrike">
@@ -8063,7 +8063,7 @@
         </p:spPr>
         <p:txBody>
           <a:bodyPr lIns="0" rIns="0" tIns="0" bIns="0">
-            <a:normAutofit fontScale="23000"/>
+            <a:normAutofit/>
           </a:bodyPr>
           <a:p>
             <a:endParaRPr b="0" lang="en-GB" sz="3200" spc="-1" strike="noStrike">
@@ -8146,7 +8146,7 @@
         </p:spPr>
         <p:txBody>
           <a:bodyPr lIns="0" rIns="0" tIns="0" bIns="0">
-            <a:normAutofit fontScale="23000"/>
+            <a:normAutofit/>
           </a:bodyPr>
           <a:p>
             <a:endParaRPr b="0" lang="en-GB" sz="3200" spc="-1" strike="noStrike">
@@ -8176,7 +8176,7 @@
         </p:spPr>
         <p:txBody>
           <a:bodyPr lIns="0" rIns="0" tIns="0" bIns="0">
-            <a:normAutofit fontScale="23000"/>
+            <a:normAutofit/>
           </a:bodyPr>
           <a:p>
             <a:endParaRPr b="0" lang="en-GB" sz="3200" spc="-1" strike="noStrike">
@@ -8365,7 +8365,7 @@
         </p:spPr>
         <p:txBody>
           <a:bodyPr lIns="0" rIns="0" tIns="0" bIns="0">
-            <a:normAutofit fontScale="7000"/>
+            <a:normAutofit/>
           </a:bodyPr>
           <a:p>
             <a:endParaRPr b="0" lang="en-GB" sz="3200" spc="-1" strike="noStrike">
@@ -8395,7 +8395,7 @@
         </p:spPr>
         <p:txBody>
           <a:bodyPr lIns="0" rIns="0" tIns="0" bIns="0">
-            <a:normAutofit fontScale="23000"/>
+            <a:normAutofit/>
           </a:bodyPr>
           <a:p>
             <a:endParaRPr b="0" lang="en-GB" sz="3200" spc="-1" strike="noStrike">
@@ -8425,7 +8425,7 @@
         </p:spPr>
         <p:txBody>
           <a:bodyPr lIns="0" rIns="0" tIns="0" bIns="0">
-            <a:normAutofit fontScale="7000"/>
+            <a:normAutofit/>
           </a:bodyPr>
           <a:p>
             <a:endParaRPr b="0" lang="en-GB" sz="3200" spc="-1" strike="noStrike">
@@ -8508,7 +8508,7 @@
         </p:spPr>
         <p:txBody>
           <a:bodyPr lIns="0" rIns="0" tIns="0" bIns="0">
-            <a:normAutofit fontScale="23000"/>
+            <a:normAutofit/>
           </a:bodyPr>
           <a:p>
             <a:endParaRPr b="0" lang="en-GB" sz="3200" spc="-1" strike="noStrike">
@@ -8538,7 +8538,7 @@
         </p:spPr>
         <p:txBody>
           <a:bodyPr lIns="0" rIns="0" tIns="0" bIns="0">
-            <a:normAutofit fontScale="7000"/>
+            <a:normAutofit/>
           </a:bodyPr>
           <a:p>
             <a:endParaRPr b="0" lang="en-GB" sz="3200" spc="-1" strike="noStrike">
@@ -8568,7 +8568,7 @@
         </p:spPr>
         <p:txBody>
           <a:bodyPr lIns="0" rIns="0" tIns="0" bIns="0">
-            <a:normAutofit fontScale="7000"/>
+            <a:normAutofit/>
           </a:bodyPr>
           <a:p>
             <a:endParaRPr b="0" lang="en-GB" sz="3200" spc="-1" strike="noStrike">
@@ -8651,7 +8651,7 @@
         </p:spPr>
         <p:txBody>
           <a:bodyPr lIns="0" rIns="0" tIns="0" bIns="0">
-            <a:normAutofit fontScale="23000"/>
+            <a:normAutofit/>
           </a:bodyPr>
           <a:p>
             <a:endParaRPr b="0" lang="en-GB" sz="3200" spc="-1" strike="noStrike">
@@ -8681,7 +8681,7 @@
         </p:spPr>
         <p:txBody>
           <a:bodyPr lIns="0" rIns="0" tIns="0" bIns="0">
-            <a:normAutofit fontScale="7000"/>
+            <a:normAutofit/>
           </a:bodyPr>
           <a:p>
             <a:endParaRPr b="0" lang="en-GB" sz="3200" spc="-1" strike="noStrike">
@@ -8711,7 +8711,7 @@
         </p:spPr>
         <p:txBody>
           <a:bodyPr lIns="0" rIns="0" tIns="0" bIns="0">
-            <a:normAutofit fontScale="7000"/>
+            <a:normAutofit/>
           </a:bodyPr>
           <a:p>
             <a:endParaRPr b="0" lang="en-GB" sz="3200" spc="-1" strike="noStrike">
@@ -8794,7 +8794,7 @@
         </p:spPr>
         <p:txBody>
           <a:bodyPr lIns="0" rIns="0" tIns="0" bIns="0">
-            <a:normAutofit fontScale="7000"/>
+            <a:normAutofit/>
           </a:bodyPr>
           <a:p>
             <a:endParaRPr b="0" lang="en-GB" sz="3200" spc="-1" strike="noStrike">
@@ -8824,7 +8824,7 @@
         </p:spPr>
         <p:txBody>
           <a:bodyPr lIns="0" rIns="0" tIns="0" bIns="0">
-            <a:normAutofit fontScale="7000"/>
+            <a:normAutofit/>
           </a:bodyPr>
           <a:p>
             <a:endParaRPr b="0" lang="en-GB" sz="3200" spc="-1" strike="noStrike">
@@ -8854,7 +8854,7 @@
         </p:spPr>
         <p:txBody>
           <a:bodyPr lIns="0" rIns="0" tIns="0" bIns="0">
-            <a:normAutofit fontScale="7000"/>
+            <a:normAutofit/>
           </a:bodyPr>
           <a:p>
             <a:endParaRPr b="0" lang="en-GB" sz="3200" spc="-1" strike="noStrike">
@@ -8937,7 +8937,7 @@
         </p:spPr>
         <p:txBody>
           <a:bodyPr lIns="0" rIns="0" tIns="0" bIns="0">
-            <a:normAutofit fontScale="7000"/>
+            <a:normAutofit/>
           </a:bodyPr>
           <a:p>
             <a:endParaRPr b="0" lang="en-GB" sz="3200" spc="-1" strike="noStrike">
@@ -8967,7 +8967,7 @@
         </p:spPr>
         <p:txBody>
           <a:bodyPr lIns="0" rIns="0" tIns="0" bIns="0">
-            <a:normAutofit fontScale="7000"/>
+            <a:normAutofit/>
           </a:bodyPr>
           <a:p>
             <a:endParaRPr b="0" lang="en-GB" sz="3200" spc="-1" strike="noStrike">
@@ -9050,7 +9050,7 @@
         </p:spPr>
         <p:txBody>
           <a:bodyPr lIns="0" rIns="0" tIns="0" bIns="0">
-            <a:normAutofit fontScale="7000"/>
+            <a:normAutofit/>
           </a:bodyPr>
           <a:p>
             <a:endParaRPr b="0" lang="en-GB" sz="3200" spc="-1" strike="noStrike">
@@ -9080,7 +9080,7 @@
         </p:spPr>
         <p:txBody>
           <a:bodyPr lIns="0" rIns="0" tIns="0" bIns="0">
-            <a:normAutofit fontScale="7000"/>
+            <a:normAutofit/>
           </a:bodyPr>
           <a:p>
             <a:endParaRPr b="0" lang="en-GB" sz="3200" spc="-1" strike="noStrike">
@@ -9110,7 +9110,7 @@
         </p:spPr>
         <p:txBody>
           <a:bodyPr lIns="0" rIns="0" tIns="0" bIns="0">
-            <a:normAutofit fontScale="7000"/>
+            <a:normAutofit/>
           </a:bodyPr>
           <a:p>
             <a:endParaRPr b="0" lang="en-GB" sz="3200" spc="-1" strike="noStrike">
@@ -9140,7 +9140,7 @@
         </p:spPr>
         <p:txBody>
           <a:bodyPr lIns="0" rIns="0" tIns="0" bIns="0">
-            <a:normAutofit fontScale="7000"/>
+            <a:normAutofit/>
           </a:bodyPr>
           <a:p>
             <a:endParaRPr b="0" lang="en-GB" sz="3200" spc="-1" strike="noStrike">
@@ -9223,7 +9223,7 @@
         </p:spPr>
         <p:txBody>
           <a:bodyPr lIns="0" rIns="0" tIns="0" bIns="0">
-            <a:normAutofit fontScale="7000"/>
+            <a:normAutofit/>
           </a:bodyPr>
           <a:p>
             <a:endParaRPr b="0" lang="en-GB" sz="3200" spc="-1" strike="noStrike">
@@ -9253,7 +9253,7 @@
         </p:spPr>
         <p:txBody>
           <a:bodyPr lIns="0" rIns="0" tIns="0" bIns="0">
-            <a:normAutofit fontScale="7000"/>
+            <a:normAutofit/>
           </a:bodyPr>
           <a:p>
             <a:endParaRPr b="0" lang="en-GB" sz="3200" spc="-1" strike="noStrike">
@@ -9283,7 +9283,7 @@
         </p:spPr>
         <p:txBody>
           <a:bodyPr lIns="0" rIns="0" tIns="0" bIns="0">
-            <a:normAutofit fontScale="7000"/>
+            <a:normAutofit/>
           </a:bodyPr>
           <a:p>
             <a:endParaRPr b="0" lang="en-GB" sz="3200" spc="-1" strike="noStrike">
@@ -9313,7 +9313,7 @@
         </p:spPr>
         <p:txBody>
           <a:bodyPr lIns="0" rIns="0" tIns="0" bIns="0">
-            <a:normAutofit fontScale="7000"/>
+            <a:normAutofit/>
           </a:bodyPr>
           <a:p>
             <a:endParaRPr b="0" lang="en-GB" sz="3200" spc="-1" strike="noStrike">
@@ -9343,7 +9343,7 @@
         </p:spPr>
         <p:txBody>
           <a:bodyPr lIns="0" rIns="0" tIns="0" bIns="0">
-            <a:normAutofit fontScale="7000"/>
+            <a:normAutofit/>
           </a:bodyPr>
           <a:p>
             <a:endParaRPr b="0" lang="en-GB" sz="3200" spc="-1" strike="noStrike">
@@ -9373,7 +9373,7 @@
         </p:spPr>
         <p:txBody>
           <a:bodyPr lIns="0" rIns="0" tIns="0" bIns="0">
-            <a:normAutofit fontScale="7000"/>
+            <a:normAutofit/>
           </a:bodyPr>
           <a:p>
             <a:endParaRPr b="0" lang="en-GB" sz="3200" spc="-1" strike="noStrike">
@@ -9562,7 +9562,7 @@
         </p:spPr>
         <p:txBody>
           <a:bodyPr lIns="0" rIns="0" tIns="0" bIns="0">
-            <a:normAutofit fontScale="23000"/>
+            <a:normAutofit/>
           </a:bodyPr>
           <a:p>
             <a:endParaRPr b="0" lang="en-GB" sz="3200" spc="-1" strike="noStrike">
@@ -9645,7 +9645,7 @@
         </p:spPr>
         <p:txBody>
           <a:bodyPr lIns="0" rIns="0" tIns="0" bIns="0">
-            <a:normAutofit fontScale="23000"/>
+            <a:normAutofit/>
           </a:bodyPr>
           <a:p>
             <a:endParaRPr b="0" lang="en-GB" sz="3200" spc="-1" strike="noStrike">
@@ -9675,7 +9675,7 @@
         </p:spPr>
         <p:txBody>
           <a:bodyPr lIns="0" rIns="0" tIns="0" bIns="0">
-            <a:normAutofit fontScale="23000"/>
+            <a:normAutofit/>
           </a:bodyPr>
           <a:p>
             <a:endParaRPr b="0" lang="en-GB" sz="3200" spc="-1" strike="noStrike">
@@ -9811,7 +9811,7 @@
         </p:spPr>
         <p:txBody>
           <a:bodyPr lIns="0" rIns="0" tIns="0" bIns="0">
-            <a:normAutofit fontScale="7000"/>
+            <a:normAutofit/>
           </a:bodyPr>
           <a:p>
             <a:endParaRPr b="0" lang="en-GB" sz="3200" spc="-1" strike="noStrike">
@@ -9841,7 +9841,7 @@
         </p:spPr>
         <p:txBody>
           <a:bodyPr lIns="0" rIns="0" tIns="0" bIns="0">
-            <a:normAutofit fontScale="7000"/>
+            <a:normAutofit/>
           </a:bodyPr>
           <a:p>
             <a:endParaRPr b="0" lang="en-GB" sz="3200" spc="-1" strike="noStrike">
@@ -9871,7 +9871,7 @@
         </p:spPr>
         <p:txBody>
           <a:bodyPr lIns="0" rIns="0" tIns="0" bIns="0">
-            <a:normAutofit fontScale="7000"/>
+            <a:normAutofit/>
           </a:bodyPr>
           <a:p>
             <a:endParaRPr b="0" lang="en-GB" sz="3200" spc="-1" strike="noStrike">
@@ -10007,7 +10007,7 @@
         </p:spPr>
         <p:txBody>
           <a:bodyPr lIns="0" rIns="0" tIns="0" bIns="0">
-            <a:normAutofit fontScale="7000"/>
+            <a:normAutofit/>
           </a:bodyPr>
           <a:p>
             <a:endParaRPr b="0" lang="en-GB" sz="3200" spc="-1" strike="noStrike">
@@ -10037,7 +10037,7 @@
         </p:spPr>
         <p:txBody>
           <a:bodyPr lIns="0" rIns="0" tIns="0" bIns="0">
-            <a:normAutofit fontScale="23000"/>
+            <a:normAutofit/>
           </a:bodyPr>
           <a:p>
             <a:endParaRPr b="0" lang="en-GB" sz="3200" spc="-1" strike="noStrike">
@@ -10067,7 +10067,7 @@
         </p:spPr>
         <p:txBody>
           <a:bodyPr lIns="0" rIns="0" tIns="0" bIns="0">
-            <a:normAutofit fontScale="7000"/>
+            <a:normAutofit/>
           </a:bodyPr>
           <a:p>
             <a:endParaRPr b="0" lang="en-GB" sz="3200" spc="-1" strike="noStrike">
@@ -10150,7 +10150,7 @@
         </p:spPr>
         <p:txBody>
           <a:bodyPr lIns="0" rIns="0" tIns="0" bIns="0">
-            <a:normAutofit fontScale="23000"/>
+            <a:normAutofit/>
           </a:bodyPr>
           <a:p>
             <a:endParaRPr b="0" lang="en-GB" sz="3200" spc="-1" strike="noStrike">
@@ -10180,7 +10180,7 @@
         </p:spPr>
         <p:txBody>
           <a:bodyPr lIns="0" rIns="0" tIns="0" bIns="0">
-            <a:normAutofit fontScale="7000"/>
+            <a:normAutofit/>
           </a:bodyPr>
           <a:p>
             <a:endParaRPr b="0" lang="en-GB" sz="3200" spc="-1" strike="noStrike">
@@ -10210,7 +10210,7 @@
         </p:spPr>
         <p:txBody>
           <a:bodyPr lIns="0" rIns="0" tIns="0" bIns="0">
-            <a:normAutofit fontScale="7000"/>
+            <a:normAutofit/>
           </a:bodyPr>
           <a:p>
             <a:endParaRPr b="0" lang="en-GB" sz="3200" spc="-1" strike="noStrike">
@@ -10293,7 +10293,7 @@
         </p:spPr>
         <p:txBody>
           <a:bodyPr lIns="0" rIns="0" tIns="0" bIns="0">
-            <a:normAutofit fontScale="7000"/>
+            <a:normAutofit/>
           </a:bodyPr>
           <a:p>
             <a:endParaRPr b="0" lang="en-GB" sz="3200" spc="-1" strike="noStrike">
@@ -10323,7 +10323,7 @@
         </p:spPr>
         <p:txBody>
           <a:bodyPr lIns="0" rIns="0" tIns="0" bIns="0">
-            <a:normAutofit fontScale="7000"/>
+            <a:normAutofit/>
           </a:bodyPr>
           <a:p>
             <a:endParaRPr b="0" lang="en-GB" sz="3200" spc="-1" strike="noStrike">
@@ -10353,7 +10353,7 @@
         </p:spPr>
         <p:txBody>
           <a:bodyPr lIns="0" rIns="0" tIns="0" bIns="0">
-            <a:normAutofit fontScale="7000"/>
+            <a:normAutofit/>
           </a:bodyPr>
           <a:p>
             <a:endParaRPr b="0" lang="en-GB" sz="3200" spc="-1" strike="noStrike">
@@ -10436,7 +10436,7 @@
         </p:spPr>
         <p:txBody>
           <a:bodyPr lIns="0" rIns="0" tIns="0" bIns="0">
-            <a:normAutofit fontScale="7000"/>
+            <a:normAutofit/>
           </a:bodyPr>
           <a:p>
             <a:endParaRPr b="0" lang="en-GB" sz="3200" spc="-1" strike="noStrike">
@@ -10466,7 +10466,7 @@
         </p:spPr>
         <p:txBody>
           <a:bodyPr lIns="0" rIns="0" tIns="0" bIns="0">
-            <a:normAutofit fontScale="7000"/>
+            <a:normAutofit/>
           </a:bodyPr>
           <a:p>
             <a:endParaRPr b="0" lang="en-GB" sz="3200" spc="-1" strike="noStrike">
@@ -10549,7 +10549,7 @@
         </p:spPr>
         <p:txBody>
           <a:bodyPr lIns="0" rIns="0" tIns="0" bIns="0">
-            <a:normAutofit fontScale="7000"/>
+            <a:normAutofit/>
           </a:bodyPr>
           <a:p>
             <a:endParaRPr b="0" lang="en-GB" sz="3200" spc="-1" strike="noStrike">
@@ -10579,7 +10579,7 @@
         </p:spPr>
         <p:txBody>
           <a:bodyPr lIns="0" rIns="0" tIns="0" bIns="0">
-            <a:normAutofit fontScale="7000"/>
+            <a:normAutofit/>
           </a:bodyPr>
           <a:p>
             <a:endParaRPr b="0" lang="en-GB" sz="3200" spc="-1" strike="noStrike">
@@ -10609,7 +10609,7 @@
         </p:spPr>
         <p:txBody>
           <a:bodyPr lIns="0" rIns="0" tIns="0" bIns="0">
-            <a:normAutofit fontScale="7000"/>
+            <a:normAutofit/>
           </a:bodyPr>
           <a:p>
             <a:endParaRPr b="0" lang="en-GB" sz="3200" spc="-1" strike="noStrike">
@@ -10639,7 +10639,7 @@
         </p:spPr>
         <p:txBody>
           <a:bodyPr lIns="0" rIns="0" tIns="0" bIns="0">
-            <a:normAutofit fontScale="7000"/>
+            <a:normAutofit/>
           </a:bodyPr>
           <a:p>
             <a:endParaRPr b="0" lang="en-GB" sz="3200" spc="-1" strike="noStrike">
@@ -10722,7 +10722,7 @@
         </p:spPr>
         <p:txBody>
           <a:bodyPr lIns="0" rIns="0" tIns="0" bIns="0">
-            <a:normAutofit fontScale="7000"/>
+            <a:normAutofit/>
           </a:bodyPr>
           <a:p>
             <a:endParaRPr b="0" lang="en-GB" sz="3200" spc="-1" strike="noStrike">
@@ -10752,7 +10752,7 @@
         </p:spPr>
         <p:txBody>
           <a:bodyPr lIns="0" rIns="0" tIns="0" bIns="0">
-            <a:normAutofit fontScale="7000"/>
+            <a:normAutofit/>
           </a:bodyPr>
           <a:p>
             <a:endParaRPr b="0" lang="en-GB" sz="3200" spc="-1" strike="noStrike">
@@ -10782,7 +10782,7 @@
         </p:spPr>
         <p:txBody>
           <a:bodyPr lIns="0" rIns="0" tIns="0" bIns="0">
-            <a:normAutofit fontScale="7000"/>
+            <a:normAutofit/>
           </a:bodyPr>
           <a:p>
             <a:endParaRPr b="0" lang="en-GB" sz="3200" spc="-1" strike="noStrike">
@@ -10812,7 +10812,7 @@
         </p:spPr>
         <p:txBody>
           <a:bodyPr lIns="0" rIns="0" tIns="0" bIns="0">
-            <a:normAutofit fontScale="7000"/>
+            <a:normAutofit/>
           </a:bodyPr>
           <a:p>
             <a:endParaRPr b="0" lang="en-GB" sz="3200" spc="-1" strike="noStrike">
@@ -10842,7 +10842,7 @@
         </p:spPr>
         <p:txBody>
           <a:bodyPr lIns="0" rIns="0" tIns="0" bIns="0">
-            <a:normAutofit fontScale="7000"/>
+            <a:normAutofit/>
           </a:bodyPr>
           <a:p>
             <a:endParaRPr b="0" lang="en-GB" sz="3200" spc="-1" strike="noStrike">
@@ -10872,7 +10872,7 @@
         </p:spPr>
         <p:txBody>
           <a:bodyPr lIns="0" rIns="0" tIns="0" bIns="0">
-            <a:normAutofit fontScale="7000"/>
+            <a:normAutofit/>
           </a:bodyPr>
           <a:p>
             <a:endParaRPr b="0" lang="en-GB" sz="3200" spc="-1" strike="noStrike">
@@ -10919,7 +10919,7 @@
         <p:spPr>
           <a:xfrm flipH="1">
             <a:off x="2520" y="301680"/>
-            <a:ext cx="9146520" cy="4493160"/>
+            <a:ext cx="9146160" cy="4492800"/>
           </a:xfrm>
           <a:custGeom>
             <a:avLst/>
@@ -10975,7 +10975,7 @@
         <p:spPr>
           <a:xfrm>
             <a:off x="-5760" y="759960"/>
-            <a:ext cx="9140400" cy="3766320"/>
+            <a:ext cx="9140040" cy="3765960"/>
           </a:xfrm>
           <a:custGeom>
             <a:avLst/>
@@ -11031,7 +11031,7 @@
         <p:spPr>
           <a:xfrm>
             <a:off x="0" y="1351080"/>
-            <a:ext cx="9152640" cy="2885400"/>
+            <a:ext cx="9152280" cy="2885040"/>
           </a:xfrm>
           <a:custGeom>
             <a:avLst/>
@@ -11130,18 +11130,19 @@
         </p:spPr>
         <p:txBody>
           <a:bodyPr lIns="0" rIns="0" tIns="0" bIns="0">
-            <a:normAutofit fontScale="1000"/>
-          </a:bodyPr>
-          <a:p>
-            <a:pPr marL="1065167640" indent="23592960">
+            <a:normAutofit/>
+          </a:bodyPr>
+          <a:p>
+            <a:pPr marL="432000" indent="-324000">
               <a:spcBef>
                 <a:spcPts val="1417"/>
               </a:spcBef>
               <a:buClr>
-                <a:srgbClr val="000000"/>
+                <a:srgbClr val="ffffff"/>
               </a:buClr>
-              <a:buFont typeface="Wingdings"/>
-              <a:buChar char="l"/>
+              <a:buSzPct val="45000"/>
+              <a:buFont typeface="Wingdings" charset="2"/>
+              <a:buChar char=""/>
             </a:pPr>
             <a:r>
               <a:rPr b="0" lang="en-GB" sz="3200" spc="-1" strike="noStrike">
@@ -11154,15 +11155,16 @@
             </a:endParaRPr>
           </a:p>
           <a:p>
-            <a:pPr lvl="1" marL="1772427960" indent="23592960">
+            <a:pPr lvl="1" marL="864000" indent="-324000">
               <a:spcBef>
                 <a:spcPts val="1134"/>
               </a:spcBef>
               <a:buClr>
-                <a:srgbClr val="000000"/>
+                <a:srgbClr val="ffffff"/>
               </a:buClr>
-              <a:buFont typeface="Wingdings"/>
-              <a:buChar char="l"/>
+              <a:buSzPct val="75000"/>
+              <a:buFont typeface="Symbol" charset="2"/>
+              <a:buChar char=""/>
             </a:pPr>
             <a:r>
               <a:rPr b="0" lang="en-GB" sz="2800" spc="-1" strike="noStrike">
@@ -11175,15 +11177,16 @@
             </a:endParaRPr>
           </a:p>
           <a:p>
-            <a:pPr lvl="2" marL="1065167640" indent="23592960">
+            <a:pPr lvl="2" marL="1296000" indent="-288000">
               <a:spcBef>
                 <a:spcPts val="850"/>
               </a:spcBef>
               <a:buClr>
-                <a:srgbClr val="000000"/>
+                <a:srgbClr val="ffffff"/>
               </a:buClr>
-              <a:buFont typeface="Wingdings"/>
-              <a:buChar char="l"/>
+              <a:buSzPct val="45000"/>
+              <a:buFont typeface="Wingdings" charset="2"/>
+              <a:buChar char=""/>
             </a:pPr>
             <a:r>
               <a:rPr b="0" lang="en-GB" sz="2400" spc="-1" strike="noStrike">
@@ -11196,15 +11199,16 @@
             </a:endParaRPr>
           </a:p>
           <a:p>
-            <a:pPr lvl="3" marL="1772427960" indent="23592960">
+            <a:pPr lvl="3" marL="1728000" indent="-216000">
               <a:spcBef>
                 <a:spcPts val="567"/>
               </a:spcBef>
               <a:buClr>
-                <a:srgbClr val="000000"/>
+                <a:srgbClr val="ffffff"/>
               </a:buClr>
-              <a:buFont typeface="Wingdings"/>
-              <a:buChar char="l"/>
+              <a:buSzPct val="75000"/>
+              <a:buFont typeface="Symbol" charset="2"/>
+              <a:buChar char=""/>
             </a:pPr>
             <a:r>
               <a:rPr b="0" lang="en-GB" sz="2000" spc="-1" strike="noStrike">
@@ -11217,15 +11221,16 @@
             </a:endParaRPr>
           </a:p>
           <a:p>
-            <a:pPr lvl="4" marL="1065167640" indent="23592960">
+            <a:pPr lvl="4" marL="2160000" indent="-216000">
               <a:spcBef>
                 <a:spcPts val="283"/>
               </a:spcBef>
               <a:buClr>
-                <a:srgbClr val="000000"/>
+                <a:srgbClr val="ffffff"/>
               </a:buClr>
-              <a:buFont typeface="Wingdings"/>
-              <a:buChar char="l"/>
+              <a:buSzPct val="45000"/>
+              <a:buFont typeface="Wingdings" charset="2"/>
+              <a:buChar char=""/>
             </a:pPr>
             <a:r>
               <a:rPr b="0" lang="en-GB" sz="2000" spc="-1" strike="noStrike">
@@ -11238,15 +11243,16 @@
             </a:endParaRPr>
           </a:p>
           <a:p>
-            <a:pPr lvl="5" marL="1065167640" indent="23592960">
+            <a:pPr lvl="5" marL="2592000" indent="-216000">
               <a:spcBef>
                 <a:spcPts val="283"/>
               </a:spcBef>
               <a:buClr>
-                <a:srgbClr val="000000"/>
+                <a:srgbClr val="ffffff"/>
               </a:buClr>
-              <a:buFont typeface="Wingdings"/>
-              <a:buChar char="l"/>
+              <a:buSzPct val="45000"/>
+              <a:buFont typeface="Wingdings" charset="2"/>
+              <a:buChar char=""/>
             </a:pPr>
             <a:r>
               <a:rPr b="0" lang="en-GB" sz="2000" spc="-1" strike="noStrike">
@@ -11259,15 +11265,16 @@
             </a:endParaRPr>
           </a:p>
           <a:p>
-            <a:pPr lvl="6" marL="1065167640" indent="23592960">
+            <a:pPr lvl="6" marL="3024000" indent="-216000">
               <a:spcBef>
                 <a:spcPts val="283"/>
               </a:spcBef>
               <a:buClr>
-                <a:srgbClr val="000000"/>
+                <a:srgbClr val="ffffff"/>
               </a:buClr>
-              <a:buFont typeface="Wingdings"/>
-              <a:buChar char="l"/>
+              <a:buSzPct val="45000"/>
+              <a:buFont typeface="Wingdings" charset="2"/>
+              <a:buChar char=""/>
             </a:pPr>
             <a:r>
               <a:rPr b="0" lang="en-GB" sz="2000" spc="-1" strike="noStrike">
@@ -11334,9 +11341,9 @@
         <p:grpSpPr>
           <a:xfrm>
             <a:off x="-6120" y="0"/>
-            <a:ext cx="9164520" cy="5159520"/>
+            <a:ext cx="9164160" cy="5159160"/>
             <a:chOff x="-6120" y="0"/>
-            <a:chExt cx="9164520" cy="5159520"/>
+            <a:chExt cx="9164160" cy="5159160"/>
           </a:xfrm>
         </p:grpSpPr>
         <p:sp>
@@ -11348,7 +11355,7 @@
           <p:spPr>
             <a:xfrm>
               <a:off x="0" y="0"/>
-              <a:ext cx="8549280" cy="1329480"/>
+              <a:ext cx="8548920" cy="1329120"/>
             </a:xfrm>
             <a:custGeom>
               <a:avLst/>
@@ -11393,7 +11400,7 @@
           <p:spPr>
             <a:xfrm>
               <a:off x="2563560" y="0"/>
-              <a:ext cx="6576840" cy="1269000"/>
+              <a:ext cx="6576480" cy="1268640"/>
             </a:xfrm>
             <a:custGeom>
               <a:avLst/>
@@ -11443,7 +11450,7 @@
           <p:spPr>
             <a:xfrm>
               <a:off x="-6120" y="0"/>
-              <a:ext cx="7294680" cy="1468080"/>
+              <a:ext cx="7294320" cy="1467720"/>
             </a:xfrm>
             <a:custGeom>
               <a:avLst/>
@@ -11493,7 +11500,7 @@
           <p:spPr>
             <a:xfrm>
               <a:off x="3596040" y="4667040"/>
-              <a:ext cx="5087160" cy="473040"/>
+              <a:ext cx="5086800" cy="472680"/>
             </a:xfrm>
             <a:custGeom>
               <a:avLst/>
@@ -11538,7 +11545,7 @@
           <p:spPr>
             <a:xfrm>
               <a:off x="5524920" y="4692600"/>
-              <a:ext cx="3633480" cy="466920"/>
+              <a:ext cx="3633120" cy="466560"/>
             </a:xfrm>
             <a:custGeom>
               <a:avLst/>
@@ -11585,7 +11592,7 @@
           <p:spPr>
             <a:xfrm>
               <a:off x="7521480" y="4023000"/>
-              <a:ext cx="1631160" cy="1136520"/>
+              <a:ext cx="1630800" cy="1136160"/>
             </a:xfrm>
             <a:custGeom>
               <a:avLst/>
@@ -11682,18 +11689,19 @@
         </p:spPr>
         <p:txBody>
           <a:bodyPr lIns="0" rIns="0" tIns="0" bIns="0">
-            <a:normAutofit fontScale="1000"/>
-          </a:bodyPr>
-          <a:p>
-            <a:pPr marL="1065167640" indent="23592960" algn="ctr">
+            <a:normAutofit fontScale="97000"/>
+          </a:bodyPr>
+          <a:p>
+            <a:pPr marL="432000" indent="-324000" algn="ctr">
               <a:spcBef>
                 <a:spcPts val="1417"/>
               </a:spcBef>
               <a:buClr>
                 <a:srgbClr val="000000"/>
               </a:buClr>
-              <a:buFont typeface="Wingdings"/>
-              <a:buChar char="l"/>
+              <a:buSzPct val="45000"/>
+              <a:buFont typeface="Wingdings" charset="2"/>
+              <a:buChar char=""/>
             </a:pPr>
             <a:r>
               <a:rPr b="0" lang="en-GB" sz="1800" spc="-1" strike="noStrike">
@@ -11706,15 +11714,16 @@
             </a:endParaRPr>
           </a:p>
           <a:p>
-            <a:pPr lvl="1" marL="1772427960" indent="23592960" algn="ctr">
+            <a:pPr lvl="1" marL="864000" indent="-324000" algn="ctr">
               <a:spcBef>
                 <a:spcPts val="1134"/>
               </a:spcBef>
               <a:buClr>
                 <a:srgbClr val="000000"/>
               </a:buClr>
-              <a:buFont typeface="Wingdings"/>
-              <a:buChar char="l"/>
+              <a:buSzPct val="75000"/>
+              <a:buFont typeface="Symbol" charset="2"/>
+              <a:buChar char=""/>
             </a:pPr>
             <a:r>
               <a:rPr b="0" lang="en-GB" sz="1800" spc="-1" strike="noStrike">
@@ -11727,15 +11736,16 @@
             </a:endParaRPr>
           </a:p>
           <a:p>
-            <a:pPr lvl="2" marL="1065167640" indent="23592960" algn="ctr">
+            <a:pPr lvl="2" marL="1296000" indent="-288000" algn="ctr">
               <a:spcBef>
                 <a:spcPts val="850"/>
               </a:spcBef>
               <a:buClr>
                 <a:srgbClr val="000000"/>
               </a:buClr>
-              <a:buFont typeface="Wingdings"/>
-              <a:buChar char="l"/>
+              <a:buSzPct val="45000"/>
+              <a:buFont typeface="Wingdings" charset="2"/>
+              <a:buChar char=""/>
             </a:pPr>
             <a:r>
               <a:rPr b="0" lang="en-GB" sz="1800" spc="-1" strike="noStrike">
@@ -11748,15 +11758,16 @@
             </a:endParaRPr>
           </a:p>
           <a:p>
-            <a:pPr lvl="3" marL="1772427960" indent="23592960" algn="ctr">
+            <a:pPr lvl="3" marL="1728000" indent="-216000" algn="ctr">
               <a:spcBef>
                 <a:spcPts val="567"/>
               </a:spcBef>
               <a:buClr>
                 <a:srgbClr val="000000"/>
               </a:buClr>
-              <a:buFont typeface="Wingdings"/>
-              <a:buChar char="l"/>
+              <a:buSzPct val="75000"/>
+              <a:buFont typeface="Symbol" charset="2"/>
+              <a:buChar char=""/>
             </a:pPr>
             <a:r>
               <a:rPr b="0" lang="en-GB" sz="1800" spc="-1" strike="noStrike">
@@ -11769,15 +11780,16 @@
             </a:endParaRPr>
           </a:p>
           <a:p>
-            <a:pPr lvl="4" marL="1065167640" indent="23592960" algn="ctr">
+            <a:pPr lvl="4" marL="2160000" indent="-216000" algn="ctr">
               <a:spcBef>
                 <a:spcPts val="283"/>
               </a:spcBef>
               <a:buClr>
                 <a:srgbClr val="000000"/>
               </a:buClr>
-              <a:buFont typeface="Wingdings"/>
-              <a:buChar char="l"/>
+              <a:buSzPct val="45000"/>
+              <a:buFont typeface="Wingdings" charset="2"/>
+              <a:buChar char=""/>
             </a:pPr>
             <a:r>
               <a:rPr b="0" lang="en-GB" sz="1800" spc="-1" strike="noStrike">
@@ -11790,15 +11802,16 @@
             </a:endParaRPr>
           </a:p>
           <a:p>
-            <a:pPr lvl="5" marL="1065167640" indent="23592960" algn="ctr">
+            <a:pPr lvl="5" marL="2592000" indent="-216000" algn="ctr">
               <a:spcBef>
                 <a:spcPts val="283"/>
               </a:spcBef>
               <a:buClr>
                 <a:srgbClr val="000000"/>
               </a:buClr>
-              <a:buFont typeface="Wingdings"/>
-              <a:buChar char="l"/>
+              <a:buSzPct val="45000"/>
+              <a:buFont typeface="Wingdings" charset="2"/>
+              <a:buChar char=""/>
             </a:pPr>
             <a:r>
               <a:rPr b="0" lang="en-GB" sz="1800" spc="-1" strike="noStrike">
@@ -11811,15 +11824,16 @@
             </a:endParaRPr>
           </a:p>
           <a:p>
-            <a:pPr lvl="6" marL="1065167640" indent="23592960" algn="ctr">
+            <a:pPr lvl="6" marL="3024000" indent="-216000" algn="ctr">
               <a:spcBef>
                 <a:spcPts val="283"/>
               </a:spcBef>
               <a:buClr>
                 <a:srgbClr val="000000"/>
               </a:buClr>
-              <a:buFont typeface="Wingdings"/>
-              <a:buChar char="l"/>
+              <a:buSzPct val="45000"/>
+              <a:buFont typeface="Wingdings" charset="2"/>
+              <a:buChar char=""/>
             </a:pPr>
             <a:r>
               <a:rPr b="0" lang="en-GB" sz="1800" spc="-1" strike="noStrike">
@@ -11854,18 +11868,19 @@
         </p:spPr>
         <p:txBody>
           <a:bodyPr lIns="0" rIns="0" tIns="0" bIns="0">
-            <a:normAutofit fontScale="1000"/>
-          </a:bodyPr>
-          <a:p>
-            <a:pPr marL="1065167640" indent="23592960" algn="ctr">
+            <a:normAutofit fontScale="97000"/>
+          </a:bodyPr>
+          <a:p>
+            <a:pPr marL="432000" indent="-324000" algn="ctr">
               <a:spcBef>
                 <a:spcPts val="1417"/>
               </a:spcBef>
               <a:buClr>
                 <a:srgbClr val="000000"/>
               </a:buClr>
-              <a:buFont typeface="Wingdings"/>
-              <a:buChar char="l"/>
+              <a:buSzPct val="45000"/>
+              <a:buFont typeface="Wingdings" charset="2"/>
+              <a:buChar char=""/>
             </a:pPr>
             <a:r>
               <a:rPr b="0" lang="en-GB" sz="1800" spc="-1" strike="noStrike">
@@ -11878,15 +11893,16 @@
             </a:endParaRPr>
           </a:p>
           <a:p>
-            <a:pPr lvl="1" marL="1772427960" indent="23592960" algn="ctr">
+            <a:pPr lvl="1" marL="864000" indent="-324000" algn="ctr">
               <a:spcBef>
                 <a:spcPts val="1134"/>
               </a:spcBef>
               <a:buClr>
                 <a:srgbClr val="000000"/>
               </a:buClr>
-              <a:buFont typeface="Wingdings"/>
-              <a:buChar char="l"/>
+              <a:buSzPct val="75000"/>
+              <a:buFont typeface="Symbol" charset="2"/>
+              <a:buChar char=""/>
             </a:pPr>
             <a:r>
               <a:rPr b="0" lang="en-GB" sz="1800" spc="-1" strike="noStrike">
@@ -11899,15 +11915,16 @@
             </a:endParaRPr>
           </a:p>
           <a:p>
-            <a:pPr lvl="2" marL="1065167640" indent="23592960" algn="ctr">
+            <a:pPr lvl="2" marL="1296000" indent="-288000" algn="ctr">
               <a:spcBef>
                 <a:spcPts val="850"/>
               </a:spcBef>
               <a:buClr>
                 <a:srgbClr val="000000"/>
               </a:buClr>
-              <a:buFont typeface="Wingdings"/>
-              <a:buChar char="l"/>
+              <a:buSzPct val="45000"/>
+              <a:buFont typeface="Wingdings" charset="2"/>
+              <a:buChar char=""/>
             </a:pPr>
             <a:r>
               <a:rPr b="0" lang="en-GB" sz="1800" spc="-1" strike="noStrike">
@@ -11920,15 +11937,16 @@
             </a:endParaRPr>
           </a:p>
           <a:p>
-            <a:pPr lvl="3" marL="1772427960" indent="23592960" algn="ctr">
+            <a:pPr lvl="3" marL="1728000" indent="-216000" algn="ctr">
               <a:spcBef>
                 <a:spcPts val="567"/>
               </a:spcBef>
               <a:buClr>
                 <a:srgbClr val="000000"/>
               </a:buClr>
-              <a:buFont typeface="Wingdings"/>
-              <a:buChar char="l"/>
+              <a:buSzPct val="75000"/>
+              <a:buFont typeface="Symbol" charset="2"/>
+              <a:buChar char=""/>
             </a:pPr>
             <a:r>
               <a:rPr b="0" lang="en-GB" sz="1800" spc="-1" strike="noStrike">
@@ -11941,15 +11959,16 @@
             </a:endParaRPr>
           </a:p>
           <a:p>
-            <a:pPr lvl="4" marL="1065167640" indent="23592960" algn="ctr">
+            <a:pPr lvl="4" marL="2160000" indent="-216000" algn="ctr">
               <a:spcBef>
                 <a:spcPts val="283"/>
               </a:spcBef>
               <a:buClr>
                 <a:srgbClr val="000000"/>
               </a:buClr>
-              <a:buFont typeface="Wingdings"/>
-              <a:buChar char="l"/>
+              <a:buSzPct val="45000"/>
+              <a:buFont typeface="Wingdings" charset="2"/>
+              <a:buChar char=""/>
             </a:pPr>
             <a:r>
               <a:rPr b="0" lang="en-GB" sz="1800" spc="-1" strike="noStrike">
@@ -11962,15 +11981,16 @@
             </a:endParaRPr>
           </a:p>
           <a:p>
-            <a:pPr lvl="5" marL="1065167640" indent="23592960" algn="ctr">
+            <a:pPr lvl="5" marL="2592000" indent="-216000" algn="ctr">
               <a:spcBef>
                 <a:spcPts val="283"/>
               </a:spcBef>
               <a:buClr>
                 <a:srgbClr val="000000"/>
               </a:buClr>
-              <a:buFont typeface="Wingdings"/>
-              <a:buChar char="l"/>
+              <a:buSzPct val="45000"/>
+              <a:buFont typeface="Wingdings" charset="2"/>
+              <a:buChar char=""/>
             </a:pPr>
             <a:r>
               <a:rPr b="0" lang="en-GB" sz="1800" spc="-1" strike="noStrike">
@@ -11983,15 +12003,16 @@
             </a:endParaRPr>
           </a:p>
           <a:p>
-            <a:pPr lvl="6" marL="1065167640" indent="23592960" algn="ctr">
+            <a:pPr lvl="6" marL="3024000" indent="-216000" algn="ctr">
               <a:spcBef>
                 <a:spcPts val="283"/>
               </a:spcBef>
               <a:buClr>
                 <a:srgbClr val="000000"/>
               </a:buClr>
-              <a:buFont typeface="Wingdings"/>
-              <a:buChar char="l"/>
+              <a:buSzPct val="45000"/>
+              <a:buFont typeface="Wingdings" charset="2"/>
+              <a:buChar char=""/>
             </a:pPr>
             <a:r>
               <a:rPr b="0" lang="en-GB" sz="1800" spc="-1" strike="noStrike">
@@ -12058,9 +12079,9 @@
         <p:grpSpPr>
           <a:xfrm>
             <a:off x="-6120" y="0"/>
-            <a:ext cx="9165240" cy="5160240"/>
+            <a:ext cx="9164880" cy="5159880"/>
             <a:chOff x="-6120" y="0"/>
-            <a:chExt cx="9165240" cy="5160240"/>
+            <a:chExt cx="9164880" cy="5159880"/>
           </a:xfrm>
         </p:grpSpPr>
         <p:sp>
@@ -12072,7 +12093,7 @@
           <p:spPr>
             <a:xfrm>
               <a:off x="0" y="0"/>
-              <a:ext cx="8550000" cy="1330200"/>
+              <a:ext cx="8549640" cy="1329840"/>
             </a:xfrm>
             <a:custGeom>
               <a:avLst/>
@@ -12117,7 +12138,7 @@
           <p:spPr>
             <a:xfrm>
               <a:off x="2563560" y="0"/>
-              <a:ext cx="6577560" cy="1269720"/>
+              <a:ext cx="6577200" cy="1269360"/>
             </a:xfrm>
             <a:custGeom>
               <a:avLst/>
@@ -12167,7 +12188,7 @@
           <p:spPr>
             <a:xfrm>
               <a:off x="-6120" y="0"/>
-              <a:ext cx="7295400" cy="1468800"/>
+              <a:ext cx="7295040" cy="1468440"/>
             </a:xfrm>
             <a:custGeom>
               <a:avLst/>
@@ -12217,7 +12238,7 @@
           <p:spPr>
             <a:xfrm>
               <a:off x="3596040" y="4667040"/>
-              <a:ext cx="5087880" cy="473760"/>
+              <a:ext cx="5087520" cy="473400"/>
             </a:xfrm>
             <a:custGeom>
               <a:avLst/>
@@ -12262,7 +12283,7 @@
           <p:spPr>
             <a:xfrm>
               <a:off x="5524920" y="4692600"/>
-              <a:ext cx="3634200" cy="467640"/>
+              <a:ext cx="3633840" cy="467280"/>
             </a:xfrm>
             <a:custGeom>
               <a:avLst/>
@@ -12309,7 +12330,7 @@
           <p:spPr>
             <a:xfrm>
               <a:off x="7521480" y="4023000"/>
-              <a:ext cx="1631880" cy="1137240"/>
+              <a:ext cx="1631520" cy="1136880"/>
             </a:xfrm>
             <a:custGeom>
               <a:avLst/>
@@ -12406,18 +12427,19 @@
         </p:spPr>
         <p:txBody>
           <a:bodyPr lIns="0" rIns="0" tIns="0" bIns="0">
-            <a:normAutofit fontScale="1000"/>
-          </a:bodyPr>
-          <a:p>
-            <a:pPr marL="1065167640" indent="23592960">
+            <a:normAutofit/>
+          </a:bodyPr>
+          <a:p>
+            <a:pPr marL="432000" indent="-324000">
               <a:spcBef>
                 <a:spcPts val="1417"/>
               </a:spcBef>
               <a:buClr>
                 <a:srgbClr val="000000"/>
               </a:buClr>
-              <a:buFont typeface="Wingdings"/>
-              <a:buChar char="l"/>
+              <a:buSzPct val="45000"/>
+              <a:buFont typeface="Wingdings" charset="2"/>
+              <a:buChar char=""/>
             </a:pPr>
             <a:r>
               <a:rPr b="0" lang="en-GB" sz="3200" spc="-1" strike="noStrike">
@@ -12430,15 +12452,16 @@
             </a:endParaRPr>
           </a:p>
           <a:p>
-            <a:pPr lvl="1" marL="1772427960" indent="23592960">
+            <a:pPr lvl="1" marL="864000" indent="-324000">
               <a:spcBef>
                 <a:spcPts val="1134"/>
               </a:spcBef>
               <a:buClr>
                 <a:srgbClr val="000000"/>
               </a:buClr>
-              <a:buFont typeface="Wingdings"/>
-              <a:buChar char="l"/>
+              <a:buSzPct val="75000"/>
+              <a:buFont typeface="Symbol" charset="2"/>
+              <a:buChar char=""/>
             </a:pPr>
             <a:r>
               <a:rPr b="0" lang="en-GB" sz="2800" spc="-1" strike="noStrike">
@@ -12451,15 +12474,16 @@
             </a:endParaRPr>
           </a:p>
           <a:p>
-            <a:pPr lvl="2" marL="1065167640" indent="23592960">
+            <a:pPr lvl="2" marL="1296000" indent="-288000">
               <a:spcBef>
                 <a:spcPts val="850"/>
               </a:spcBef>
               <a:buClr>
                 <a:srgbClr val="000000"/>
               </a:buClr>
-              <a:buFont typeface="Wingdings"/>
-              <a:buChar char="l"/>
+              <a:buSzPct val="45000"/>
+              <a:buFont typeface="Wingdings" charset="2"/>
+              <a:buChar char=""/>
             </a:pPr>
             <a:r>
               <a:rPr b="0" lang="en-GB" sz="2400" spc="-1" strike="noStrike">
@@ -12472,15 +12496,16 @@
             </a:endParaRPr>
           </a:p>
           <a:p>
-            <a:pPr lvl="3" marL="1772427960" indent="23592960">
+            <a:pPr lvl="3" marL="1728000" indent="-216000">
               <a:spcBef>
                 <a:spcPts val="567"/>
               </a:spcBef>
               <a:buClr>
                 <a:srgbClr val="000000"/>
               </a:buClr>
-              <a:buFont typeface="Wingdings"/>
-              <a:buChar char="l"/>
+              <a:buSzPct val="75000"/>
+              <a:buFont typeface="Symbol" charset="2"/>
+              <a:buChar char=""/>
             </a:pPr>
             <a:r>
               <a:rPr b="0" lang="en-GB" sz="2000" spc="-1" strike="noStrike">
@@ -12493,15 +12518,16 @@
             </a:endParaRPr>
           </a:p>
           <a:p>
-            <a:pPr lvl="4" marL="1065167640" indent="23592960">
+            <a:pPr lvl="4" marL="2160000" indent="-216000">
               <a:spcBef>
                 <a:spcPts val="283"/>
               </a:spcBef>
               <a:buClr>
                 <a:srgbClr val="000000"/>
               </a:buClr>
-              <a:buFont typeface="Wingdings"/>
-              <a:buChar char="l"/>
+              <a:buSzPct val="45000"/>
+              <a:buFont typeface="Wingdings" charset="2"/>
+              <a:buChar char=""/>
             </a:pPr>
             <a:r>
               <a:rPr b="0" lang="en-GB" sz="2000" spc="-1" strike="noStrike">
@@ -12514,15 +12540,16 @@
             </a:endParaRPr>
           </a:p>
           <a:p>
-            <a:pPr lvl="5" marL="1065167640" indent="23592960">
+            <a:pPr lvl="5" marL="2592000" indent="-216000">
               <a:spcBef>
                 <a:spcPts val="283"/>
               </a:spcBef>
               <a:buClr>
                 <a:srgbClr val="000000"/>
               </a:buClr>
-              <a:buFont typeface="Wingdings"/>
-              <a:buChar char="l"/>
+              <a:buSzPct val="45000"/>
+              <a:buFont typeface="Wingdings" charset="2"/>
+              <a:buChar char=""/>
             </a:pPr>
             <a:r>
               <a:rPr b="0" lang="en-GB" sz="2000" spc="-1" strike="noStrike">
@@ -12535,15 +12562,16 @@
             </a:endParaRPr>
           </a:p>
           <a:p>
-            <a:pPr lvl="6" marL="1065167640" indent="23592960">
+            <a:pPr lvl="6" marL="3024000" indent="-216000">
               <a:spcBef>
                 <a:spcPts val="283"/>
               </a:spcBef>
               <a:buClr>
                 <a:srgbClr val="000000"/>
               </a:buClr>
-              <a:buFont typeface="Wingdings"/>
-              <a:buChar char="l"/>
+              <a:buSzPct val="45000"/>
+              <a:buFont typeface="Wingdings" charset="2"/>
+              <a:buChar char=""/>
             </a:pPr>
             <a:r>
               <a:rPr b="0" lang="en-GB" sz="2000" spc="-1" strike="noStrike">
@@ -12610,7 +12638,7 @@
         <p:spPr>
           <a:xfrm>
             <a:off x="-2520" y="0"/>
-            <a:ext cx="5205960" cy="979920"/>
+            <a:ext cx="5205600" cy="979560"/>
           </a:xfrm>
           <a:custGeom>
             <a:avLst/>
@@ -12655,7 +12683,7 @@
         <p:spPr>
           <a:xfrm>
             <a:off x="-6120" y="0"/>
-            <a:ext cx="4441680" cy="1082160"/>
+            <a:ext cx="4441320" cy="1081800"/>
           </a:xfrm>
           <a:custGeom>
             <a:avLst/>
@@ -12705,7 +12733,7 @@
         <p:spPr>
           <a:xfrm>
             <a:off x="6375600" y="4745880"/>
-            <a:ext cx="2545200" cy="397440"/>
+            <a:ext cx="2544840" cy="397080"/>
           </a:xfrm>
           <a:custGeom>
             <a:avLst/>
@@ -12750,7 +12778,7 @@
         <p:spPr>
           <a:xfrm>
             <a:off x="7341120" y="4767480"/>
-            <a:ext cx="1817640" cy="392040"/>
+            <a:ext cx="1817280" cy="391680"/>
           </a:xfrm>
           <a:custGeom>
             <a:avLst/>
@@ -12797,7 +12825,7 @@
         <p:spPr>
           <a:xfrm>
             <a:off x="8340840" y="4204080"/>
-            <a:ext cx="814680" cy="955440"/>
+            <a:ext cx="814320" cy="955080"/>
           </a:xfrm>
           <a:custGeom>
             <a:avLst/>
@@ -12844,7 +12872,7 @@
         <p:spPr>
           <a:xfrm>
             <a:off x="1559160" y="-6120"/>
-            <a:ext cx="4113000" cy="941400"/>
+            <a:ext cx="4112640" cy="941040"/>
           </a:xfrm>
           <a:custGeom>
             <a:avLst/>
@@ -12943,18 +12971,19 @@
         </p:spPr>
         <p:txBody>
           <a:bodyPr lIns="0" rIns="0" tIns="0" bIns="0">
-            <a:normAutofit fontScale="1000"/>
-          </a:bodyPr>
-          <a:p>
-            <a:pPr marL="1065167640" indent="23592960">
+            <a:normAutofit/>
+          </a:bodyPr>
+          <a:p>
+            <a:pPr marL="432000" indent="-324000">
               <a:spcBef>
                 <a:spcPts val="1417"/>
               </a:spcBef>
               <a:buClr>
                 <a:srgbClr val="000000"/>
               </a:buClr>
-              <a:buFont typeface="Wingdings"/>
-              <a:buChar char="l"/>
+              <a:buSzPct val="45000"/>
+              <a:buFont typeface="Wingdings" charset="2"/>
+              <a:buChar char=""/>
             </a:pPr>
             <a:r>
               <a:rPr b="0" lang="en-GB" sz="3200" spc="-1" strike="noStrike">
@@ -12967,15 +12996,16 @@
             </a:endParaRPr>
           </a:p>
           <a:p>
-            <a:pPr lvl="1" marL="1772427960" indent="23592960">
+            <a:pPr lvl="1" marL="864000" indent="-324000">
               <a:spcBef>
                 <a:spcPts val="1134"/>
               </a:spcBef>
               <a:buClr>
                 <a:srgbClr val="000000"/>
               </a:buClr>
-              <a:buFont typeface="Wingdings"/>
-              <a:buChar char="l"/>
+              <a:buSzPct val="75000"/>
+              <a:buFont typeface="Symbol" charset="2"/>
+              <a:buChar char=""/>
             </a:pPr>
             <a:r>
               <a:rPr b="0" lang="en-GB" sz="2800" spc="-1" strike="noStrike">
@@ -12988,15 +13018,16 @@
             </a:endParaRPr>
           </a:p>
           <a:p>
-            <a:pPr lvl="2" marL="1065167640" indent="23592960">
+            <a:pPr lvl="2" marL="1296000" indent="-288000">
               <a:spcBef>
                 <a:spcPts val="850"/>
               </a:spcBef>
               <a:buClr>
                 <a:srgbClr val="000000"/>
               </a:buClr>
-              <a:buFont typeface="Wingdings"/>
-              <a:buChar char="l"/>
+              <a:buSzPct val="45000"/>
+              <a:buFont typeface="Wingdings" charset="2"/>
+              <a:buChar char=""/>
             </a:pPr>
             <a:r>
               <a:rPr b="0" lang="en-GB" sz="2400" spc="-1" strike="noStrike">
@@ -13009,15 +13040,16 @@
             </a:endParaRPr>
           </a:p>
           <a:p>
-            <a:pPr lvl="3" marL="1772427960" indent="23592960">
+            <a:pPr lvl="3" marL="1728000" indent="-216000">
               <a:spcBef>
                 <a:spcPts val="567"/>
               </a:spcBef>
               <a:buClr>
                 <a:srgbClr val="000000"/>
               </a:buClr>
-              <a:buFont typeface="Wingdings"/>
-              <a:buChar char="l"/>
+              <a:buSzPct val="75000"/>
+              <a:buFont typeface="Symbol" charset="2"/>
+              <a:buChar char=""/>
             </a:pPr>
             <a:r>
               <a:rPr b="0" lang="en-GB" sz="2000" spc="-1" strike="noStrike">
@@ -13030,15 +13062,16 @@
             </a:endParaRPr>
           </a:p>
           <a:p>
-            <a:pPr lvl="4" marL="1065167640" indent="23592960">
+            <a:pPr lvl="4" marL="2160000" indent="-216000">
               <a:spcBef>
                 <a:spcPts val="283"/>
               </a:spcBef>
               <a:buClr>
                 <a:srgbClr val="000000"/>
               </a:buClr>
-              <a:buFont typeface="Wingdings"/>
-              <a:buChar char="l"/>
+              <a:buSzPct val="45000"/>
+              <a:buFont typeface="Wingdings" charset="2"/>
+              <a:buChar char=""/>
             </a:pPr>
             <a:r>
               <a:rPr b="0" lang="en-GB" sz="2000" spc="-1" strike="noStrike">
@@ -13051,15 +13084,16 @@
             </a:endParaRPr>
           </a:p>
           <a:p>
-            <a:pPr lvl="5" marL="1065167640" indent="23592960">
+            <a:pPr lvl="5" marL="2592000" indent="-216000">
               <a:spcBef>
                 <a:spcPts val="283"/>
               </a:spcBef>
               <a:buClr>
                 <a:srgbClr val="000000"/>
               </a:buClr>
-              <a:buFont typeface="Wingdings"/>
-              <a:buChar char="l"/>
+              <a:buSzPct val="45000"/>
+              <a:buFont typeface="Wingdings" charset="2"/>
+              <a:buChar char=""/>
             </a:pPr>
             <a:r>
               <a:rPr b="0" lang="en-GB" sz="2000" spc="-1" strike="noStrike">
@@ -13072,15 +13106,16 @@
             </a:endParaRPr>
           </a:p>
           <a:p>
-            <a:pPr lvl="6" marL="1065167640" indent="23592960">
+            <a:pPr lvl="6" marL="3024000" indent="-216000">
               <a:spcBef>
                 <a:spcPts val="283"/>
               </a:spcBef>
               <a:buClr>
                 <a:srgbClr val="000000"/>
               </a:buClr>
-              <a:buFont typeface="Wingdings"/>
-              <a:buChar char="l"/>
+              <a:buSzPct val="45000"/>
+              <a:buFont typeface="Wingdings" charset="2"/>
+              <a:buChar char=""/>
             </a:pPr>
             <a:r>
               <a:rPr b="0" lang="en-GB" sz="2000" spc="-1" strike="noStrike">
@@ -13147,7 +13182,7 @@
         <p:spPr>
           <a:xfrm>
             <a:off x="-2520" y="0"/>
-            <a:ext cx="5205960" cy="979920"/>
+            <a:ext cx="5205600" cy="979560"/>
           </a:xfrm>
           <a:custGeom>
             <a:avLst/>
@@ -13192,7 +13227,7 @@
         <p:spPr>
           <a:xfrm>
             <a:off x="-6120" y="0"/>
-            <a:ext cx="4441680" cy="1082160"/>
+            <a:ext cx="4441320" cy="1081800"/>
           </a:xfrm>
           <a:custGeom>
             <a:avLst/>
@@ -13242,7 +13277,7 @@
         <p:spPr>
           <a:xfrm>
             <a:off x="6375600" y="4745880"/>
-            <a:ext cx="2545200" cy="397440"/>
+            <a:ext cx="2544840" cy="397080"/>
           </a:xfrm>
           <a:custGeom>
             <a:avLst/>
@@ -13287,7 +13322,7 @@
         <p:spPr>
           <a:xfrm>
             <a:off x="7341120" y="4767480"/>
-            <a:ext cx="1817640" cy="392040"/>
+            <a:ext cx="1817280" cy="391680"/>
           </a:xfrm>
           <a:custGeom>
             <a:avLst/>
@@ -13334,7 +13369,7 @@
         <p:spPr>
           <a:xfrm>
             <a:off x="8340840" y="4204080"/>
-            <a:ext cx="814680" cy="955440"/>
+            <a:ext cx="814320" cy="955080"/>
           </a:xfrm>
           <a:custGeom>
             <a:avLst/>
@@ -13381,7 +13416,7 @@
         <p:spPr>
           <a:xfrm>
             <a:off x="1559160" y="-6120"/>
-            <a:ext cx="4113000" cy="941400"/>
+            <a:ext cx="4112640" cy="941040"/>
           </a:xfrm>
           <a:custGeom>
             <a:avLst/>
@@ -13480,18 +13515,19 @@
         </p:spPr>
         <p:txBody>
           <a:bodyPr lIns="0" rIns="0" tIns="0" bIns="0">
-            <a:normAutofit fontScale="1000"/>
-          </a:bodyPr>
-          <a:p>
-            <a:pPr marL="1065167640" indent="23592960">
+            <a:normAutofit/>
+          </a:bodyPr>
+          <a:p>
+            <a:pPr marL="432000" indent="-324000">
               <a:spcBef>
                 <a:spcPts val="1417"/>
               </a:spcBef>
               <a:buClr>
                 <a:srgbClr val="000000"/>
               </a:buClr>
-              <a:buFont typeface="Wingdings"/>
-              <a:buChar char="l"/>
+              <a:buSzPct val="45000"/>
+              <a:buFont typeface="Wingdings" charset="2"/>
+              <a:buChar char=""/>
             </a:pPr>
             <a:r>
               <a:rPr b="0" lang="en-GB" sz="3200" spc="-1" strike="noStrike">
@@ -13504,15 +13540,16 @@
             </a:endParaRPr>
           </a:p>
           <a:p>
-            <a:pPr lvl="1" marL="1772427960" indent="23592960">
+            <a:pPr lvl="1" marL="864000" indent="-324000">
               <a:spcBef>
                 <a:spcPts val="1134"/>
               </a:spcBef>
               <a:buClr>
                 <a:srgbClr val="000000"/>
               </a:buClr>
-              <a:buFont typeface="Wingdings"/>
-              <a:buChar char="l"/>
+              <a:buSzPct val="75000"/>
+              <a:buFont typeface="Symbol" charset="2"/>
+              <a:buChar char=""/>
             </a:pPr>
             <a:r>
               <a:rPr b="0" lang="en-GB" sz="2800" spc="-1" strike="noStrike">
@@ -13525,15 +13562,16 @@
             </a:endParaRPr>
           </a:p>
           <a:p>
-            <a:pPr lvl="2" marL="1065167640" indent="23592960">
+            <a:pPr lvl="2" marL="1296000" indent="-288000">
               <a:spcBef>
                 <a:spcPts val="850"/>
               </a:spcBef>
               <a:buClr>
                 <a:srgbClr val="000000"/>
               </a:buClr>
-              <a:buFont typeface="Wingdings"/>
-              <a:buChar char="l"/>
+              <a:buSzPct val="45000"/>
+              <a:buFont typeface="Wingdings" charset="2"/>
+              <a:buChar char=""/>
             </a:pPr>
             <a:r>
               <a:rPr b="0" lang="en-GB" sz="2400" spc="-1" strike="noStrike">
@@ -13546,15 +13584,16 @@
             </a:endParaRPr>
           </a:p>
           <a:p>
-            <a:pPr lvl="3" marL="1772427960" indent="23592960">
+            <a:pPr lvl="3" marL="1728000" indent="-216000">
               <a:spcBef>
                 <a:spcPts val="567"/>
               </a:spcBef>
               <a:buClr>
                 <a:srgbClr val="000000"/>
               </a:buClr>
-              <a:buFont typeface="Wingdings"/>
-              <a:buChar char="l"/>
+              <a:buSzPct val="75000"/>
+              <a:buFont typeface="Symbol" charset="2"/>
+              <a:buChar char=""/>
             </a:pPr>
             <a:r>
               <a:rPr b="0" lang="en-GB" sz="2000" spc="-1" strike="noStrike">
@@ -13567,15 +13606,16 @@
             </a:endParaRPr>
           </a:p>
           <a:p>
-            <a:pPr lvl="4" marL="1065167640" indent="23592960">
+            <a:pPr lvl="4" marL="2160000" indent="-216000">
               <a:spcBef>
                 <a:spcPts val="283"/>
               </a:spcBef>
               <a:buClr>
                 <a:srgbClr val="000000"/>
               </a:buClr>
-              <a:buFont typeface="Wingdings"/>
-              <a:buChar char="l"/>
+              <a:buSzPct val="45000"/>
+              <a:buFont typeface="Wingdings" charset="2"/>
+              <a:buChar char=""/>
             </a:pPr>
             <a:r>
               <a:rPr b="0" lang="en-GB" sz="2000" spc="-1" strike="noStrike">
@@ -13588,15 +13628,16 @@
             </a:endParaRPr>
           </a:p>
           <a:p>
-            <a:pPr lvl="5" marL="1065167640" indent="23592960">
+            <a:pPr lvl="5" marL="2592000" indent="-216000">
               <a:spcBef>
                 <a:spcPts val="283"/>
               </a:spcBef>
               <a:buClr>
                 <a:srgbClr val="000000"/>
               </a:buClr>
-              <a:buFont typeface="Wingdings"/>
-              <a:buChar char="l"/>
+              <a:buSzPct val="45000"/>
+              <a:buFont typeface="Wingdings" charset="2"/>
+              <a:buChar char=""/>
             </a:pPr>
             <a:r>
               <a:rPr b="0" lang="en-GB" sz="2000" spc="-1" strike="noStrike">
@@ -13609,15 +13650,16 @@
             </a:endParaRPr>
           </a:p>
           <a:p>
-            <a:pPr lvl="6" marL="1065167640" indent="23592960">
+            <a:pPr lvl="6" marL="3024000" indent="-216000">
               <a:spcBef>
                 <a:spcPts val="283"/>
               </a:spcBef>
               <a:buClr>
                 <a:srgbClr val="000000"/>
               </a:buClr>
-              <a:buFont typeface="Wingdings"/>
-              <a:buChar char="l"/>
+              <a:buSzPct val="45000"/>
+              <a:buFont typeface="Wingdings" charset="2"/>
+              <a:buChar char=""/>
             </a:pPr>
             <a:r>
               <a:rPr b="0" lang="en-GB" sz="2000" spc="-1" strike="noStrike">
@@ -13684,9 +13726,9 @@
         <p:grpSpPr>
           <a:xfrm>
             <a:off x="-6120" y="0"/>
-            <a:ext cx="9164520" cy="5159520"/>
+            <a:ext cx="9164160" cy="5159160"/>
             <a:chOff x="-6120" y="0"/>
-            <a:chExt cx="9164520" cy="5159520"/>
+            <a:chExt cx="9164160" cy="5159160"/>
           </a:xfrm>
         </p:grpSpPr>
         <p:sp>
@@ -13698,7 +13740,7 @@
           <p:spPr>
             <a:xfrm>
               <a:off x="0" y="0"/>
-              <a:ext cx="8549280" cy="1329480"/>
+              <a:ext cx="8548920" cy="1329120"/>
             </a:xfrm>
             <a:custGeom>
               <a:avLst/>
@@ -13743,7 +13785,7 @@
           <p:spPr>
             <a:xfrm>
               <a:off x="2563560" y="0"/>
-              <a:ext cx="6576840" cy="1269000"/>
+              <a:ext cx="6576480" cy="1268640"/>
             </a:xfrm>
             <a:custGeom>
               <a:avLst/>
@@ -13793,7 +13835,7 @@
           <p:spPr>
             <a:xfrm>
               <a:off x="-6120" y="0"/>
-              <a:ext cx="7294680" cy="1468080"/>
+              <a:ext cx="7294320" cy="1467720"/>
             </a:xfrm>
             <a:custGeom>
               <a:avLst/>
@@ -13843,7 +13885,7 @@
           <p:spPr>
             <a:xfrm>
               <a:off x="3596040" y="4667040"/>
-              <a:ext cx="5087160" cy="473040"/>
+              <a:ext cx="5086800" cy="472680"/>
             </a:xfrm>
             <a:custGeom>
               <a:avLst/>
@@ -13888,7 +13930,7 @@
           <p:spPr>
             <a:xfrm>
               <a:off x="5524920" y="4692600"/>
-              <a:ext cx="3633480" cy="466920"/>
+              <a:ext cx="3633120" cy="466560"/>
             </a:xfrm>
             <a:custGeom>
               <a:avLst/>
@@ -13935,7 +13977,7 @@
           <p:spPr>
             <a:xfrm>
               <a:off x="7521480" y="4023000"/>
-              <a:ext cx="1631160" cy="1136520"/>
+              <a:ext cx="1630800" cy="1136160"/>
             </a:xfrm>
             <a:custGeom>
               <a:avLst/>
@@ -14032,18 +14074,19 @@
         </p:spPr>
         <p:txBody>
           <a:bodyPr lIns="0" rIns="0" tIns="0" bIns="0">
-            <a:normAutofit fontScale="1000"/>
-          </a:bodyPr>
-          <a:p>
-            <a:pPr marL="1065167640" indent="23592960">
+            <a:normAutofit/>
+          </a:bodyPr>
+          <a:p>
+            <a:pPr marL="432000" indent="-324000">
               <a:spcBef>
                 <a:spcPts val="1417"/>
               </a:spcBef>
               <a:buClr>
                 <a:srgbClr val="000000"/>
               </a:buClr>
-              <a:buFont typeface="Wingdings"/>
-              <a:buChar char="l"/>
+              <a:buSzPct val="45000"/>
+              <a:buFont typeface="Wingdings" charset="2"/>
+              <a:buChar char=""/>
             </a:pPr>
             <a:r>
               <a:rPr b="0" lang="en-GB" sz="3200" spc="-1" strike="noStrike">
@@ -14056,15 +14099,16 @@
             </a:endParaRPr>
           </a:p>
           <a:p>
-            <a:pPr lvl="1" marL="1772427960" indent="23592960">
+            <a:pPr lvl="1" marL="864000" indent="-324000">
               <a:spcBef>
                 <a:spcPts val="1134"/>
               </a:spcBef>
               <a:buClr>
                 <a:srgbClr val="000000"/>
               </a:buClr>
-              <a:buFont typeface="Wingdings"/>
-              <a:buChar char="l"/>
+              <a:buSzPct val="75000"/>
+              <a:buFont typeface="Symbol" charset="2"/>
+              <a:buChar char=""/>
             </a:pPr>
             <a:r>
               <a:rPr b="0" lang="en-GB" sz="2800" spc="-1" strike="noStrike">
@@ -14077,15 +14121,16 @@
             </a:endParaRPr>
           </a:p>
           <a:p>
-            <a:pPr lvl="2" marL="1065167640" indent="23592960">
+            <a:pPr lvl="2" marL="1296000" indent="-288000">
               <a:spcBef>
                 <a:spcPts val="850"/>
               </a:spcBef>
               <a:buClr>
                 <a:srgbClr val="000000"/>
               </a:buClr>
-              <a:buFont typeface="Wingdings"/>
-              <a:buChar char="l"/>
+              <a:buSzPct val="45000"/>
+              <a:buFont typeface="Wingdings" charset="2"/>
+              <a:buChar char=""/>
             </a:pPr>
             <a:r>
               <a:rPr b="0" lang="en-GB" sz="2400" spc="-1" strike="noStrike">
@@ -14098,15 +14143,16 @@
             </a:endParaRPr>
           </a:p>
           <a:p>
-            <a:pPr lvl="3" marL="1772427960" indent="23592960">
+            <a:pPr lvl="3" marL="1728000" indent="-216000">
               <a:spcBef>
                 <a:spcPts val="567"/>
               </a:spcBef>
               <a:buClr>
                 <a:srgbClr val="000000"/>
               </a:buClr>
-              <a:buFont typeface="Wingdings"/>
-              <a:buChar char="l"/>
+              <a:buSzPct val="75000"/>
+              <a:buFont typeface="Symbol" charset="2"/>
+              <a:buChar char=""/>
             </a:pPr>
             <a:r>
               <a:rPr b="0" lang="en-GB" sz="2000" spc="-1" strike="noStrike">
@@ -14119,15 +14165,16 @@
             </a:endParaRPr>
           </a:p>
           <a:p>
-            <a:pPr lvl="4" marL="1065167640" indent="23592960">
+            <a:pPr lvl="4" marL="2160000" indent="-216000">
               <a:spcBef>
                 <a:spcPts val="283"/>
               </a:spcBef>
               <a:buClr>
                 <a:srgbClr val="000000"/>
               </a:buClr>
-              <a:buFont typeface="Wingdings"/>
-              <a:buChar char="l"/>
+              <a:buSzPct val="45000"/>
+              <a:buFont typeface="Wingdings" charset="2"/>
+              <a:buChar char=""/>
             </a:pPr>
             <a:r>
               <a:rPr b="0" lang="en-GB" sz="2000" spc="-1" strike="noStrike">
@@ -14140,15 +14187,16 @@
             </a:endParaRPr>
           </a:p>
           <a:p>
-            <a:pPr lvl="5" marL="1065167640" indent="23592960">
+            <a:pPr lvl="5" marL="2592000" indent="-216000">
               <a:spcBef>
                 <a:spcPts val="283"/>
               </a:spcBef>
               <a:buClr>
                 <a:srgbClr val="000000"/>
               </a:buClr>
-              <a:buFont typeface="Wingdings"/>
-              <a:buChar char="l"/>
+              <a:buSzPct val="45000"/>
+              <a:buFont typeface="Wingdings" charset="2"/>
+              <a:buChar char=""/>
             </a:pPr>
             <a:r>
               <a:rPr b="0" lang="en-GB" sz="2000" spc="-1" strike="noStrike">
@@ -14161,15 +14209,16 @@
             </a:endParaRPr>
           </a:p>
           <a:p>
-            <a:pPr lvl="6" marL="1065167640" indent="23592960">
+            <a:pPr lvl="6" marL="3024000" indent="-216000">
               <a:spcBef>
                 <a:spcPts val="283"/>
               </a:spcBef>
               <a:buClr>
                 <a:srgbClr val="000000"/>
               </a:buClr>
-              <a:buFont typeface="Wingdings"/>
-              <a:buChar char="l"/>
+              <a:buSzPct val="45000"/>
+              <a:buFont typeface="Wingdings" charset="2"/>
+              <a:buChar char=""/>
             </a:pPr>
             <a:r>
               <a:rPr b="0" lang="en-GB" sz="2000" spc="-1" strike="noStrike">
@@ -14236,9 +14285,9 @@
         <p:grpSpPr>
           <a:xfrm>
             <a:off x="-6120" y="0"/>
-            <a:ext cx="9164520" cy="5159520"/>
+            <a:ext cx="9164160" cy="5159160"/>
             <a:chOff x="-6120" y="0"/>
-            <a:chExt cx="9164520" cy="5159520"/>
+            <a:chExt cx="9164160" cy="5159160"/>
           </a:xfrm>
         </p:grpSpPr>
         <p:sp>
@@ -14250,7 +14299,7 @@
           <p:spPr>
             <a:xfrm>
               <a:off x="0" y="0"/>
-              <a:ext cx="8549280" cy="1329480"/>
+              <a:ext cx="8548920" cy="1329120"/>
             </a:xfrm>
             <a:custGeom>
               <a:avLst/>
@@ -14295,7 +14344,7 @@
           <p:spPr>
             <a:xfrm>
               <a:off x="2563560" y="0"/>
-              <a:ext cx="6576840" cy="1269000"/>
+              <a:ext cx="6576480" cy="1268640"/>
             </a:xfrm>
             <a:custGeom>
               <a:avLst/>
@@ -14345,7 +14394,7 @@
           <p:spPr>
             <a:xfrm>
               <a:off x="-6120" y="0"/>
-              <a:ext cx="7294680" cy="1468080"/>
+              <a:ext cx="7294320" cy="1467720"/>
             </a:xfrm>
             <a:custGeom>
               <a:avLst/>
@@ -14395,7 +14444,7 @@
           <p:spPr>
             <a:xfrm>
               <a:off x="3596040" y="4667040"/>
-              <a:ext cx="5087160" cy="473040"/>
+              <a:ext cx="5086800" cy="472680"/>
             </a:xfrm>
             <a:custGeom>
               <a:avLst/>
@@ -14440,7 +14489,7 @@
           <p:spPr>
             <a:xfrm>
               <a:off x="5524920" y="4692600"/>
-              <a:ext cx="3633480" cy="466920"/>
+              <a:ext cx="3633120" cy="466560"/>
             </a:xfrm>
             <a:custGeom>
               <a:avLst/>
@@ -14487,7 +14536,7 @@
           <p:spPr>
             <a:xfrm>
               <a:off x="7521480" y="4023000"/>
-              <a:ext cx="1631160" cy="1136520"/>
+              <a:ext cx="1630800" cy="1136160"/>
             </a:xfrm>
             <a:custGeom>
               <a:avLst/>
@@ -14584,18 +14633,19 @@
         </p:spPr>
         <p:txBody>
           <a:bodyPr lIns="0" rIns="0" tIns="0" bIns="0">
-            <a:normAutofit fontScale="1000"/>
-          </a:bodyPr>
-          <a:p>
-            <a:pPr marL="1065167640" indent="23592960">
+            <a:normAutofit/>
+          </a:bodyPr>
+          <a:p>
+            <a:pPr marL="432000" indent="-324000">
               <a:spcBef>
                 <a:spcPts val="1417"/>
               </a:spcBef>
               <a:buClr>
                 <a:srgbClr val="000000"/>
               </a:buClr>
-              <a:buFont typeface="Wingdings"/>
-              <a:buChar char="l"/>
+              <a:buSzPct val="45000"/>
+              <a:buFont typeface="Wingdings" charset="2"/>
+              <a:buChar char=""/>
             </a:pPr>
             <a:r>
               <a:rPr b="0" lang="en-GB" sz="3200" spc="-1" strike="noStrike">
@@ -14608,15 +14658,16 @@
             </a:endParaRPr>
           </a:p>
           <a:p>
-            <a:pPr lvl="1" marL="1772427960" indent="23592960">
+            <a:pPr lvl="1" marL="864000" indent="-324000">
               <a:spcBef>
                 <a:spcPts val="1134"/>
               </a:spcBef>
               <a:buClr>
                 <a:srgbClr val="000000"/>
               </a:buClr>
-              <a:buFont typeface="Wingdings"/>
-              <a:buChar char="l"/>
+              <a:buSzPct val="75000"/>
+              <a:buFont typeface="Symbol" charset="2"/>
+              <a:buChar char=""/>
             </a:pPr>
             <a:r>
               <a:rPr b="0" lang="en-GB" sz="2800" spc="-1" strike="noStrike">
@@ -14629,15 +14680,16 @@
             </a:endParaRPr>
           </a:p>
           <a:p>
-            <a:pPr lvl="2" marL="1065167640" indent="23592960">
+            <a:pPr lvl="2" marL="1296000" indent="-288000">
               <a:spcBef>
                 <a:spcPts val="850"/>
               </a:spcBef>
               <a:buClr>
                 <a:srgbClr val="000000"/>
               </a:buClr>
-              <a:buFont typeface="Wingdings"/>
-              <a:buChar char="l"/>
+              <a:buSzPct val="45000"/>
+              <a:buFont typeface="Wingdings" charset="2"/>
+              <a:buChar char=""/>
             </a:pPr>
             <a:r>
               <a:rPr b="0" lang="en-GB" sz="2400" spc="-1" strike="noStrike">
@@ -14650,15 +14702,16 @@
             </a:endParaRPr>
           </a:p>
           <a:p>
-            <a:pPr lvl="3" marL="1772427960" indent="23592960">
+            <a:pPr lvl="3" marL="1728000" indent="-216000">
               <a:spcBef>
                 <a:spcPts val="567"/>
               </a:spcBef>
               <a:buClr>
                 <a:srgbClr val="000000"/>
               </a:buClr>
-              <a:buFont typeface="Wingdings"/>
-              <a:buChar char="l"/>
+              <a:buSzPct val="75000"/>
+              <a:buFont typeface="Symbol" charset="2"/>
+              <a:buChar char=""/>
             </a:pPr>
             <a:r>
               <a:rPr b="0" lang="en-GB" sz="2000" spc="-1" strike="noStrike">
@@ -14671,15 +14724,16 @@
             </a:endParaRPr>
           </a:p>
           <a:p>
-            <a:pPr lvl="4" marL="1065167640" indent="23592960">
+            <a:pPr lvl="4" marL="2160000" indent="-216000">
               <a:spcBef>
                 <a:spcPts val="283"/>
               </a:spcBef>
               <a:buClr>
                 <a:srgbClr val="000000"/>
               </a:buClr>
-              <a:buFont typeface="Wingdings"/>
-              <a:buChar char="l"/>
+              <a:buSzPct val="45000"/>
+              <a:buFont typeface="Wingdings" charset="2"/>
+              <a:buChar char=""/>
             </a:pPr>
             <a:r>
               <a:rPr b="0" lang="en-GB" sz="2000" spc="-1" strike="noStrike">
@@ -14692,15 +14746,16 @@
             </a:endParaRPr>
           </a:p>
           <a:p>
-            <a:pPr lvl="5" marL="1065167640" indent="23592960">
+            <a:pPr lvl="5" marL="2592000" indent="-216000">
               <a:spcBef>
                 <a:spcPts val="283"/>
               </a:spcBef>
               <a:buClr>
                 <a:srgbClr val="000000"/>
               </a:buClr>
-              <a:buFont typeface="Wingdings"/>
-              <a:buChar char="l"/>
+              <a:buSzPct val="45000"/>
+              <a:buFont typeface="Wingdings" charset="2"/>
+              <a:buChar char=""/>
             </a:pPr>
             <a:r>
               <a:rPr b="0" lang="en-GB" sz="2000" spc="-1" strike="noStrike">
@@ -14713,15 +14768,16 @@
             </a:endParaRPr>
           </a:p>
           <a:p>
-            <a:pPr lvl="6" marL="1065167640" indent="23592960">
+            <a:pPr lvl="6" marL="3024000" indent="-216000">
               <a:spcBef>
                 <a:spcPts val="283"/>
               </a:spcBef>
               <a:buClr>
                 <a:srgbClr val="000000"/>
               </a:buClr>
-              <a:buFont typeface="Wingdings"/>
-              <a:buChar char="l"/>
+              <a:buSzPct val="45000"/>
+              <a:buFont typeface="Wingdings" charset="2"/>
+              <a:buChar char=""/>
             </a:pPr>
             <a:r>
               <a:rPr b="0" lang="en-GB" sz="2000" spc="-1" strike="noStrike">
@@ -14788,7 +14844,7 @@
         <p:spPr>
           <a:xfrm>
             <a:off x="-2520" y="0"/>
-            <a:ext cx="5205960" cy="979920"/>
+            <a:ext cx="5205600" cy="979560"/>
           </a:xfrm>
           <a:custGeom>
             <a:avLst/>
@@ -14833,7 +14889,7 @@
         <p:spPr>
           <a:xfrm>
             <a:off x="-6120" y="0"/>
-            <a:ext cx="4441680" cy="1082160"/>
+            <a:ext cx="4441320" cy="1081800"/>
           </a:xfrm>
           <a:custGeom>
             <a:avLst/>
@@ -14883,7 +14939,7 @@
         <p:spPr>
           <a:xfrm>
             <a:off x="6375600" y="4745880"/>
-            <a:ext cx="2545200" cy="397440"/>
+            <a:ext cx="2544840" cy="397080"/>
           </a:xfrm>
           <a:custGeom>
             <a:avLst/>
@@ -14928,7 +14984,7 @@
         <p:spPr>
           <a:xfrm>
             <a:off x="7341120" y="4767480"/>
-            <a:ext cx="1817640" cy="392040"/>
+            <a:ext cx="1817280" cy="391680"/>
           </a:xfrm>
           <a:custGeom>
             <a:avLst/>
@@ -14975,7 +15031,7 @@
         <p:spPr>
           <a:xfrm>
             <a:off x="8340840" y="4204080"/>
-            <a:ext cx="814680" cy="955440"/>
+            <a:ext cx="814320" cy="955080"/>
           </a:xfrm>
           <a:custGeom>
             <a:avLst/>
@@ -15022,7 +15078,7 @@
         <p:spPr>
           <a:xfrm>
             <a:off x="1559160" y="-6120"/>
-            <a:ext cx="4113000" cy="941400"/>
+            <a:ext cx="4112640" cy="941040"/>
           </a:xfrm>
           <a:custGeom>
             <a:avLst/>
@@ -15121,18 +15177,19 @@
         </p:spPr>
         <p:txBody>
           <a:bodyPr lIns="0" rIns="0" tIns="0" bIns="0">
-            <a:normAutofit fontScale="1000"/>
-          </a:bodyPr>
-          <a:p>
-            <a:pPr marL="1065167640" indent="23592960">
+            <a:normAutofit/>
+          </a:bodyPr>
+          <a:p>
+            <a:pPr marL="432000" indent="-324000">
               <a:spcBef>
                 <a:spcPts val="1417"/>
               </a:spcBef>
               <a:buClr>
                 <a:srgbClr val="000000"/>
               </a:buClr>
-              <a:buFont typeface="Wingdings"/>
-              <a:buChar char="l"/>
+              <a:buSzPct val="45000"/>
+              <a:buFont typeface="Wingdings" charset="2"/>
+              <a:buChar char=""/>
             </a:pPr>
             <a:r>
               <a:rPr b="0" lang="en-GB" sz="3200" spc="-1" strike="noStrike">
@@ -15145,15 +15202,16 @@
             </a:endParaRPr>
           </a:p>
           <a:p>
-            <a:pPr lvl="1" marL="1772427960" indent="23592960">
+            <a:pPr lvl="1" marL="864000" indent="-324000">
               <a:spcBef>
                 <a:spcPts val="1134"/>
               </a:spcBef>
               <a:buClr>
                 <a:srgbClr val="000000"/>
               </a:buClr>
-              <a:buFont typeface="Wingdings"/>
-              <a:buChar char="l"/>
+              <a:buSzPct val="75000"/>
+              <a:buFont typeface="Symbol" charset="2"/>
+              <a:buChar char=""/>
             </a:pPr>
             <a:r>
               <a:rPr b="0" lang="en-GB" sz="2800" spc="-1" strike="noStrike">
@@ -15166,15 +15224,16 @@
             </a:endParaRPr>
           </a:p>
           <a:p>
-            <a:pPr lvl="2" marL="1065167640" indent="23592960">
+            <a:pPr lvl="2" marL="1296000" indent="-288000">
               <a:spcBef>
                 <a:spcPts val="850"/>
               </a:spcBef>
               <a:buClr>
                 <a:srgbClr val="000000"/>
               </a:buClr>
-              <a:buFont typeface="Wingdings"/>
-              <a:buChar char="l"/>
+              <a:buSzPct val="45000"/>
+              <a:buFont typeface="Wingdings" charset="2"/>
+              <a:buChar char=""/>
             </a:pPr>
             <a:r>
               <a:rPr b="0" lang="en-GB" sz="2400" spc="-1" strike="noStrike">
@@ -15187,15 +15246,16 @@
             </a:endParaRPr>
           </a:p>
           <a:p>
-            <a:pPr lvl="3" marL="1772427960" indent="23592960">
+            <a:pPr lvl="3" marL="1728000" indent="-216000">
               <a:spcBef>
                 <a:spcPts val="567"/>
               </a:spcBef>
               <a:buClr>
                 <a:srgbClr val="000000"/>
               </a:buClr>
-              <a:buFont typeface="Wingdings"/>
-              <a:buChar char="l"/>
+              <a:buSzPct val="75000"/>
+              <a:buFont typeface="Symbol" charset="2"/>
+              <a:buChar char=""/>
             </a:pPr>
             <a:r>
               <a:rPr b="0" lang="en-GB" sz="2000" spc="-1" strike="noStrike">
@@ -15208,15 +15268,16 @@
             </a:endParaRPr>
           </a:p>
           <a:p>
-            <a:pPr lvl="4" marL="1065167640" indent="23592960">
+            <a:pPr lvl="4" marL="2160000" indent="-216000">
               <a:spcBef>
                 <a:spcPts val="283"/>
               </a:spcBef>
               <a:buClr>
                 <a:srgbClr val="000000"/>
               </a:buClr>
-              <a:buFont typeface="Wingdings"/>
-              <a:buChar char="l"/>
+              <a:buSzPct val="45000"/>
+              <a:buFont typeface="Wingdings" charset="2"/>
+              <a:buChar char=""/>
             </a:pPr>
             <a:r>
               <a:rPr b="0" lang="en-GB" sz="2000" spc="-1" strike="noStrike">
@@ -15229,15 +15290,16 @@
             </a:endParaRPr>
           </a:p>
           <a:p>
-            <a:pPr lvl="5" marL="1065167640" indent="23592960">
+            <a:pPr lvl="5" marL="2592000" indent="-216000">
               <a:spcBef>
                 <a:spcPts val="283"/>
               </a:spcBef>
               <a:buClr>
                 <a:srgbClr val="000000"/>
               </a:buClr>
-              <a:buFont typeface="Wingdings"/>
-              <a:buChar char="l"/>
+              <a:buSzPct val="45000"/>
+              <a:buFont typeface="Wingdings" charset="2"/>
+              <a:buChar char=""/>
             </a:pPr>
             <a:r>
               <a:rPr b="0" lang="en-GB" sz="2000" spc="-1" strike="noStrike">
@@ -15250,15 +15312,16 @@
             </a:endParaRPr>
           </a:p>
           <a:p>
-            <a:pPr lvl="6" marL="1065167640" indent="23592960">
+            <a:pPr lvl="6" marL="3024000" indent="-216000">
               <a:spcBef>
                 <a:spcPts val="283"/>
               </a:spcBef>
               <a:buClr>
                 <a:srgbClr val="000000"/>
               </a:buClr>
-              <a:buFont typeface="Wingdings"/>
-              <a:buChar char="l"/>
+              <a:buSzPct val="45000"/>
+              <a:buFont typeface="Wingdings" charset="2"/>
+              <a:buChar char=""/>
             </a:pPr>
             <a:r>
               <a:rPr b="0" lang="en-GB" sz="2000" spc="-1" strike="noStrike">
@@ -15318,7 +15381,7 @@
         <p:spPr>
           <a:xfrm>
             <a:off x="1719000" y="1991880"/>
-            <a:ext cx="5702400" cy="1156320"/>
+            <a:ext cx="5702040" cy="1155960"/>
           </a:xfrm>
           <a:prstGeom prst="rect">
             <a:avLst/>
@@ -15369,7 +15432,7 @@
         <p:spPr>
           <a:xfrm>
             <a:off x="0" y="2815560"/>
-            <a:ext cx="9140760" cy="781200"/>
+            <a:ext cx="9140400" cy="780840"/>
           </a:xfrm>
           <a:prstGeom prst="rect">
             <a:avLst/>
@@ -15450,7 +15513,7 @@
         <p:spPr>
           <a:xfrm>
             <a:off x="27000" y="4749840"/>
-            <a:ext cx="545040" cy="389880"/>
+            <a:ext cx="544680" cy="389520"/>
           </a:xfrm>
           <a:prstGeom prst="rect">
             <a:avLst/>
@@ -15476,7 +15539,7 @@
                 <a:spcPct val="100000"/>
               </a:lnSpc>
             </a:pPr>
-            <a:fld id="{27CAFFF1-8B13-4ACB-B395-2922F7C8E67C}" type="slidenum">
+            <a:fld id="{723BA645-5157-4778-B779-FC6B5086D3D5}" type="slidenum">
               <a:rPr b="0" lang="en" sz="1200" spc="-1" strike="noStrike">
                 <a:solidFill>
                   <a:srgbClr val="00ae9d"/>
@@ -15505,7 +15568,7 @@
         <p:spPr>
           <a:xfrm>
             <a:off x="3600000" y="1008000"/>
-            <a:ext cx="2760840" cy="3956760"/>
+            <a:ext cx="2760480" cy="3956400"/>
           </a:xfrm>
           <a:prstGeom prst="rect">
             <a:avLst/>
@@ -15554,7 +15617,7 @@
         <p:spPr>
           <a:xfrm>
             <a:off x="27000" y="4749840"/>
-            <a:ext cx="545040" cy="389880"/>
+            <a:ext cx="544680" cy="389520"/>
           </a:xfrm>
           <a:prstGeom prst="rect">
             <a:avLst/>
@@ -15580,7 +15643,7 @@
                 <a:spcPct val="100000"/>
               </a:lnSpc>
             </a:pPr>
-            <a:fld id="{1A582EF2-22C0-4104-A46E-F3B0CEBC811C}" type="slidenum">
+            <a:fld id="{FDCB10BC-D120-46A6-A740-43D9B50D2588}" type="slidenum">
               <a:rPr b="0" lang="en" sz="1200" spc="-1" strike="noStrike">
                 <a:solidFill>
                   <a:srgbClr val="00ae9d"/>
@@ -15609,7 +15672,7 @@
         <p:spPr>
           <a:xfrm>
             <a:off x="1224000" y="1080000"/>
-            <a:ext cx="6764760" cy="3712320"/>
+            <a:ext cx="6764400" cy="3711960"/>
           </a:xfrm>
           <a:prstGeom prst="rect">
             <a:avLst/>
@@ -15658,7 +15721,7 @@
         <p:spPr>
           <a:xfrm>
             <a:off x="27000" y="4749840"/>
-            <a:ext cx="545040" cy="389880"/>
+            <a:ext cx="544680" cy="389520"/>
           </a:xfrm>
           <a:prstGeom prst="rect">
             <a:avLst/>
@@ -15684,7 +15747,7 @@
                 <a:spcPct val="100000"/>
               </a:lnSpc>
             </a:pPr>
-            <a:fld id="{081979F9-407F-4065-AF92-9C14F7BEE7A2}" type="slidenum">
+            <a:fld id="{5D67CE84-957F-4403-AEE9-83A247F54526}" type="slidenum">
               <a:rPr b="0" lang="en" sz="1200" spc="-1" strike="noStrike">
                 <a:solidFill>
                   <a:srgbClr val="00ae9d"/>
@@ -15713,7 +15776,7 @@
         <p:spPr>
           <a:xfrm>
             <a:off x="859680" y="1080000"/>
-            <a:ext cx="7406640" cy="3598560"/>
+            <a:ext cx="7406280" cy="3598200"/>
           </a:xfrm>
           <a:prstGeom prst="rect">
             <a:avLst/>
@@ -15762,7 +15825,7 @@
         <p:spPr>
           <a:xfrm>
             <a:off x="27000" y="4749840"/>
-            <a:ext cx="545040" cy="389880"/>
+            <a:ext cx="544680" cy="389520"/>
           </a:xfrm>
           <a:prstGeom prst="rect">
             <a:avLst/>
@@ -15788,7 +15851,7 @@
                 <a:spcPct val="100000"/>
               </a:lnSpc>
             </a:pPr>
-            <a:fld id="{0F05D965-721D-483E-BCFA-37A62450FE4A}" type="slidenum">
+            <a:fld id="{6FE92AC7-F4B0-4662-AFC0-86A2D1ACEA1D}" type="slidenum">
               <a:rPr b="0" lang="en" sz="1200" spc="-1" strike="noStrike">
                 <a:solidFill>
                   <a:srgbClr val="00ae9d"/>
@@ -15817,7 +15880,7 @@
         <p:spPr>
           <a:xfrm>
             <a:off x="1872000" y="1129680"/>
-            <a:ext cx="6111720" cy="3691080"/>
+            <a:ext cx="6111360" cy="3690720"/>
           </a:xfrm>
           <a:prstGeom prst="rect">
             <a:avLst/>
@@ -15866,7 +15929,7 @@
         <p:spPr>
           <a:xfrm>
             <a:off x="886680" y="398520"/>
-            <a:ext cx="7367040" cy="853920"/>
+            <a:ext cx="7366680" cy="853560"/>
           </a:xfrm>
           <a:prstGeom prst="rect">
             <a:avLst/>
@@ -15917,7 +15980,7 @@
         <p:spPr>
           <a:xfrm>
             <a:off x="904680" y="1467000"/>
-            <a:ext cx="2404080" cy="1301400"/>
+            <a:ext cx="2403720" cy="1301040"/>
           </a:xfrm>
           <a:prstGeom prst="rect">
             <a:avLst/>
@@ -16054,7 +16117,7 @@
         <p:spPr>
           <a:xfrm>
             <a:off x="3404160" y="1467000"/>
-            <a:ext cx="2568600" cy="1301400"/>
+            <a:ext cx="2568240" cy="1301040"/>
           </a:xfrm>
           <a:prstGeom prst="rect">
             <a:avLst/>
@@ -16182,7 +16245,7 @@
         <p:spPr>
           <a:xfrm>
             <a:off x="5939640" y="1467000"/>
-            <a:ext cx="2409120" cy="1301400"/>
+            <a:ext cx="2408760" cy="1301040"/>
           </a:xfrm>
           <a:prstGeom prst="rect">
             <a:avLst/>
@@ -16279,7 +16342,7 @@
         <p:spPr>
           <a:xfrm>
             <a:off x="904680" y="3048120"/>
-            <a:ext cx="2404080" cy="1301400"/>
+            <a:ext cx="2403720" cy="1301040"/>
           </a:xfrm>
           <a:prstGeom prst="rect">
             <a:avLst/>
@@ -16406,7 +16469,7 @@
         <p:spPr>
           <a:xfrm>
             <a:off x="3404160" y="3048120"/>
-            <a:ext cx="2340000" cy="1301400"/>
+            <a:ext cx="2339640" cy="1301040"/>
           </a:xfrm>
           <a:prstGeom prst="rect">
             <a:avLst/>
@@ -16534,7 +16597,7 @@
         <p:spPr>
           <a:xfrm>
             <a:off x="27000" y="4749840"/>
-            <a:ext cx="545040" cy="389880"/>
+            <a:ext cx="544680" cy="389520"/>
           </a:xfrm>
           <a:prstGeom prst="rect">
             <a:avLst/>
@@ -16560,7 +16623,7 @@
                 <a:spcPct val="100000"/>
               </a:lnSpc>
             </a:pPr>
-            <a:fld id="{9AB8AD79-3C95-41C9-AEE7-31C5858C921D}" type="slidenum">
+            <a:fld id="{A3228A66-0EDF-43C7-8564-FAD214EEC9C9}" type="slidenum">
               <a:rPr b="0" lang="en" sz="1200" spc="-1" strike="noStrike">
                 <a:solidFill>
                   <a:srgbClr val="00ae9d"/>
@@ -16608,14 +16671,50 @@
       </p:grpSpPr>
       <p:sp>
         <p:nvSpPr>
-          <p:cNvPr id="393" name="CustomShape 1"/>
+          <p:cNvPr id="393" name="TextShape 1"/>
+          <p:cNvSpPr txBox="1"/>
+          <p:nvPr/>
+        </p:nvSpPr>
+        <p:spPr>
+          <a:xfrm>
+            <a:off x="1152000" y="4464000"/>
+            <a:ext cx="1728000" cy="374040"/>
+          </a:xfrm>
+          <a:prstGeom prst="rect">
+            <a:avLst/>
+          </a:prstGeom>
+          <a:noFill/>
+          <a:ln>
+            <a:noFill/>
+          </a:ln>
+        </p:spPr>
+        <p:txBody>
+          <a:bodyPr lIns="90000" rIns="90000" tIns="45000" bIns="45000">
+            <a:noAutofit/>
+          </a:bodyPr>
+          <a:p>
+            <a:r>
+              <a:rPr b="0" i="1" lang="en-GB" sz="900" spc="-1" strike="noStrike">
+                <a:latin typeface="Arial"/>
+              </a:rPr>
+              <a:t>synchroniczna (HTTP)</a:t>
+            </a:r>
+            <a:endParaRPr b="0" i="1" lang="en-GB" sz="900" spc="-1" strike="noStrike">
+              <a:latin typeface="Arial"/>
+            </a:endParaRPr>
+          </a:p>
+        </p:txBody>
+      </p:sp>
+      <p:sp>
+        <p:nvSpPr>
+          <p:cNvPr id="394" name="CustomShape 2"/>
           <p:cNvSpPr/>
           <p:nvPr/>
         </p:nvSpPr>
         <p:spPr>
           <a:xfrm>
             <a:off x="886680" y="398520"/>
-            <a:ext cx="7367040" cy="853920"/>
+            <a:ext cx="7366680" cy="853560"/>
           </a:xfrm>
           <a:prstGeom prst="rect">
             <a:avLst/>
@@ -16659,14 +16758,14 @@
       </p:sp>
       <p:sp>
         <p:nvSpPr>
-          <p:cNvPr id="394" name="CustomShape 2"/>
+          <p:cNvPr id="395" name="CustomShape 3"/>
           <p:cNvSpPr/>
           <p:nvPr/>
         </p:nvSpPr>
         <p:spPr>
           <a:xfrm>
             <a:off x="27000" y="4749840"/>
-            <a:ext cx="545040" cy="389880"/>
+            <a:ext cx="544680" cy="389520"/>
           </a:xfrm>
           <a:prstGeom prst="rect">
             <a:avLst/>
@@ -16692,7 +16791,7 @@
                 <a:spcPct val="100000"/>
               </a:lnSpc>
             </a:pPr>
-            <a:fld id="{334A7E03-FBCC-4F82-AFDC-3A8D9F650A0C}" type="slidenum">
+            <a:fld id="{C4200FAA-3CD3-4EDE-B127-9FC2C5D0C655}" type="slidenum">
               <a:rPr b="0" lang="en" sz="1200" spc="-1" strike="noStrike">
                 <a:solidFill>
                   <a:srgbClr val="00ae9d"/>
@@ -16710,7 +16809,7 @@
       </p:sp>
       <p:pic>
         <p:nvPicPr>
-          <p:cNvPr id="395" name="" descr=""/>
+          <p:cNvPr id="396" name="" descr=""/>
           <p:cNvPicPr/>
           <p:nvPr/>
         </p:nvPicPr>
@@ -16721,7 +16820,7 @@
         <p:spPr>
           <a:xfrm>
             <a:off x="1440000" y="1748160"/>
-            <a:ext cx="6408000" cy="2643840"/>
+            <a:ext cx="6407640" cy="2643480"/>
           </a:xfrm>
           <a:prstGeom prst="rect">
             <a:avLst/>
@@ -16731,6 +16830,100 @@
           </a:ln>
         </p:spPr>
       </p:pic>
+      <p:sp>
+        <p:nvSpPr>
+          <p:cNvPr id="397" name="Line 4"/>
+          <p:cNvSpPr/>
+          <p:nvPr/>
+        </p:nvSpPr>
+        <p:spPr>
+          <a:xfrm>
+            <a:off x="432000" y="4572000"/>
+            <a:ext cx="576000" cy="0"/>
+          </a:xfrm>
+          <a:prstGeom prst="line">
+            <a:avLst/>
+          </a:prstGeom>
+          <a:ln>
+            <a:solidFill>
+              <a:srgbClr val="000000"/>
+            </a:solidFill>
+          </a:ln>
+        </p:spPr>
+        <p:style>
+          <a:lnRef idx="0"/>
+          <a:fillRef idx="0"/>
+          <a:effectRef idx="0"/>
+          <a:fontRef idx="minor"/>
+        </p:style>
+      </p:sp>
+      <p:sp>
+        <p:nvSpPr>
+          <p:cNvPr id="398" name="Line 5"/>
+          <p:cNvSpPr/>
+          <p:nvPr/>
+        </p:nvSpPr>
+        <p:spPr>
+          <a:xfrm>
+            <a:off x="432000" y="4788000"/>
+            <a:ext cx="576000" cy="0"/>
+          </a:xfrm>
+          <a:prstGeom prst="line">
+            <a:avLst/>
+          </a:prstGeom>
+          <a:ln>
+            <a:solidFill>
+              <a:srgbClr val="000000"/>
+            </a:solidFill>
+            <a:custDash>
+              <a:ds d="1100000" sp="500000"/>
+              <a:ds d="1100000" sp="500000"/>
+            </a:custDash>
+          </a:ln>
+        </p:spPr>
+        <p:style>
+          <a:lnRef idx="0"/>
+          <a:fillRef idx="0"/>
+          <a:effectRef idx="0"/>
+          <a:fontRef idx="minor"/>
+        </p:style>
+      </p:sp>
+      <p:sp>
+        <p:nvSpPr>
+          <p:cNvPr id="399" name="TextShape 6"/>
+          <p:cNvSpPr txBox="1"/>
+          <p:nvPr/>
+        </p:nvSpPr>
+        <p:spPr>
+          <a:xfrm>
+            <a:off x="1152000" y="4680000"/>
+            <a:ext cx="1872000" cy="374040"/>
+          </a:xfrm>
+          <a:prstGeom prst="rect">
+            <a:avLst/>
+          </a:prstGeom>
+          <a:noFill/>
+          <a:ln>
+            <a:noFill/>
+          </a:ln>
+        </p:spPr>
+        <p:txBody>
+          <a:bodyPr lIns="90000" rIns="90000" tIns="45000" bIns="45000">
+            <a:noAutofit/>
+          </a:bodyPr>
+          <a:p>
+            <a:r>
+              <a:rPr b="0" i="1" lang="en-GB" sz="900" spc="-1" strike="noStrike">
+                <a:latin typeface="Arial"/>
+              </a:rPr>
+              <a:t>asynchroniczna (RabbitMQ)</a:t>
+            </a:r>
+            <a:endParaRPr b="0" i="1" lang="en-GB" sz="900" spc="-1" strike="noStrike">
+              <a:latin typeface="Arial"/>
+            </a:endParaRPr>
+          </a:p>
+        </p:txBody>
+      </p:sp>
     </p:spTree>
   </p:cSld>
   <mc:AlternateContent>
@@ -16763,14 +16956,14 @@
       </p:grpSpPr>
       <p:sp>
         <p:nvSpPr>
-          <p:cNvPr id="396" name="CustomShape 1"/>
+          <p:cNvPr id="400" name="CustomShape 1"/>
           <p:cNvSpPr/>
           <p:nvPr/>
         </p:nvSpPr>
         <p:spPr>
           <a:xfrm>
             <a:off x="886680" y="398520"/>
-            <a:ext cx="7367040" cy="853920"/>
+            <a:ext cx="7366680" cy="853560"/>
           </a:xfrm>
           <a:prstGeom prst="rect">
             <a:avLst/>
@@ -16814,14 +17007,14 @@
       </p:sp>
       <p:sp>
         <p:nvSpPr>
-          <p:cNvPr id="397" name="CustomShape 2"/>
+          <p:cNvPr id="401" name="CustomShape 2"/>
           <p:cNvSpPr/>
           <p:nvPr/>
         </p:nvSpPr>
         <p:spPr>
           <a:xfrm>
             <a:off x="27000" y="4749840"/>
-            <a:ext cx="545040" cy="389880"/>
+            <a:ext cx="544680" cy="389520"/>
           </a:xfrm>
           <a:prstGeom prst="rect">
             <a:avLst/>
@@ -16847,7 +17040,7 @@
                 <a:spcPct val="100000"/>
               </a:lnSpc>
             </a:pPr>
-            <a:fld id="{0C873293-3A6E-415D-A58C-F4D26A30A5ED}" type="slidenum">
+            <a:fld id="{9749901C-05BE-4AB3-8D61-C4CC36C5BC31}" type="slidenum">
               <a:rPr b="0" lang="en" sz="1200" spc="-1" strike="noStrike">
                 <a:solidFill>
                   <a:srgbClr val="00ae9d"/>
@@ -16865,7 +17058,7 @@
       </p:sp>
       <p:pic>
         <p:nvPicPr>
-          <p:cNvPr id="398" name="" descr=""/>
+          <p:cNvPr id="402" name="" descr=""/>
           <p:cNvPicPr/>
           <p:nvPr/>
         </p:nvPicPr>
@@ -16876,7 +17069,7 @@
         <p:spPr>
           <a:xfrm>
             <a:off x="648000" y="1716840"/>
-            <a:ext cx="8136000" cy="2743200"/>
+            <a:ext cx="8135640" cy="2742840"/>
           </a:xfrm>
           <a:prstGeom prst="rect">
             <a:avLst/>
@@ -16918,14 +17111,14 @@
       </p:grpSpPr>
       <p:sp>
         <p:nvSpPr>
-          <p:cNvPr id="399" name="CustomShape 1"/>
+          <p:cNvPr id="403" name="CustomShape 1"/>
           <p:cNvSpPr/>
           <p:nvPr/>
         </p:nvSpPr>
         <p:spPr>
           <a:xfrm>
             <a:off x="886680" y="398520"/>
-            <a:ext cx="7367040" cy="853920"/>
+            <a:ext cx="7366680" cy="853560"/>
           </a:xfrm>
           <a:prstGeom prst="rect">
             <a:avLst/>
@@ -16969,14 +17162,14 @@
       </p:sp>
       <p:sp>
         <p:nvSpPr>
-          <p:cNvPr id="400" name="CustomShape 2"/>
+          <p:cNvPr id="404" name="CustomShape 2"/>
           <p:cNvSpPr/>
           <p:nvPr/>
         </p:nvSpPr>
         <p:spPr>
           <a:xfrm>
             <a:off x="27000" y="4749840"/>
-            <a:ext cx="545040" cy="389880"/>
+            <a:ext cx="544680" cy="389520"/>
           </a:xfrm>
           <a:prstGeom prst="rect">
             <a:avLst/>
@@ -17002,7 +17195,7 @@
                 <a:spcPct val="100000"/>
               </a:lnSpc>
             </a:pPr>
-            <a:fld id="{CEF36313-BB7D-47FC-8710-BD7B3E968159}" type="slidenum">
+            <a:fld id="{39B46529-5353-4DEC-BCDA-11D5DF7AB3C3}" type="slidenum">
               <a:rPr b="0" lang="en" sz="1200" spc="-1" strike="noStrike">
                 <a:solidFill>
                   <a:srgbClr val="00ae9d"/>
@@ -17020,7 +17213,7 @@
       </p:sp>
       <p:pic>
         <p:nvPicPr>
-          <p:cNvPr id="401" name="" descr=""/>
+          <p:cNvPr id="405" name="" descr=""/>
           <p:cNvPicPr/>
           <p:nvPr/>
         </p:nvPicPr>
@@ -17031,7 +17224,7 @@
         <p:spPr>
           <a:xfrm>
             <a:off x="1212120" y="1831680"/>
-            <a:ext cx="6648480" cy="2200320"/>
+            <a:ext cx="6648120" cy="2199960"/>
           </a:xfrm>
           <a:prstGeom prst="rect">
             <a:avLst/>
@@ -17073,14 +17266,14 @@
       </p:grpSpPr>
       <p:sp>
         <p:nvSpPr>
-          <p:cNvPr id="402" name="CustomShape 1"/>
+          <p:cNvPr id="406" name="CustomShape 1"/>
           <p:cNvSpPr/>
           <p:nvPr/>
         </p:nvSpPr>
         <p:spPr>
           <a:xfrm>
             <a:off x="886680" y="398520"/>
-            <a:ext cx="7367040" cy="853920"/>
+            <a:ext cx="7366680" cy="853560"/>
           </a:xfrm>
           <a:prstGeom prst="rect">
             <a:avLst/>
@@ -17124,14 +17317,14 @@
       </p:sp>
       <p:sp>
         <p:nvSpPr>
-          <p:cNvPr id="403" name="CustomShape 2"/>
+          <p:cNvPr id="407" name="CustomShape 2"/>
           <p:cNvSpPr/>
           <p:nvPr/>
         </p:nvSpPr>
         <p:spPr>
           <a:xfrm>
             <a:off x="27000" y="4749840"/>
-            <a:ext cx="545040" cy="389880"/>
+            <a:ext cx="544680" cy="389520"/>
           </a:xfrm>
           <a:prstGeom prst="rect">
             <a:avLst/>
@@ -17157,7 +17350,7 @@
                 <a:spcPct val="100000"/>
               </a:lnSpc>
             </a:pPr>
-            <a:fld id="{CDEB53AE-92BD-4DDC-AEE6-DBDCC970EA01}" type="slidenum">
+            <a:fld id="{964BC105-3251-472F-9697-334D7A69695F}" type="slidenum">
               <a:rPr b="0" lang="en" sz="1200" spc="-1" strike="noStrike">
                 <a:solidFill>
                   <a:srgbClr val="00ae9d"/>
@@ -17175,7 +17368,7 @@
       </p:sp>
       <p:pic>
         <p:nvPicPr>
-          <p:cNvPr id="404" name="" descr=""/>
+          <p:cNvPr id="408" name="" descr=""/>
           <p:cNvPicPr/>
           <p:nvPr/>
         </p:nvPicPr>
@@ -17186,7 +17379,7 @@
         <p:spPr>
           <a:xfrm>
             <a:off x="1188000" y="1832040"/>
-            <a:ext cx="6648120" cy="2199960"/>
+            <a:ext cx="6647760" cy="2199600"/>
           </a:xfrm>
           <a:prstGeom prst="rect">
             <a:avLst/>
@@ -17228,14 +17421,14 @@
       </p:grpSpPr>
       <p:sp>
         <p:nvSpPr>
-          <p:cNvPr id="405" name="CustomShape 1"/>
+          <p:cNvPr id="409" name="CustomShape 1"/>
           <p:cNvSpPr/>
           <p:nvPr/>
         </p:nvSpPr>
         <p:spPr>
           <a:xfrm>
             <a:off x="3064680" y="1513080"/>
-            <a:ext cx="5530320" cy="1156320"/>
+            <a:ext cx="5529960" cy="1155960"/>
           </a:xfrm>
           <a:prstGeom prst="rect">
             <a:avLst/>
@@ -17279,14 +17472,14 @@
       </p:sp>
       <p:sp>
         <p:nvSpPr>
-          <p:cNvPr id="406" name="CustomShape 2"/>
+          <p:cNvPr id="410" name="CustomShape 2"/>
           <p:cNvSpPr/>
           <p:nvPr/>
         </p:nvSpPr>
         <p:spPr>
           <a:xfrm>
             <a:off x="3064680" y="2636280"/>
-            <a:ext cx="5530320" cy="2194200"/>
+            <a:ext cx="5529960" cy="2193840"/>
           </a:xfrm>
           <a:prstGeom prst="rect">
             <a:avLst/>
@@ -17392,28 +17585,28 @@
       </p:sp>
       <p:grpSp>
         <p:nvGrpSpPr>
-          <p:cNvPr id="407" name="Group 3"/>
+          <p:cNvPr id="411" name="Group 3"/>
           <p:cNvGrpSpPr/>
           <p:nvPr/>
         </p:nvGrpSpPr>
         <p:grpSpPr>
           <a:xfrm>
             <a:off x="685800" y="1814400"/>
-            <a:ext cx="1678320" cy="1176120"/>
+            <a:ext cx="1677960" cy="1175760"/>
             <a:chOff x="685800" y="1814400"/>
-            <a:chExt cx="1678320" cy="1176120"/>
+            <a:chExt cx="1677960" cy="1175760"/>
           </a:xfrm>
         </p:grpSpPr>
         <p:sp>
           <p:nvSpPr>
-            <p:cNvPr id="408" name="CustomShape 4"/>
+            <p:cNvPr id="412" name="CustomShape 4"/>
             <p:cNvSpPr/>
             <p:nvPr/>
           </p:nvSpPr>
           <p:spPr>
             <a:xfrm>
               <a:off x="685800" y="1814400"/>
-              <a:ext cx="1678320" cy="709560"/>
+              <a:ext cx="1677960" cy="709200"/>
             </a:xfrm>
             <a:custGeom>
               <a:avLst/>
@@ -17501,14 +17694,14 @@
         </p:sp>
         <p:sp>
           <p:nvSpPr>
-            <p:cNvPr id="409" name="CustomShape 5"/>
+            <p:cNvPr id="413" name="CustomShape 5"/>
             <p:cNvSpPr/>
             <p:nvPr/>
           </p:nvSpPr>
           <p:spPr>
             <a:xfrm>
               <a:off x="685800" y="1972800"/>
-              <a:ext cx="1678320" cy="1017720"/>
+              <a:ext cx="1677960" cy="1017360"/>
             </a:xfrm>
             <a:custGeom>
               <a:avLst/>
@@ -17639,14 +17832,14 @@
       </p:grpSp>
       <p:sp>
         <p:nvSpPr>
-          <p:cNvPr id="410" name="CustomShape 6"/>
+          <p:cNvPr id="414" name="CustomShape 6"/>
           <p:cNvSpPr/>
           <p:nvPr/>
         </p:nvSpPr>
         <p:spPr>
           <a:xfrm>
             <a:off x="1681920" y="2683080"/>
-            <a:ext cx="1271160" cy="1156320"/>
+            <a:ext cx="1270800" cy="1155960"/>
           </a:xfrm>
           <a:custGeom>
             <a:avLst/>
@@ -18100,14 +18293,14 @@
       </p:sp>
       <p:sp>
         <p:nvSpPr>
-          <p:cNvPr id="411" name="CustomShape 7"/>
+          <p:cNvPr id="415" name="CustomShape 7"/>
           <p:cNvSpPr/>
           <p:nvPr/>
         </p:nvSpPr>
         <p:spPr>
           <a:xfrm>
             <a:off x="27000" y="4749840"/>
-            <a:ext cx="545040" cy="389880"/>
+            <a:ext cx="544680" cy="389520"/>
           </a:xfrm>
           <a:prstGeom prst="rect">
             <a:avLst/>
@@ -18133,7 +18326,7 @@
                 <a:spcPct val="100000"/>
               </a:lnSpc>
             </a:pPr>
-            <a:fld id="{EA1D152C-CFA2-46D5-944C-26EF56C3AEB4}" type="slidenum">
+            <a:fld id="{AFD3149F-E3A1-4E23-BE78-88D766E81EBD}" type="slidenum">
               <a:rPr b="0" lang="en" sz="1200" spc="-1" strike="noStrike">
                 <a:solidFill>
                   <a:srgbClr val="00ae9d"/>
@@ -18188,7 +18381,7 @@
         <p:spPr>
           <a:xfrm>
             <a:off x="886680" y="398520"/>
-            <a:ext cx="7367040" cy="853920"/>
+            <a:ext cx="7366680" cy="853560"/>
           </a:xfrm>
           <a:prstGeom prst="rect">
             <a:avLst/>
@@ -18239,7 +18432,7 @@
         <p:spPr>
           <a:xfrm>
             <a:off x="886680" y="1592280"/>
-            <a:ext cx="3215520" cy="2835000"/>
+            <a:ext cx="3215160" cy="2834640"/>
           </a:xfrm>
           <a:prstGeom prst="rect">
             <a:avLst/>
@@ -18662,7 +18855,7 @@
         <p:spPr>
           <a:xfrm>
             <a:off x="4242960" y="1556280"/>
-            <a:ext cx="3748680" cy="2835000"/>
+            <a:ext cx="3748320" cy="2834640"/>
           </a:xfrm>
           <a:prstGeom prst="rect">
             <a:avLst/>
@@ -18945,7 +19138,7 @@
         <p:spPr>
           <a:xfrm>
             <a:off x="886680" y="3753360"/>
-            <a:ext cx="6862680" cy="822960"/>
+            <a:ext cx="6862320" cy="822600"/>
           </a:xfrm>
           <a:prstGeom prst="rect">
             <a:avLst/>
@@ -18971,7 +19164,7 @@
         <p:spPr>
           <a:xfrm>
             <a:off x="27000" y="4749840"/>
-            <a:ext cx="545040" cy="389880"/>
+            <a:ext cx="544680" cy="389520"/>
           </a:xfrm>
           <a:prstGeom prst="rect">
             <a:avLst/>
@@ -18997,7 +19190,7 @@
                 <a:spcPct val="100000"/>
               </a:lnSpc>
             </a:pPr>
-            <a:fld id="{8FF20AC4-6521-4D92-A33C-51F8E77CC319}" type="slidenum">
+            <a:fld id="{6BA3619F-C58E-4BD6-9115-079A8A67F32A}" type="slidenum">
               <a:rPr b="0" lang="en" sz="1200" spc="-1" strike="noStrike">
                 <a:solidFill>
                   <a:srgbClr val="00ae9d"/>
@@ -19062,7 +19255,7 @@
       </p:grpSpPr>
       <p:pic>
         <p:nvPicPr>
-          <p:cNvPr id="412" name="Google Shape;627;p39" descr=""/>
+          <p:cNvPr id="416" name="Google Shape;627;p39" descr=""/>
           <p:cNvPicPr/>
           <p:nvPr/>
         </p:nvPicPr>
@@ -19073,7 +19266,7 @@
         <p:spPr>
           <a:xfrm>
             <a:off x="3426480" y="1451160"/>
-            <a:ext cx="2287440" cy="546840"/>
+            <a:ext cx="2287080" cy="546480"/>
           </a:xfrm>
           <a:prstGeom prst="rect">
             <a:avLst/>
@@ -19085,14 +19278,14 @@
       </p:pic>
       <p:sp>
         <p:nvSpPr>
-          <p:cNvPr id="413" name="CustomShape 1"/>
+          <p:cNvPr id="417" name="CustomShape 1"/>
           <p:cNvSpPr/>
           <p:nvPr/>
         </p:nvSpPr>
         <p:spPr>
           <a:xfrm>
             <a:off x="1106280" y="2209680"/>
-            <a:ext cx="6928200" cy="263880"/>
+            <a:ext cx="6927840" cy="263520"/>
           </a:xfrm>
           <a:prstGeom prst="rect">
             <a:avLst/>
@@ -19136,42 +19329,42 @@
       </p:sp>
       <p:grpSp>
         <p:nvGrpSpPr>
-          <p:cNvPr id="414" name="Group 2"/>
+          <p:cNvPr id="418" name="Group 2"/>
           <p:cNvGrpSpPr/>
           <p:nvPr/>
         </p:nvGrpSpPr>
         <p:grpSpPr>
           <a:xfrm>
             <a:off x="690480" y="3290040"/>
-            <a:ext cx="7759440" cy="888840"/>
+            <a:ext cx="7759080" cy="888480"/>
             <a:chOff x="690480" y="3290040"/>
-            <a:chExt cx="7759440" cy="888840"/>
+            <a:chExt cx="7759080" cy="888480"/>
           </a:xfrm>
         </p:grpSpPr>
         <p:grpSp>
           <p:nvGrpSpPr>
-            <p:cNvPr id="415" name="Group 3"/>
+            <p:cNvPr id="419" name="Group 3"/>
             <p:cNvGrpSpPr/>
             <p:nvPr/>
           </p:nvGrpSpPr>
           <p:grpSpPr>
             <a:xfrm>
               <a:off x="4735080" y="3290040"/>
-              <a:ext cx="1692360" cy="888840"/>
+              <a:ext cx="1692000" cy="888480"/>
               <a:chOff x="4735080" y="3290040"/>
-              <a:chExt cx="1692360" cy="888840"/>
+              <a:chExt cx="1692000" cy="888480"/>
             </a:xfrm>
           </p:grpSpPr>
           <p:sp>
             <p:nvSpPr>
-              <p:cNvPr id="416" name="CustomShape 4"/>
+              <p:cNvPr id="420" name="CustomShape 4"/>
               <p:cNvSpPr/>
               <p:nvPr/>
             </p:nvSpPr>
             <p:spPr>
               <a:xfrm>
                 <a:off x="4735080" y="3545640"/>
-                <a:ext cx="1692360" cy="633240"/>
+                <a:ext cx="1692000" cy="632880"/>
               </a:xfrm>
               <a:prstGeom prst="rect">
                 <a:avLst/>
@@ -19215,14 +19408,14 @@
           </p:sp>
           <p:sp>
             <p:nvSpPr>
-              <p:cNvPr id="417" name="CustomShape 5"/>
+              <p:cNvPr id="421" name="CustomShape 5"/>
               <p:cNvSpPr/>
               <p:nvPr/>
             </p:nvSpPr>
             <p:spPr>
               <a:xfrm>
                 <a:off x="5492880" y="3290040"/>
-                <a:ext cx="177120" cy="177480"/>
+                <a:ext cx="176760" cy="177120"/>
               </a:xfrm>
               <a:custGeom>
                 <a:avLst/>
@@ -19471,28 +19664,28 @@
         </p:grpSp>
         <p:grpSp>
           <p:nvGrpSpPr>
-            <p:cNvPr id="418" name="Group 6"/>
+            <p:cNvPr id="422" name="Group 6"/>
             <p:cNvGrpSpPr/>
             <p:nvPr/>
           </p:nvGrpSpPr>
           <p:grpSpPr>
             <a:xfrm>
               <a:off x="2712960" y="3290400"/>
-              <a:ext cx="1692360" cy="888480"/>
+              <a:ext cx="1692000" cy="888120"/>
               <a:chOff x="2712960" y="3290400"/>
-              <a:chExt cx="1692360" cy="888480"/>
+              <a:chExt cx="1692000" cy="888120"/>
             </a:xfrm>
           </p:grpSpPr>
           <p:sp>
             <p:nvSpPr>
-              <p:cNvPr id="419" name="CustomShape 7"/>
+              <p:cNvPr id="423" name="CustomShape 7"/>
               <p:cNvSpPr/>
               <p:nvPr/>
             </p:nvSpPr>
             <p:spPr>
               <a:xfrm>
                 <a:off x="2712960" y="3545640"/>
-                <a:ext cx="1692360" cy="633240"/>
+                <a:ext cx="1692000" cy="632880"/>
               </a:xfrm>
               <a:prstGeom prst="rect">
                 <a:avLst/>
@@ -19536,14 +19729,14 @@
           </p:sp>
           <p:sp>
             <p:nvSpPr>
-              <p:cNvPr id="420" name="CustomShape 8"/>
+              <p:cNvPr id="424" name="CustomShape 8"/>
               <p:cNvSpPr/>
               <p:nvPr/>
             </p:nvSpPr>
             <p:spPr>
               <a:xfrm>
                 <a:off x="3459240" y="3290400"/>
-                <a:ext cx="199800" cy="177120"/>
+                <a:ext cx="199440" cy="176760"/>
               </a:xfrm>
               <a:custGeom>
                 <a:avLst/>
@@ -19886,28 +20079,28 @@
         </p:grpSp>
         <p:grpSp>
           <p:nvGrpSpPr>
-            <p:cNvPr id="421" name="Group 9"/>
+            <p:cNvPr id="425" name="Group 9"/>
             <p:cNvGrpSpPr/>
             <p:nvPr/>
           </p:nvGrpSpPr>
           <p:grpSpPr>
             <a:xfrm>
               <a:off x="6757560" y="3290040"/>
-              <a:ext cx="1692360" cy="888840"/>
+              <a:ext cx="1692000" cy="888480"/>
               <a:chOff x="6757560" y="3290040"/>
-              <a:chExt cx="1692360" cy="888840"/>
+              <a:chExt cx="1692000" cy="888480"/>
             </a:xfrm>
           </p:grpSpPr>
           <p:sp>
             <p:nvSpPr>
-              <p:cNvPr id="422" name="CustomShape 10"/>
+              <p:cNvPr id="426" name="CustomShape 10"/>
               <p:cNvSpPr/>
               <p:nvPr/>
             </p:nvSpPr>
             <p:spPr>
               <a:xfrm>
                 <a:off x="6757560" y="3545640"/>
-                <a:ext cx="1692360" cy="633240"/>
+                <a:ext cx="1692000" cy="632880"/>
               </a:xfrm>
               <a:prstGeom prst="rect">
                 <a:avLst/>
@@ -19951,14 +20144,14 @@
           </p:sp>
           <p:sp>
             <p:nvSpPr>
-              <p:cNvPr id="423" name="CustomShape 11"/>
+              <p:cNvPr id="427" name="CustomShape 11"/>
               <p:cNvSpPr/>
               <p:nvPr/>
             </p:nvSpPr>
             <p:spPr>
               <a:xfrm>
                 <a:off x="7515000" y="3290040"/>
-                <a:ext cx="177120" cy="177480"/>
+                <a:ext cx="176760" cy="177120"/>
               </a:xfrm>
               <a:custGeom>
                 <a:avLst/>
@@ -20404,28 +20597,28 @@
         </p:grpSp>
         <p:grpSp>
           <p:nvGrpSpPr>
-            <p:cNvPr id="424" name="Group 12"/>
+            <p:cNvPr id="428" name="Group 12"/>
             <p:cNvGrpSpPr/>
             <p:nvPr/>
           </p:nvGrpSpPr>
           <p:grpSpPr>
             <a:xfrm>
               <a:off x="690480" y="3290400"/>
-              <a:ext cx="1692360" cy="888480"/>
+              <a:ext cx="1692000" cy="888120"/>
               <a:chOff x="690480" y="3290400"/>
-              <a:chExt cx="1692360" cy="888480"/>
+              <a:chExt cx="1692000" cy="888120"/>
             </a:xfrm>
           </p:grpSpPr>
           <p:sp>
             <p:nvSpPr>
-              <p:cNvPr id="425" name="CustomShape 13"/>
+              <p:cNvPr id="429" name="CustomShape 13"/>
               <p:cNvSpPr/>
               <p:nvPr/>
             </p:nvSpPr>
             <p:spPr>
               <a:xfrm>
                 <a:off x="690480" y="3545640"/>
-                <a:ext cx="1692360" cy="633240"/>
+                <a:ext cx="1692000" cy="632880"/>
               </a:xfrm>
               <a:prstGeom prst="rect">
                 <a:avLst/>
@@ -20469,14 +20662,14 @@
           </p:sp>
           <p:sp>
             <p:nvSpPr>
-              <p:cNvPr id="426" name="CustomShape 14"/>
+              <p:cNvPr id="430" name="CustomShape 14"/>
               <p:cNvSpPr/>
               <p:nvPr/>
             </p:nvSpPr>
             <p:spPr>
               <a:xfrm>
                 <a:off x="1425240" y="3290400"/>
-                <a:ext cx="223200" cy="177120"/>
+                <a:ext cx="222840" cy="176760"/>
               </a:xfrm>
               <a:custGeom>
                 <a:avLst/>
@@ -20744,7 +20937,7 @@
         <p:spPr>
           <a:xfrm>
             <a:off x="886680" y="398520"/>
-            <a:ext cx="7367760" cy="854640"/>
+            <a:ext cx="7367400" cy="854280"/>
           </a:xfrm>
           <a:prstGeom prst="rect">
             <a:avLst/>
@@ -20795,7 +20988,7 @@
         <p:spPr>
           <a:xfrm>
             <a:off x="870840" y="1972800"/>
-            <a:ext cx="2362320" cy="2950200"/>
+            <a:ext cx="2361960" cy="2949840"/>
           </a:xfrm>
           <a:prstGeom prst="rect">
             <a:avLst/>
@@ -21032,7 +21225,7 @@
         <p:spPr>
           <a:xfrm>
             <a:off x="3357360" y="1972800"/>
-            <a:ext cx="2362320" cy="2950200"/>
+            <a:ext cx="2361960" cy="2949840"/>
           </a:xfrm>
           <a:prstGeom prst="rect">
             <a:avLst/>
@@ -21209,7 +21402,7 @@
         <p:spPr>
           <a:xfrm>
             <a:off x="5843880" y="1972800"/>
-            <a:ext cx="2362320" cy="2950200"/>
+            <a:ext cx="2361960" cy="2949840"/>
           </a:xfrm>
           <a:prstGeom prst="rect">
             <a:avLst/>
@@ -21506,7 +21699,7 @@
         <p:spPr>
           <a:xfrm>
             <a:off x="27000" y="4749840"/>
-            <a:ext cx="545760" cy="390600"/>
+            <a:ext cx="545400" cy="390240"/>
           </a:xfrm>
           <a:prstGeom prst="rect">
             <a:avLst/>
@@ -21532,7 +21725,7 @@
                 <a:spcPct val="100000"/>
               </a:lnSpc>
             </a:pPr>
-            <a:fld id="{C2C40645-C2C4-4DAA-9F39-0A5A45683D06}" type="slidenum">
+            <a:fld id="{D6174F20-97E9-470E-8677-98A1FB99C365}" type="slidenum">
               <a:rPr b="0" lang="en" sz="1200" spc="-1" strike="noStrike">
                 <a:solidFill>
                   <a:srgbClr val="00ae9d"/>
@@ -21587,7 +21780,7 @@
         <p:spPr>
           <a:xfrm>
             <a:off x="27000" y="4749840"/>
-            <a:ext cx="545040" cy="389880"/>
+            <a:ext cx="544680" cy="389520"/>
           </a:xfrm>
           <a:prstGeom prst="rect">
             <a:avLst/>
@@ -21613,7 +21806,7 @@
                 <a:spcPct val="100000"/>
               </a:lnSpc>
             </a:pPr>
-            <a:fld id="{33CE666B-67E7-44AE-8E0A-7D3861CAE014}" type="slidenum">
+            <a:fld id="{0C1B6866-5F8D-458A-9B4C-AB69C21534F5}" type="slidenum">
               <a:rPr b="0" lang="en" sz="1200" spc="-1" strike="noStrike">
                 <a:solidFill>
                   <a:srgbClr val="00ae9d"/>
@@ -21642,7 +21835,7 @@
         <p:spPr>
           <a:xfrm>
             <a:off x="828000" y="1104840"/>
-            <a:ext cx="7124760" cy="3715920"/>
+            <a:ext cx="7124400" cy="3715560"/>
           </a:xfrm>
           <a:prstGeom prst="rect">
             <a:avLst/>
@@ -21691,7 +21884,7 @@
         <p:spPr>
           <a:xfrm>
             <a:off x="27000" y="4749840"/>
-            <a:ext cx="545040" cy="389880"/>
+            <a:ext cx="544680" cy="389520"/>
           </a:xfrm>
           <a:prstGeom prst="rect">
             <a:avLst/>
@@ -21717,7 +21910,7 @@
                 <a:spcPct val="100000"/>
               </a:lnSpc>
             </a:pPr>
-            <a:fld id="{7085555A-F9E3-44EA-8F9D-8FA103E8AB27}" type="slidenum">
+            <a:fld id="{845CFAB2-C77E-48C7-B7E9-AFD861F3BD7E}" type="slidenum">
               <a:rPr b="0" lang="en" sz="1200" spc="-1" strike="noStrike">
                 <a:solidFill>
                   <a:srgbClr val="00ae9d"/>
@@ -21746,7 +21939,7 @@
         <p:spPr>
           <a:xfrm>
             <a:off x="3568320" y="999360"/>
-            <a:ext cx="2796120" cy="3965400"/>
+            <a:ext cx="2795760" cy="3965040"/>
           </a:xfrm>
           <a:prstGeom prst="rect">
             <a:avLst/>
@@ -21795,7 +21988,7 @@
         <p:spPr>
           <a:xfrm>
             <a:off x="27000" y="4749840"/>
-            <a:ext cx="545040" cy="389880"/>
+            <a:ext cx="544680" cy="389520"/>
           </a:xfrm>
           <a:prstGeom prst="rect">
             <a:avLst/>
@@ -21821,7 +22014,7 @@
                 <a:spcPct val="100000"/>
               </a:lnSpc>
             </a:pPr>
-            <a:fld id="{E8D2DB59-1CA9-48A7-83EA-E166751D86E5}" type="slidenum">
+            <a:fld id="{9A6080B1-E6EB-4B69-9DC2-59FD72310C84}" type="slidenum">
               <a:rPr b="0" lang="en" sz="1200" spc="-1" strike="noStrike">
                 <a:solidFill>
                   <a:srgbClr val="00ae9d"/>
@@ -21850,7 +22043,7 @@
         <p:spPr>
           <a:xfrm>
             <a:off x="3571920" y="1008000"/>
-            <a:ext cx="2790720" cy="3956760"/>
+            <a:ext cx="2790360" cy="3956400"/>
           </a:xfrm>
           <a:prstGeom prst="rect">
             <a:avLst/>
@@ -21899,7 +22092,7 @@
         <p:spPr>
           <a:xfrm>
             <a:off x="27000" y="4749840"/>
-            <a:ext cx="545040" cy="389880"/>
+            <a:ext cx="544680" cy="389520"/>
           </a:xfrm>
           <a:prstGeom prst="rect">
             <a:avLst/>
@@ -21925,7 +22118,7 @@
                 <a:spcPct val="100000"/>
               </a:lnSpc>
             </a:pPr>
-            <a:fld id="{C2E881D0-F4E8-4606-82E5-3AAB9D25793B}" type="slidenum">
+            <a:fld id="{01B4D9A8-D2FE-4A1C-A88B-68A3B5BC43BB}" type="slidenum">
               <a:rPr b="0" lang="en" sz="1200" spc="-1" strike="noStrike">
                 <a:solidFill>
                   <a:srgbClr val="00ae9d"/>
@@ -21954,7 +22147,7 @@
         <p:spPr>
           <a:xfrm>
             <a:off x="3567960" y="1008000"/>
-            <a:ext cx="2787840" cy="3958560"/>
+            <a:ext cx="2787480" cy="3958200"/>
           </a:xfrm>
           <a:prstGeom prst="rect">
             <a:avLst/>
@@ -22003,7 +22196,7 @@
         <p:spPr>
           <a:xfrm>
             <a:off x="27000" y="4749840"/>
-            <a:ext cx="545040" cy="389880"/>
+            <a:ext cx="544680" cy="389520"/>
           </a:xfrm>
           <a:prstGeom prst="rect">
             <a:avLst/>
@@ -22029,7 +22222,7 @@
                 <a:spcPct val="100000"/>
               </a:lnSpc>
             </a:pPr>
-            <a:fld id="{F9DD3DA1-B842-42C9-BA5F-F3894A73E980}" type="slidenum">
+            <a:fld id="{3DB5F0EB-8B4D-4368-A162-CDB2794D8A13}" type="slidenum">
               <a:rPr b="0" lang="en" sz="1200" spc="-1" strike="noStrike">
                 <a:solidFill>
                   <a:srgbClr val="00ae9d"/>
@@ -22058,7 +22251,7 @@
         <p:spPr>
           <a:xfrm>
             <a:off x="1688040" y="1080000"/>
-            <a:ext cx="5580720" cy="3867480"/>
+            <a:ext cx="5580360" cy="3867120"/>
           </a:xfrm>
           <a:prstGeom prst="rect">
             <a:avLst/>
@@ -22107,7 +22300,7 @@
         <p:spPr>
           <a:xfrm>
             <a:off x="27000" y="4749840"/>
-            <a:ext cx="545040" cy="389880"/>
+            <a:ext cx="544680" cy="389520"/>
           </a:xfrm>
           <a:prstGeom prst="rect">
             <a:avLst/>
@@ -22133,7 +22326,7 @@
                 <a:spcPct val="100000"/>
               </a:lnSpc>
             </a:pPr>
-            <a:fld id="{CBC30A0D-471B-4D05-86F4-0F68BC5D4432}" type="slidenum">
+            <a:fld id="{8E4855D1-07BF-4BD5-9CA9-AC40B96CAF23}" type="slidenum">
               <a:rPr b="0" lang="en" sz="1200" spc="-1" strike="noStrike">
                 <a:solidFill>
                   <a:srgbClr val="00ae9d"/>
@@ -22162,7 +22355,7 @@
         <p:spPr>
           <a:xfrm>
             <a:off x="3600000" y="1008000"/>
-            <a:ext cx="2760840" cy="3956760"/>
+            <a:ext cx="2760480" cy="3956400"/>
           </a:xfrm>
           <a:prstGeom prst="rect">
             <a:avLst/>

</xml_diff>